<commit_message>
Atualização da Avaliação dos Testes
Documento de Avaliação dos Testes atualizado.
</commit_message>
<xml_diff>
--- a/FINDERRORS_-_Avaliação_dos_Testes.pptx
+++ b/FINDERRORS_-_Avaliação_dos_Testes.pptx
@@ -8,11 +8,14 @@
     <p:sldId id="256" r:id="rId2"/>
     <p:sldId id="257" r:id="rId3"/>
     <p:sldId id="259" r:id="rId4"/>
-    <p:sldId id="260" r:id="rId5"/>
-    <p:sldId id="261" r:id="rId6"/>
-    <p:sldId id="262" r:id="rId7"/>
-    <p:sldId id="263" r:id="rId8"/>
-    <p:sldId id="258" r:id="rId9"/>
+    <p:sldId id="264" r:id="rId5"/>
+    <p:sldId id="260" r:id="rId6"/>
+    <p:sldId id="261" r:id="rId7"/>
+    <p:sldId id="262" r:id="rId8"/>
+    <p:sldId id="263" r:id="rId9"/>
+    <p:sldId id="265" r:id="rId10"/>
+    <p:sldId id="266" r:id="rId11"/>
+    <p:sldId id="258" r:id="rId12"/>
   </p:sldIdLst>
   <p:sldSz cx="9144000" cy="6858000" type="screen4x3"/>
   <p:notesSz cx="6858000" cy="9144000"/>
@@ -111,6 +114,22 @@
       </a:defRPr>
     </a:lvl9pPr>
   </p:defaultTextStyle>
+  <p:extLst>
+    <p:ext uri="{EFAFB233-063F-42B5-8137-9DF3F51BA10A}">
+      <p15:sldGuideLst xmlns:p15="http://schemas.microsoft.com/office/powerpoint/2012/main">
+        <p15:guide id="1" orient="horz" pos="2160">
+          <p15:clr>
+            <a:srgbClr val="A4A3A4"/>
+          </p15:clr>
+        </p15:guide>
+        <p15:guide id="2" pos="2880">
+          <p15:clr>
+            <a:srgbClr val="A4A3A4"/>
+          </p15:clr>
+        </p15:guide>
+      </p15:sldGuideLst>
+    </p:ext>
+  </p:extLst>
 </p:presentation>
 </file>
 
@@ -296,7 +315,7 @@
             <a:fld id="{F4448136-D4BD-40DD-93D0-3AD44E3A349C}" type="datetimeFigureOut">
               <a:rPr lang="pt-BR" smtClean="0"/>
               <a:pPr/>
-              <a:t>13/11/2014</a:t>
+              <a:t>16/11/2014</a:t>
             </a:fld>
             <a:endParaRPr lang="pt-BR"/>
           </a:p>
@@ -463,7 +482,7 @@
             <a:fld id="{F4448136-D4BD-40DD-93D0-3AD44E3A349C}" type="datetimeFigureOut">
               <a:rPr lang="pt-BR" smtClean="0"/>
               <a:pPr/>
-              <a:t>13/11/2014</a:t>
+              <a:t>16/11/2014</a:t>
             </a:fld>
             <a:endParaRPr lang="pt-BR"/>
           </a:p>
@@ -640,7 +659,7 @@
             <a:fld id="{F4448136-D4BD-40DD-93D0-3AD44E3A349C}" type="datetimeFigureOut">
               <a:rPr lang="pt-BR" smtClean="0"/>
               <a:pPr/>
-              <a:t>13/11/2014</a:t>
+              <a:t>16/11/2014</a:t>
             </a:fld>
             <a:endParaRPr lang="pt-BR"/>
           </a:p>
@@ -807,7 +826,7 @@
             <a:fld id="{F4448136-D4BD-40DD-93D0-3AD44E3A349C}" type="datetimeFigureOut">
               <a:rPr lang="pt-BR" smtClean="0"/>
               <a:pPr/>
-              <a:t>13/11/2014</a:t>
+              <a:t>16/11/2014</a:t>
             </a:fld>
             <a:endParaRPr lang="pt-BR"/>
           </a:p>
@@ -1050,7 +1069,7 @@
             <a:fld id="{F4448136-D4BD-40DD-93D0-3AD44E3A349C}" type="datetimeFigureOut">
               <a:rPr lang="pt-BR" smtClean="0"/>
               <a:pPr/>
-              <a:t>13/11/2014</a:t>
+              <a:t>16/11/2014</a:t>
             </a:fld>
             <a:endParaRPr lang="pt-BR"/>
           </a:p>
@@ -1335,7 +1354,7 @@
             <a:fld id="{F4448136-D4BD-40DD-93D0-3AD44E3A349C}" type="datetimeFigureOut">
               <a:rPr lang="pt-BR" smtClean="0"/>
               <a:pPr/>
-              <a:t>13/11/2014</a:t>
+              <a:t>16/11/2014</a:t>
             </a:fld>
             <a:endParaRPr lang="pt-BR"/>
           </a:p>
@@ -1754,7 +1773,7 @@
             <a:fld id="{F4448136-D4BD-40DD-93D0-3AD44E3A349C}" type="datetimeFigureOut">
               <a:rPr lang="pt-BR" smtClean="0"/>
               <a:pPr/>
-              <a:t>13/11/2014</a:t>
+              <a:t>16/11/2014</a:t>
             </a:fld>
             <a:endParaRPr lang="pt-BR"/>
           </a:p>
@@ -1869,7 +1888,7 @@
             <a:fld id="{F4448136-D4BD-40DD-93D0-3AD44E3A349C}" type="datetimeFigureOut">
               <a:rPr lang="pt-BR" smtClean="0"/>
               <a:pPr/>
-              <a:t>13/11/2014</a:t>
+              <a:t>16/11/2014</a:t>
             </a:fld>
             <a:endParaRPr lang="pt-BR"/>
           </a:p>
@@ -1961,7 +1980,7 @@
             <a:fld id="{F4448136-D4BD-40DD-93D0-3AD44E3A349C}" type="datetimeFigureOut">
               <a:rPr lang="pt-BR" smtClean="0"/>
               <a:pPr/>
-              <a:t>13/11/2014</a:t>
+              <a:t>16/11/2014</a:t>
             </a:fld>
             <a:endParaRPr lang="pt-BR"/>
           </a:p>
@@ -2235,7 +2254,7 @@
             <a:fld id="{F4448136-D4BD-40DD-93D0-3AD44E3A349C}" type="datetimeFigureOut">
               <a:rPr lang="pt-BR" smtClean="0"/>
               <a:pPr/>
-              <a:t>13/11/2014</a:t>
+              <a:t>16/11/2014</a:t>
             </a:fld>
             <a:endParaRPr lang="pt-BR"/>
           </a:p>
@@ -2485,7 +2504,7 @@
             <a:fld id="{F4448136-D4BD-40DD-93D0-3AD44E3A349C}" type="datetimeFigureOut">
               <a:rPr lang="pt-BR" smtClean="0"/>
               <a:pPr/>
-              <a:t>13/11/2014</a:t>
+              <a:t>16/11/2014</a:t>
             </a:fld>
             <a:endParaRPr lang="pt-BR"/>
           </a:p>
@@ -2695,7 +2714,7 @@
             <a:fld id="{F4448136-D4BD-40DD-93D0-3AD44E3A349C}" type="datetimeFigureOut">
               <a:rPr lang="pt-BR" smtClean="0"/>
               <a:pPr/>
-              <a:t>13/11/2014</a:t>
+              <a:t>16/11/2014</a:t>
             </a:fld>
             <a:endParaRPr lang="pt-BR"/>
           </a:p>
@@ -3122,16 +3141,6 @@
               </a:rPr>
               <a:t>FINDERRORS – Avaliação dos Testes</a:t>
             </a:r>
-            <a:r>
-              <a:rPr lang="pt-BR" sz="3600" dirty="0" smtClean="0">
-                <a:solidFill>
-                  <a:schemeClr val="accent1">
-                    <a:lumMod val="50000"/>
-                  </a:schemeClr>
-                </a:solidFill>
-              </a:rPr>
-              <a:t/>
-            </a:r>
             <a:br>
               <a:rPr lang="pt-BR" sz="3600" dirty="0" smtClean="0">
                 <a:solidFill>
@@ -3161,6 +3170,201 @@
           </a:p>
         </p:txBody>
       </p:sp>
+    </p:spTree>
+  </p:cSld>
+  <p:clrMapOvr>
+    <a:masterClrMapping/>
+  </p:clrMapOvr>
+  <p:timing>
+    <p:tnLst>
+      <p:par>
+        <p:cTn id="1" dur="indefinite" restart="never" nodeType="tmRoot"/>
+      </p:par>
+    </p:tnLst>
+  </p:timing>
+</p:sld>
+</file>
+
+<file path=ppt/slides/slide10.xml><?xml version="1.0" encoding="utf-8"?>
+<p:sld xmlns:a="http://schemas.openxmlformats.org/drawingml/2006/main" xmlns:r="http://schemas.openxmlformats.org/officeDocument/2006/relationships" xmlns:p="http://schemas.openxmlformats.org/presentationml/2006/main">
+  <p:cSld>
+    <p:spTree>
+      <p:nvGrpSpPr>
+        <p:cNvPr id="1" name=""/>
+        <p:cNvGrpSpPr/>
+        <p:nvPr/>
+      </p:nvGrpSpPr>
+      <p:grpSpPr>
+        <a:xfrm>
+          <a:off x="0" y="0"/>
+          <a:ext cx="0" cy="0"/>
+          <a:chOff x="0" y="0"/>
+          <a:chExt cx="0" cy="0"/>
+        </a:xfrm>
+      </p:grpSpPr>
+      <p:pic>
+        <p:nvPicPr>
+          <p:cNvPr id="7" name="Espaço Reservado para Conteúdo 6" descr="Nova140722(ppt_novaroma)B-2.jpg"/>
+          <p:cNvPicPr>
+            <a:picLocks noGrp="1" noChangeAspect="1"/>
+          </p:cNvPicPr>
+          <p:nvPr>
+            <p:ph idx="1"/>
+          </p:nvPr>
+        </p:nvPicPr>
+        <p:blipFill>
+          <a:blip r:embed="rId2"/>
+          <a:stretch>
+            <a:fillRect/>
+          </a:stretch>
+        </p:blipFill>
+        <p:spPr>
+          <a:xfrm>
+            <a:off x="0" y="0"/>
+            <a:ext cx="9144000" cy="6858000"/>
+          </a:xfrm>
+        </p:spPr>
+      </p:pic>
+      <p:sp>
+        <p:nvSpPr>
+          <p:cNvPr id="2" name="Título 1"/>
+          <p:cNvSpPr>
+            <a:spLocks noGrp="1"/>
+          </p:cNvSpPr>
+          <p:nvPr>
+            <p:ph type="title"/>
+          </p:nvPr>
+        </p:nvSpPr>
+        <p:spPr>
+          <a:xfrm>
+            <a:off x="714348" y="357166"/>
+            <a:ext cx="5214974" cy="642942"/>
+          </a:xfrm>
+        </p:spPr>
+        <p:txBody>
+          <a:bodyPr>
+            <a:normAutofit/>
+          </a:bodyPr>
+          <a:lstStyle/>
+          <a:p>
+            <a:pPr algn="l"/>
+            <a:r>
+              <a:rPr lang="pt-BR" sz="2300" dirty="0" smtClean="0">
+                <a:solidFill>
+                  <a:schemeClr val="bg1"/>
+                </a:solidFill>
+              </a:rPr>
+              <a:t>Riscos e suas mitigações</a:t>
+            </a:r>
+            <a:endParaRPr lang="pt-BR" sz="2300" dirty="0">
+              <a:solidFill>
+                <a:schemeClr val="bg1"/>
+              </a:solidFill>
+            </a:endParaRPr>
+          </a:p>
+        </p:txBody>
+      </p:sp>
+      <p:sp>
+        <p:nvSpPr>
+          <p:cNvPr id="5" name="CaixaDeTexto 4"/>
+          <p:cNvSpPr txBox="1"/>
+          <p:nvPr/>
+        </p:nvSpPr>
+        <p:spPr>
+          <a:xfrm>
+            <a:off x="1142976" y="1857364"/>
+            <a:ext cx="6929486" cy="646331"/>
+          </a:xfrm>
+          <a:prstGeom prst="rect">
+            <a:avLst/>
+          </a:prstGeom>
+          <a:noFill/>
+        </p:spPr>
+        <p:txBody>
+          <a:bodyPr wrap="square" rtlCol="0">
+            <a:spAutoFit/>
+          </a:bodyPr>
+          <a:lstStyle/>
+          <a:p>
+            <a:pPr marL="285750" indent="-285750">
+              <a:buFont typeface="Arial" panose="020B0604020202020204" pitchFamily="34" charset="0"/>
+              <a:buChar char="•"/>
+            </a:pPr>
+            <a:r>
+              <a:rPr lang="pt-BR" dirty="0" smtClean="0"/>
+              <a:t>Atraso na elaboração e execução dos casos de teste:</a:t>
+            </a:r>
+          </a:p>
+          <a:p>
+            <a:pPr marL="742950" lvl="1" indent="-285750">
+              <a:buFont typeface="Arial" panose="020B0604020202020204" pitchFamily="34" charset="0"/>
+              <a:buChar char="•"/>
+            </a:pPr>
+            <a:endParaRPr lang="pt-BR" dirty="0" smtClean="0"/>
+          </a:p>
+        </p:txBody>
+      </p:sp>
+    </p:spTree>
+    <p:extLst>
+      <p:ext uri="{BB962C8B-B14F-4D97-AF65-F5344CB8AC3E}">
+        <p14:creationId xmlns:p14="http://schemas.microsoft.com/office/powerpoint/2010/main" val="3684208254"/>
+      </p:ext>
+    </p:extLst>
+  </p:cSld>
+  <p:clrMapOvr>
+    <a:masterClrMapping/>
+  </p:clrMapOvr>
+  <p:timing>
+    <p:tnLst>
+      <p:par>
+        <p:cTn id="1" dur="indefinite" restart="never" nodeType="tmRoot"/>
+      </p:par>
+    </p:tnLst>
+  </p:timing>
+</p:sld>
+</file>
+
+<file path=ppt/slides/slide11.xml><?xml version="1.0" encoding="utf-8"?>
+<p:sld xmlns:a="http://schemas.openxmlformats.org/drawingml/2006/main" xmlns:r="http://schemas.openxmlformats.org/officeDocument/2006/relationships" xmlns:p="http://schemas.openxmlformats.org/presentationml/2006/main">
+  <p:cSld>
+    <p:spTree>
+      <p:nvGrpSpPr>
+        <p:cNvPr id="1" name=""/>
+        <p:cNvGrpSpPr/>
+        <p:nvPr/>
+      </p:nvGrpSpPr>
+      <p:grpSpPr>
+        <a:xfrm>
+          <a:off x="0" y="0"/>
+          <a:ext cx="0" cy="0"/>
+          <a:chOff x="0" y="0"/>
+          <a:chExt cx="0" cy="0"/>
+        </a:xfrm>
+      </p:grpSpPr>
+      <p:pic>
+        <p:nvPicPr>
+          <p:cNvPr id="2" name="Imagem 1" descr="Nova140722(ppt_novaroma)B-3.jpg"/>
+          <p:cNvPicPr>
+            <a:picLocks noChangeAspect="1"/>
+          </p:cNvPicPr>
+          <p:nvPr/>
+        </p:nvPicPr>
+        <p:blipFill>
+          <a:blip r:embed="rId2"/>
+          <a:stretch>
+            <a:fillRect/>
+          </a:stretch>
+        </p:blipFill>
+        <p:spPr>
+          <a:xfrm>
+            <a:off x="0" y="0"/>
+            <a:ext cx="9144000" cy="6858000"/>
+          </a:xfrm>
+          <a:prstGeom prst="rect">
+            <a:avLst/>
+          </a:prstGeom>
+        </p:spPr>
+      </p:pic>
     </p:spTree>
   </p:cSld>
   <p:clrMapOvr>
@@ -3277,8 +3481,8 @@
           </a:bodyPr>
           <a:lstStyle/>
           <a:p>
-            <a:pPr>
-              <a:buFont typeface="Arial" pitchFamily="34" charset="0"/>
+            <a:pPr marL="285750" indent="-285750">
+              <a:buFont typeface="Arial" panose="020B0604020202020204" pitchFamily="34" charset="0"/>
               <a:buChar char="•"/>
             </a:pPr>
             <a:r>
@@ -3300,8 +3504,8 @@
             <a:endParaRPr lang="pt-BR" dirty="0" smtClean="0"/>
           </a:p>
           <a:p>
-            <a:pPr>
-              <a:buFont typeface="Arial" pitchFamily="34" charset="0"/>
+            <a:pPr marL="285750" indent="-285750">
+              <a:buFont typeface="Arial" panose="020B0604020202020204" pitchFamily="34" charset="0"/>
               <a:buChar char="•"/>
             </a:pPr>
             <a:r>
@@ -3428,8 +3632,8 @@
           </a:bodyPr>
           <a:lstStyle/>
           <a:p>
-            <a:pPr>
-              <a:buFont typeface="Arial" pitchFamily="34" charset="0"/>
+            <a:pPr marL="285750" indent="-285750">
+              <a:buFont typeface="Arial" panose="020B0604020202020204" pitchFamily="34" charset="0"/>
               <a:buChar char="•"/>
             </a:pPr>
             <a:r>
@@ -3445,8 +3649,8 @@
             <a:endParaRPr lang="pt-BR" dirty="0" smtClean="0"/>
           </a:p>
           <a:p>
-            <a:pPr lvl="1">
-              <a:buFont typeface="Arial" pitchFamily="34" charset="0"/>
+            <a:pPr marL="742950" lvl="1" indent="-285750">
+              <a:buFont typeface="Arial" panose="020B0604020202020204" pitchFamily="34" charset="0"/>
               <a:buChar char="•"/>
             </a:pPr>
             <a:r>
@@ -3455,8 +3659,8 @@
             </a:r>
           </a:p>
           <a:p>
-            <a:pPr lvl="1">
-              <a:buFont typeface="Arial" pitchFamily="34" charset="0"/>
+            <a:pPr marL="742950" lvl="1" indent="-285750">
+              <a:buFont typeface="Arial" panose="020B0604020202020204" pitchFamily="34" charset="0"/>
               <a:buChar char="•"/>
             </a:pPr>
             <a:r>
@@ -3465,8 +3669,8 @@
             </a:r>
           </a:p>
           <a:p>
-            <a:pPr lvl="1">
-              <a:buFont typeface="Arial" pitchFamily="34" charset="0"/>
+            <a:pPr marL="742950" lvl="1" indent="-285750">
+              <a:buFont typeface="Arial" panose="020B0604020202020204" pitchFamily="34" charset="0"/>
               <a:buChar char="•"/>
             </a:pPr>
             <a:r>
@@ -3475,8 +3679,8 @@
             </a:r>
           </a:p>
           <a:p>
-            <a:pPr lvl="1">
-              <a:buFont typeface="Arial" pitchFamily="34" charset="0"/>
+            <a:pPr marL="742950" lvl="1" indent="-285750">
+              <a:buFont typeface="Arial" panose="020B0604020202020204" pitchFamily="34" charset="0"/>
               <a:buChar char="•"/>
             </a:pPr>
             <a:r>
@@ -3492,6 +3696,13 @@
   <p:clrMapOvr>
     <a:masterClrMapping/>
   </p:clrMapOvr>
+  <p:timing>
+    <p:tnLst>
+      <p:par>
+        <p:cTn id="1" dur="indefinite" restart="never" nodeType="tmRoot"/>
+      </p:par>
+    </p:tnLst>
+  </p:timing>
 </p:sld>
 </file>
 
@@ -3559,30 +3770,14 @@
           <a:p>
             <a:pPr algn="l"/>
             <a:r>
-              <a:rPr lang="pt-BR" sz="2800" dirty="0" smtClean="0">
+              <a:rPr lang="pt-BR" sz="2300" dirty="0" smtClean="0">
                 <a:solidFill>
                   <a:schemeClr val="bg1"/>
                 </a:solidFill>
               </a:rPr>
-              <a:t>Módulo</a:t>
-            </a:r>
-            <a:r>
-              <a:rPr lang="pt-BR" sz="2800" dirty="0" smtClean="0">
-                <a:solidFill>
-                  <a:schemeClr val="bg1"/>
-                </a:solidFill>
-              </a:rPr>
-              <a:t> </a:t>
-            </a:r>
-            <a:r>
-              <a:rPr lang="pt-BR" sz="2800" dirty="0" smtClean="0">
-                <a:solidFill>
-                  <a:schemeClr val="bg1"/>
-                </a:solidFill>
-              </a:rPr>
-              <a:t>Gerenciar</a:t>
-            </a:r>
-            <a:endParaRPr lang="pt-BR" sz="2800" dirty="0">
+              <a:t>Procedimentos e tipos de teste aplicados</a:t>
+            </a:r>
+            <a:endParaRPr lang="pt-BR" sz="2300" dirty="0">
               <a:solidFill>
                 <a:schemeClr val="bg1"/>
               </a:solidFill>
@@ -3592,14 +3787,14 @@
       </p:sp>
       <p:sp>
         <p:nvSpPr>
-          <p:cNvPr id="4" name="CaixaDeTexto 3"/>
+          <p:cNvPr id="5" name="CaixaDeTexto 4"/>
           <p:cNvSpPr txBox="1"/>
           <p:nvPr/>
         </p:nvSpPr>
         <p:spPr>
           <a:xfrm>
-            <a:off x="1000100" y="1785926"/>
-            <a:ext cx="7215238" cy="2585323"/>
+            <a:off x="1142976" y="1857364"/>
+            <a:ext cx="6929486" cy="3416320"/>
           </a:xfrm>
           <a:prstGeom prst="rect">
             <a:avLst/>
@@ -3614,56 +3809,124 @@
           <a:p>
             <a:r>
               <a:rPr lang="pt-BR" dirty="0" smtClean="0"/>
-              <a:t>Casos de testes projetados: 50</a:t>
-            </a:r>
-          </a:p>
-          <a:p>
+              <a:t>Foram aplicados os seguintes tipos de testes:</a:t>
+            </a:r>
+          </a:p>
+          <a:p>
+            <a:pPr marL="342900" indent="-342900">
+              <a:buFont typeface="+mj-lt"/>
+              <a:buAutoNum type="arabicPeriod"/>
+            </a:pPr>
+            <a:r>
+              <a:rPr lang="pt-BR" dirty="0" smtClean="0"/>
+              <a:t>Teste de Integridade dos Dados</a:t>
+            </a:r>
+          </a:p>
+          <a:p>
+            <a:pPr marL="342900" indent="-342900">
+              <a:buFont typeface="+mj-lt"/>
+              <a:buAutoNum type="arabicPeriod"/>
+            </a:pPr>
             <a:endParaRPr lang="pt-BR" dirty="0" smtClean="0"/>
           </a:p>
           <a:p>
+            <a:pPr marL="342900" indent="-342900">
+              <a:buFont typeface="+mj-lt"/>
+              <a:buAutoNum type="arabicPeriod"/>
+            </a:pPr>
             <a:r>
               <a:rPr lang="pt-BR" dirty="0" smtClean="0"/>
-              <a:t>Casos de </a:t>
-            </a:r>
+              <a:t>Teste Funcional</a:t>
+            </a:r>
+          </a:p>
+          <a:p>
+            <a:pPr marL="342900" indent="-342900">
+              <a:buFont typeface="+mj-lt"/>
+              <a:buAutoNum type="arabicPeriod"/>
+            </a:pPr>
+            <a:endParaRPr lang="pt-BR" dirty="0" smtClean="0"/>
+          </a:p>
+          <a:p>
+            <a:pPr marL="342900" indent="-342900">
+              <a:buFont typeface="+mj-lt"/>
+              <a:buAutoNum type="arabicPeriod"/>
+            </a:pPr>
             <a:r>
               <a:rPr lang="pt-BR" dirty="0" smtClean="0"/>
-              <a:t>testes executados: 50</a:t>
-            </a:r>
-          </a:p>
-          <a:p>
+              <a:t>Teste da Interface do Usuário</a:t>
+            </a:r>
+          </a:p>
+          <a:p>
+            <a:pPr marL="342900" indent="-342900">
+              <a:buFont typeface="+mj-lt"/>
+              <a:buAutoNum type="arabicPeriod"/>
+            </a:pPr>
             <a:endParaRPr lang="pt-BR" dirty="0" smtClean="0"/>
           </a:p>
           <a:p>
+            <a:pPr marL="342900" indent="-342900">
+              <a:buFont typeface="+mj-lt"/>
+              <a:buAutoNum type="arabicPeriod"/>
+            </a:pPr>
             <a:r>
               <a:rPr lang="pt-BR" dirty="0" smtClean="0"/>
-              <a:t>Aprovados: 28</a:t>
-            </a:r>
-          </a:p>
-          <a:p>
+              <a:t>Teste de Performance</a:t>
+            </a:r>
+          </a:p>
+          <a:p>
+            <a:pPr marL="342900" indent="-342900">
+              <a:buFont typeface="+mj-lt"/>
+              <a:buAutoNum type="arabicPeriod"/>
+            </a:pPr>
+            <a:endParaRPr lang="pt-BR" dirty="0" smtClean="0"/>
+          </a:p>
+          <a:p>
+            <a:pPr marL="342900" indent="-342900">
+              <a:buFont typeface="+mj-lt"/>
+              <a:buAutoNum type="arabicPeriod"/>
+            </a:pPr>
             <a:r>
               <a:rPr lang="pt-BR" dirty="0" smtClean="0"/>
-              <a:t>Reprovados: 18</a:t>
-            </a:r>
-          </a:p>
-          <a:p>
+              <a:t>Teste de Documentação</a:t>
+            </a:r>
+          </a:p>
+          <a:p>
+            <a:pPr marL="342900" indent="-342900">
+              <a:buFont typeface="+mj-lt"/>
+              <a:buAutoNum type="arabicPeriod"/>
+            </a:pPr>
+            <a:endParaRPr lang="pt-BR" dirty="0" smtClean="0"/>
+          </a:p>
+          <a:p>
+            <a:pPr marL="342900" indent="-342900">
+              <a:buFont typeface="+mj-lt"/>
+              <a:buAutoNum type="arabicPeriod"/>
+            </a:pPr>
             <a:r>
               <a:rPr lang="pt-BR" dirty="0" smtClean="0"/>
-              <a:t>Melhorias: 4</a:t>
-            </a:r>
-          </a:p>
-          <a:p>
+              <a:t>Teste de Instalação</a:t>
+            </a:r>
             <a:endParaRPr lang="pt-BR" dirty="0" smtClean="0"/>
           </a:p>
-          <a:p>
-            <a:endParaRPr lang="pt-BR" dirty="0"/>
-          </a:p>
         </p:txBody>
       </p:sp>
     </p:spTree>
+    <p:extLst>
+      <p:ext uri="{BB962C8B-B14F-4D97-AF65-F5344CB8AC3E}">
+        <p14:creationId xmlns:p14="http://schemas.microsoft.com/office/powerpoint/2010/main" val="2159869430"/>
+      </p:ext>
+    </p:extLst>
   </p:cSld>
   <p:clrMapOvr>
     <a:masterClrMapping/>
   </p:clrMapOvr>
+  <p:timing>
+    <p:tnLst>
+      <p:par>
+        <p:cTn id="1" dur="indefinite" restart="never" nodeType="tmRoot"/>
+      </p:par>
+    </p:tnLst>
+  </p:timing>
 </p:sld>
 </file>
 
@@ -3736,7 +3999,7 @@
                   <a:schemeClr val="bg1"/>
                 </a:solidFill>
               </a:rPr>
-              <a:t>Módulo Iniciar Jogo</a:t>
+              <a:t>Módulo Gerenciar</a:t>
             </a:r>
             <a:endParaRPr lang="pt-BR" sz="2800" dirty="0">
               <a:solidFill>
@@ -3748,14 +4011,14 @@
       </p:sp>
       <p:sp>
         <p:nvSpPr>
-          <p:cNvPr id="5" name="CaixaDeTexto 4"/>
+          <p:cNvPr id="4" name="CaixaDeTexto 3"/>
           <p:cNvSpPr txBox="1"/>
           <p:nvPr/>
         </p:nvSpPr>
         <p:spPr>
           <a:xfrm>
-            <a:off x="1142976" y="1857364"/>
-            <a:ext cx="6929486" cy="2031325"/>
+            <a:off x="1000100" y="1785926"/>
+            <a:ext cx="7215238" cy="2585323"/>
           </a:xfrm>
           <a:prstGeom prst="rect">
             <a:avLst/>
@@ -3770,63 +4033,44 @@
           <a:p>
             <a:r>
               <a:rPr lang="pt-BR" dirty="0" smtClean="0"/>
-              <a:t>Casos de testes projetados: </a:t>
-            </a:r>
+              <a:t>Casos de testes projetados: 50</a:t>
+            </a:r>
+          </a:p>
+          <a:p>
+            <a:endParaRPr lang="pt-BR" dirty="0" smtClean="0"/>
+          </a:p>
+          <a:p>
             <a:r>
               <a:rPr lang="pt-BR" dirty="0" smtClean="0"/>
-              <a:t>20</a:t>
-            </a:r>
+              <a:t>Casos de testes executados: 50</a:t>
+            </a:r>
+          </a:p>
+          <a:p>
             <a:endParaRPr lang="pt-BR" dirty="0" smtClean="0"/>
           </a:p>
           <a:p>
+            <a:r>
+              <a:rPr lang="pt-BR" dirty="0" smtClean="0"/>
+              <a:t>Aprovados: 28</a:t>
+            </a:r>
+          </a:p>
+          <a:p>
+            <a:r>
+              <a:rPr lang="pt-BR" dirty="0" smtClean="0"/>
+              <a:t>Reprovados: 18</a:t>
+            </a:r>
+          </a:p>
+          <a:p>
+            <a:r>
+              <a:rPr lang="pt-BR" dirty="0" smtClean="0"/>
+              <a:t>Melhorias: 4</a:t>
+            </a:r>
+          </a:p>
+          <a:p>
             <a:endParaRPr lang="pt-BR" dirty="0" smtClean="0"/>
           </a:p>
           <a:p>
-            <a:r>
-              <a:rPr lang="pt-BR" dirty="0" smtClean="0"/>
-              <a:t>Casos de testes executados: </a:t>
-            </a:r>
-            <a:r>
-              <a:rPr lang="pt-BR" dirty="0" smtClean="0"/>
-              <a:t>20</a:t>
-            </a:r>
-            <a:endParaRPr lang="pt-BR" dirty="0" smtClean="0"/>
-          </a:p>
-          <a:p>
-            <a:endParaRPr lang="pt-BR" dirty="0" smtClean="0"/>
-          </a:p>
-          <a:p>
-            <a:r>
-              <a:rPr lang="pt-BR" dirty="0" smtClean="0"/>
-              <a:t>Aprovados: </a:t>
-            </a:r>
-            <a:r>
-              <a:rPr lang="pt-BR" dirty="0" smtClean="0"/>
-              <a:t>13</a:t>
-            </a:r>
-            <a:endParaRPr lang="pt-BR" dirty="0" smtClean="0"/>
-          </a:p>
-          <a:p>
-            <a:r>
-              <a:rPr lang="pt-BR" dirty="0" smtClean="0"/>
-              <a:t>Reprovados: </a:t>
-            </a:r>
-            <a:r>
-              <a:rPr lang="pt-BR" dirty="0" smtClean="0"/>
-              <a:t>7</a:t>
-            </a:r>
-            <a:endParaRPr lang="pt-BR" dirty="0" smtClean="0"/>
-          </a:p>
-          <a:p>
-            <a:r>
-              <a:rPr lang="pt-BR" dirty="0" smtClean="0"/>
-              <a:t>Melhorias: </a:t>
-            </a:r>
-            <a:r>
-              <a:rPr lang="pt-BR" dirty="0" smtClean="0"/>
-              <a:t>0</a:t>
-            </a:r>
-            <a:endParaRPr lang="pt-BR" dirty="0" smtClean="0"/>
+            <a:endParaRPr lang="pt-BR" dirty="0"/>
           </a:p>
         </p:txBody>
       </p:sp>
@@ -3835,6 +4079,13 @@
   <p:clrMapOvr>
     <a:masterClrMapping/>
   </p:clrMapOvr>
+  <p:timing>
+    <p:tnLst>
+      <p:par>
+        <p:cTn id="1" dur="indefinite" restart="never" nodeType="tmRoot"/>
+      </p:par>
+    </p:tnLst>
+  </p:timing>
 </p:sld>
 </file>
 
@@ -3907,7 +4158,7 @@
                   <a:schemeClr val="bg1"/>
                 </a:solidFill>
               </a:rPr>
-              <a:t>Módulo Jogar</a:t>
+              <a:t>Módulo Iniciar Jogo</a:t>
             </a:r>
             <a:endParaRPr lang="pt-BR" sz="2800" dirty="0">
               <a:solidFill>
@@ -3941,53 +4192,38 @@
           <a:p>
             <a:r>
               <a:rPr lang="pt-BR" dirty="0" smtClean="0"/>
-              <a:t>Casos de testes projetados: </a:t>
-            </a:r>
+              <a:t>Casos de testes projetados: 20</a:t>
+            </a:r>
+          </a:p>
+          <a:p>
+            <a:endParaRPr lang="pt-BR" dirty="0" smtClean="0"/>
+          </a:p>
+          <a:p>
             <a:r>
               <a:rPr lang="pt-BR" dirty="0" smtClean="0"/>
-              <a:t>8</a:t>
-            </a:r>
+              <a:t>Casos de testes executados: 20</a:t>
+            </a:r>
+          </a:p>
+          <a:p>
             <a:endParaRPr lang="pt-BR" dirty="0" smtClean="0"/>
           </a:p>
           <a:p>
-            <a:endParaRPr lang="pt-BR" dirty="0" smtClean="0"/>
-          </a:p>
-          <a:p>
             <a:r>
               <a:rPr lang="pt-BR" dirty="0" smtClean="0"/>
-              <a:t>Casos de testes executados: 0</a:t>
-            </a:r>
-          </a:p>
-          <a:p>
-            <a:endParaRPr lang="pt-BR" dirty="0" smtClean="0"/>
+              <a:t>Aprovados: 13</a:t>
+            </a:r>
           </a:p>
           <a:p>
             <a:r>
               <a:rPr lang="pt-BR" dirty="0" smtClean="0"/>
-              <a:t>Aprovados: 0</a:t>
+              <a:t>Reprovados: 7</a:t>
             </a:r>
           </a:p>
           <a:p>
             <a:r>
               <a:rPr lang="pt-BR" dirty="0" smtClean="0"/>
-              <a:t>Reprovados: </a:t>
-            </a:r>
-            <a:r>
-              <a:rPr lang="pt-BR" dirty="0" smtClean="0"/>
-              <a:t>0</a:t>
-            </a:r>
-            <a:endParaRPr lang="pt-BR" dirty="0" smtClean="0"/>
-          </a:p>
-          <a:p>
-            <a:r>
-              <a:rPr lang="pt-BR" dirty="0" smtClean="0"/>
-              <a:t>Melhorias: </a:t>
-            </a:r>
-            <a:r>
-              <a:rPr lang="pt-BR" dirty="0" smtClean="0"/>
-              <a:t>0</a:t>
-            </a:r>
-            <a:endParaRPr lang="pt-BR" dirty="0" smtClean="0"/>
+              <a:t>Melhorias: 0</a:t>
+            </a:r>
           </a:p>
         </p:txBody>
       </p:sp>
@@ -3996,6 +4232,13 @@
   <p:clrMapOvr>
     <a:masterClrMapping/>
   </p:clrMapOvr>
+  <p:timing>
+    <p:tnLst>
+      <p:par>
+        <p:cTn id="1" dur="indefinite" restart="never" nodeType="tmRoot"/>
+      </p:par>
+    </p:tnLst>
+  </p:timing>
 </p:sld>
 </file>
 
@@ -4068,7 +4311,7 @@
                   <a:schemeClr val="bg1"/>
                 </a:solidFill>
               </a:rPr>
-              <a:t>Módulo Interface Gráfica</a:t>
+              <a:t>Módulo Jogar</a:t>
             </a:r>
             <a:endParaRPr lang="pt-BR" sz="2800" dirty="0">
               <a:solidFill>
@@ -4102,7 +4345,7 @@
           <a:p>
             <a:r>
               <a:rPr lang="pt-BR" dirty="0" smtClean="0"/>
-              <a:t>Casos de testes projetados: 9</a:t>
+              <a:t>Casos de testes projetados: 8</a:t>
             </a:r>
           </a:p>
           <a:p>
@@ -4126,24 +4369,14 @@
           <a:p>
             <a:r>
               <a:rPr lang="pt-BR" dirty="0" smtClean="0"/>
-              <a:t>Reprovados: </a:t>
-            </a:r>
+              <a:t>Reprovados: 0</a:t>
+            </a:r>
+          </a:p>
+          <a:p>
             <a:r>
               <a:rPr lang="pt-BR" dirty="0" smtClean="0"/>
-              <a:t>0</a:t>
-            </a:r>
-            <a:endParaRPr lang="pt-BR" dirty="0" smtClean="0"/>
-          </a:p>
-          <a:p>
-            <a:r>
-              <a:rPr lang="pt-BR" dirty="0" smtClean="0"/>
-              <a:t>Melhorias: </a:t>
-            </a:r>
-            <a:r>
-              <a:rPr lang="pt-BR" dirty="0" smtClean="0"/>
-              <a:t>0</a:t>
-            </a:r>
-            <a:endParaRPr lang="pt-BR" dirty="0" smtClean="0"/>
+              <a:t>Melhorias: 0</a:t>
+            </a:r>
           </a:p>
         </p:txBody>
       </p:sp>
@@ -4152,6 +4385,13 @@
   <p:clrMapOvr>
     <a:masterClrMapping/>
   </p:clrMapOvr>
+  <p:timing>
+    <p:tnLst>
+      <p:par>
+        <p:cTn id="1" dur="indefinite" restart="never" nodeType="tmRoot"/>
+      </p:par>
+    </p:tnLst>
+  </p:timing>
 </p:sld>
 </file>
 
@@ -4174,11 +4414,13 @@
       </p:grpSpPr>
       <p:pic>
         <p:nvPicPr>
-          <p:cNvPr id="2" name="Imagem 1" descr="Nova140722(ppt_novaroma)B-3.jpg"/>
+          <p:cNvPr id="7" name="Espaço Reservado para Conteúdo 6" descr="Nova140722(ppt_novaroma)B-2.jpg"/>
           <p:cNvPicPr>
-            <a:picLocks noChangeAspect="1"/>
+            <a:picLocks noGrp="1" noChangeAspect="1"/>
           </p:cNvPicPr>
-          <p:nvPr/>
+          <p:nvPr>
+            <p:ph idx="1"/>
+          </p:nvPr>
         </p:nvPicPr>
         <p:blipFill>
           <a:blip r:embed="rId2"/>
@@ -4191,16 +4433,322 @@
             <a:off x="0" y="0"/>
             <a:ext cx="9144000" cy="6858000"/>
           </a:xfrm>
+        </p:spPr>
+      </p:pic>
+      <p:sp>
+        <p:nvSpPr>
+          <p:cNvPr id="2" name="Título 1"/>
+          <p:cNvSpPr>
+            <a:spLocks noGrp="1"/>
+          </p:cNvSpPr>
+          <p:nvPr>
+            <p:ph type="title"/>
+          </p:nvPr>
+        </p:nvSpPr>
+        <p:spPr>
+          <a:xfrm>
+            <a:off x="714348" y="357166"/>
+            <a:ext cx="5214974" cy="642942"/>
+          </a:xfrm>
+        </p:spPr>
+        <p:txBody>
+          <a:bodyPr>
+            <a:normAutofit/>
+          </a:bodyPr>
+          <a:lstStyle/>
+          <a:p>
+            <a:pPr algn="l"/>
+            <a:r>
+              <a:rPr lang="pt-BR" sz="2800" dirty="0" smtClean="0">
+                <a:solidFill>
+                  <a:schemeClr val="bg1"/>
+                </a:solidFill>
+              </a:rPr>
+              <a:t>Módulo Interface Gráfica</a:t>
+            </a:r>
+            <a:endParaRPr lang="pt-BR" sz="2800" dirty="0">
+              <a:solidFill>
+                <a:schemeClr val="bg1"/>
+              </a:solidFill>
+            </a:endParaRPr>
+          </a:p>
+        </p:txBody>
+      </p:sp>
+      <p:sp>
+        <p:nvSpPr>
+          <p:cNvPr id="5" name="CaixaDeTexto 4"/>
+          <p:cNvSpPr txBox="1"/>
+          <p:nvPr/>
+        </p:nvSpPr>
+        <p:spPr>
+          <a:xfrm>
+            <a:off x="1142976" y="1857364"/>
+            <a:ext cx="6929486" cy="2031325"/>
+          </a:xfrm>
           <a:prstGeom prst="rect">
             <a:avLst/>
           </a:prstGeom>
-        </p:spPr>
-      </p:pic>
+          <a:noFill/>
+        </p:spPr>
+        <p:txBody>
+          <a:bodyPr wrap="square" rtlCol="0">
+            <a:spAutoFit/>
+          </a:bodyPr>
+          <a:lstStyle/>
+          <a:p>
+            <a:r>
+              <a:rPr lang="pt-BR" dirty="0" smtClean="0"/>
+              <a:t>Casos de testes projetados: 9</a:t>
+            </a:r>
+          </a:p>
+          <a:p>
+            <a:endParaRPr lang="pt-BR" dirty="0" smtClean="0"/>
+          </a:p>
+          <a:p>
+            <a:r>
+              <a:rPr lang="pt-BR" dirty="0" smtClean="0"/>
+              <a:t>Casos de testes executados: 0</a:t>
+            </a:r>
+          </a:p>
+          <a:p>
+            <a:endParaRPr lang="pt-BR" dirty="0" smtClean="0"/>
+          </a:p>
+          <a:p>
+            <a:r>
+              <a:rPr lang="pt-BR" dirty="0" smtClean="0"/>
+              <a:t>Aprovados: 0</a:t>
+            </a:r>
+          </a:p>
+          <a:p>
+            <a:r>
+              <a:rPr lang="pt-BR" dirty="0" smtClean="0"/>
+              <a:t>Reprovados: 0</a:t>
+            </a:r>
+          </a:p>
+          <a:p>
+            <a:r>
+              <a:rPr lang="pt-BR" dirty="0" smtClean="0"/>
+              <a:t>Melhorias: 0</a:t>
+            </a:r>
+          </a:p>
+        </p:txBody>
+      </p:sp>
     </p:spTree>
   </p:cSld>
   <p:clrMapOvr>
     <a:masterClrMapping/>
   </p:clrMapOvr>
+  <p:timing>
+    <p:tnLst>
+      <p:par>
+        <p:cTn id="1" dur="indefinite" restart="never" nodeType="tmRoot"/>
+      </p:par>
+    </p:tnLst>
+  </p:timing>
+</p:sld>
+</file>
+
+<file path=ppt/slides/slide9.xml><?xml version="1.0" encoding="utf-8"?>
+<p:sld xmlns:a="http://schemas.openxmlformats.org/drawingml/2006/main" xmlns:r="http://schemas.openxmlformats.org/officeDocument/2006/relationships" xmlns:p="http://schemas.openxmlformats.org/presentationml/2006/main">
+  <p:cSld>
+    <p:spTree>
+      <p:nvGrpSpPr>
+        <p:cNvPr id="1" name=""/>
+        <p:cNvGrpSpPr/>
+        <p:nvPr/>
+      </p:nvGrpSpPr>
+      <p:grpSpPr>
+        <a:xfrm>
+          <a:off x="0" y="0"/>
+          <a:ext cx="0" cy="0"/>
+          <a:chOff x="0" y="0"/>
+          <a:chExt cx="0" cy="0"/>
+        </a:xfrm>
+      </p:grpSpPr>
+      <p:pic>
+        <p:nvPicPr>
+          <p:cNvPr id="7" name="Espaço Reservado para Conteúdo 6" descr="Nova140722(ppt_novaroma)B-2.jpg"/>
+          <p:cNvPicPr>
+            <a:picLocks noGrp="1" noChangeAspect="1"/>
+          </p:cNvPicPr>
+          <p:nvPr>
+            <p:ph idx="1"/>
+          </p:nvPr>
+        </p:nvPicPr>
+        <p:blipFill>
+          <a:blip r:embed="rId2"/>
+          <a:stretch>
+            <a:fillRect/>
+          </a:stretch>
+        </p:blipFill>
+        <p:spPr>
+          <a:xfrm>
+            <a:off x="0" y="0"/>
+            <a:ext cx="9144000" cy="6858000"/>
+          </a:xfrm>
+        </p:spPr>
+      </p:pic>
+      <p:sp>
+        <p:nvSpPr>
+          <p:cNvPr id="2" name="Título 1"/>
+          <p:cNvSpPr>
+            <a:spLocks noGrp="1"/>
+          </p:cNvSpPr>
+          <p:nvPr>
+            <p:ph type="title"/>
+          </p:nvPr>
+        </p:nvSpPr>
+        <p:spPr>
+          <a:xfrm>
+            <a:off x="714348" y="357166"/>
+            <a:ext cx="5214974" cy="642942"/>
+          </a:xfrm>
+        </p:spPr>
+        <p:txBody>
+          <a:bodyPr>
+            <a:normAutofit/>
+          </a:bodyPr>
+          <a:lstStyle/>
+          <a:p>
+            <a:pPr algn="l"/>
+            <a:r>
+              <a:rPr lang="pt-BR" sz="2300" dirty="0" smtClean="0">
+                <a:solidFill>
+                  <a:schemeClr val="bg1"/>
+                </a:solidFill>
+              </a:rPr>
+              <a:t>Ambiente de teste</a:t>
+            </a:r>
+            <a:endParaRPr lang="pt-BR" sz="2300" dirty="0">
+              <a:solidFill>
+                <a:schemeClr val="bg1"/>
+              </a:solidFill>
+            </a:endParaRPr>
+          </a:p>
+        </p:txBody>
+      </p:sp>
+      <p:sp>
+        <p:nvSpPr>
+          <p:cNvPr id="5" name="CaixaDeTexto 4"/>
+          <p:cNvSpPr txBox="1"/>
+          <p:nvPr/>
+        </p:nvSpPr>
+        <p:spPr>
+          <a:xfrm>
+            <a:off x="1142976" y="1857364"/>
+            <a:ext cx="6929486" cy="3139321"/>
+          </a:xfrm>
+          <a:prstGeom prst="rect">
+            <a:avLst/>
+          </a:prstGeom>
+          <a:noFill/>
+        </p:spPr>
+        <p:txBody>
+          <a:bodyPr wrap="square" rtlCol="0">
+            <a:spAutoFit/>
+          </a:bodyPr>
+          <a:lstStyle/>
+          <a:p>
+            <a:r>
+              <a:rPr lang="pt-BR" dirty="0" smtClean="0"/>
+              <a:t>Para a realização dos testes previstos:</a:t>
+            </a:r>
+          </a:p>
+          <a:p>
+            <a:pPr marL="342900" indent="-342900">
+              <a:buFont typeface="Arial" panose="020B0604020202020204" pitchFamily="34" charset="0"/>
+              <a:buChar char="•"/>
+            </a:pPr>
+            <a:r>
+              <a:rPr lang="pt-BR" dirty="0" smtClean="0"/>
+              <a:t>Foram utilizadas as seguintes ferramentas:</a:t>
+            </a:r>
+          </a:p>
+          <a:p>
+            <a:pPr marL="800100" lvl="1" indent="-342900">
+              <a:buFont typeface="+mj-lt"/>
+              <a:buAutoNum type="arabicPeriod"/>
+            </a:pPr>
+            <a:r>
+              <a:rPr lang="pt-BR" dirty="0" smtClean="0"/>
+              <a:t>Microsoft Word, Excel e PowerPoint 2013, para elaboração de plano, projeto</a:t>
+            </a:r>
+            <a:r>
+              <a:rPr lang="pt-BR" dirty="0"/>
+              <a:t> </a:t>
+            </a:r>
+            <a:r>
+              <a:rPr lang="pt-BR" dirty="0" smtClean="0"/>
+              <a:t>e avaliação dos testes, além de outros documentos, como o de Solicitação de Mudanças;</a:t>
+            </a:r>
+          </a:p>
+          <a:p>
+            <a:pPr marL="800100" lvl="1" indent="-342900">
+              <a:buFont typeface="+mj-lt"/>
+              <a:buAutoNum type="arabicPeriod"/>
+            </a:pPr>
+            <a:r>
+              <a:rPr lang="pt-BR" dirty="0" err="1" smtClean="0"/>
+              <a:t>GitHub</a:t>
+            </a:r>
+            <a:r>
+              <a:rPr lang="pt-BR" dirty="0" smtClean="0"/>
+              <a:t> na sua versão para desktop , para o gerenciamento de configuração dos documentos utilizados.</a:t>
+            </a:r>
+            <a:endParaRPr lang="pt-BR" dirty="0"/>
+          </a:p>
+          <a:p>
+            <a:endParaRPr lang="pt-BR" dirty="0"/>
+          </a:p>
+          <a:p>
+            <a:pPr marL="342900" indent="-342900">
+              <a:buFont typeface="Arial" panose="020B0604020202020204" pitchFamily="34" charset="0"/>
+              <a:buChar char="•"/>
+            </a:pPr>
+            <a:r>
+              <a:rPr lang="pt-BR" dirty="0" smtClean="0"/>
+              <a:t>Foram necessários os seguintes componentes:</a:t>
+            </a:r>
+          </a:p>
+          <a:p>
+            <a:pPr marL="800100" lvl="1" indent="-342900">
+              <a:buFont typeface="+mj-lt"/>
+              <a:buAutoNum type="arabicPeriod"/>
+            </a:pPr>
+            <a:r>
+              <a:rPr lang="pt-BR" dirty="0" smtClean="0"/>
+              <a:t>Notebook com Windows 8 instalado;</a:t>
+            </a:r>
+          </a:p>
+          <a:p>
+            <a:pPr marL="800100" lvl="1" indent="-342900">
+              <a:buFont typeface="+mj-lt"/>
+              <a:buAutoNum type="arabicPeriod"/>
+            </a:pPr>
+            <a:r>
+              <a:rPr lang="pt-BR" dirty="0" smtClean="0"/>
+              <a:t>Computador com Windows 7 instalado;</a:t>
+            </a:r>
+          </a:p>
+        </p:txBody>
+      </p:sp>
+    </p:spTree>
+    <p:extLst>
+      <p:ext uri="{BB962C8B-B14F-4D97-AF65-F5344CB8AC3E}">
+        <p14:creationId xmlns:p14="http://schemas.microsoft.com/office/powerpoint/2010/main" val="3056095027"/>
+      </p:ext>
+    </p:extLst>
+  </p:cSld>
+  <p:clrMapOvr>
+    <a:masterClrMapping/>
+  </p:clrMapOvr>
+  <p:timing>
+    <p:tnLst>
+      <p:par>
+        <p:cTn id="1" dur="indefinite" restart="never" nodeType="tmRoot"/>
+      </p:par>
+    </p:tnLst>
+  </p:timing>
 </p:sld>
 </file>
 

</xml_diff>

<commit_message>
Alteração na Avaliação de Testes
Inclusão do Gráfico dos CTs.
Inclusão de Cobertura de Testes.
</commit_message>
<xml_diff>
--- a/FINDERRORS_-_Avaliação_dos_Testes.pptx
+++ b/FINDERRORS_-_Avaliação_dos_Testes.pptx
@@ -13,9 +13,11 @@
     <p:sldId id="261" r:id="rId7"/>
     <p:sldId id="262" r:id="rId8"/>
     <p:sldId id="263" r:id="rId9"/>
-    <p:sldId id="265" r:id="rId10"/>
-    <p:sldId id="266" r:id="rId11"/>
-    <p:sldId id="258" r:id="rId12"/>
+    <p:sldId id="268" r:id="rId10"/>
+    <p:sldId id="267" r:id="rId11"/>
+    <p:sldId id="266" r:id="rId12"/>
+    <p:sldId id="269" r:id="rId13"/>
+    <p:sldId id="258" r:id="rId14"/>
   </p:sldIdLst>
   <p:sldSz cx="9144000" cy="6858000" type="screen4x3"/>
   <p:notesSz cx="6858000" cy="9144000"/>
@@ -131,6 +133,1458 @@
     </p:ext>
   </p:extLst>
 </p:presentation>
+</file>
+
+<file path=ppt/charts/chart1.xml><?xml version="1.0" encoding="utf-8"?>
+<c:chartSpace xmlns:c="http://schemas.openxmlformats.org/drawingml/2006/chart" xmlns:a="http://schemas.openxmlformats.org/drawingml/2006/main" xmlns:r="http://schemas.openxmlformats.org/officeDocument/2006/relationships">
+  <c:date1904 val="0"/>
+  <c:lang val="pt-BR"/>
+  <c:roundedCorners val="0"/>
+  <mc:AlternateContent xmlns:mc="http://schemas.openxmlformats.org/markup-compatibility/2006">
+    <mc:Choice xmlns:c14="http://schemas.microsoft.com/office/drawing/2007/8/2/chart" Requires="c14">
+      <c14:style val="102"/>
+    </mc:Choice>
+    <mc:Fallback>
+      <c:style val="2"/>
+    </mc:Fallback>
+  </mc:AlternateContent>
+  <c:chart>
+    <c:title>
+      <c:tx>
+        <c:rich>
+          <a:bodyPr rot="0" spcFirstLastPara="1" vertOverflow="ellipsis" vert="horz" wrap="square" anchor="ctr" anchorCtr="1"/>
+          <a:lstStyle/>
+          <a:p>
+            <a:pPr>
+              <a:defRPr sz="1800" b="1" i="0" u="none" strike="noStrike" kern="1200" cap="none" baseline="0">
+                <a:solidFill>
+                  <a:schemeClr val="lt1">
+                    <a:lumMod val="85000"/>
+                  </a:schemeClr>
+                </a:solidFill>
+                <a:latin typeface="+mn-lt"/>
+                <a:ea typeface="+mn-ea"/>
+                <a:cs typeface="+mn-cs"/>
+              </a:defRPr>
+            </a:pPr>
+            <a:r>
+              <a:rPr lang="pt-BR" sz="1800"/>
+              <a:t>Resultado Geral dos</a:t>
+            </a:r>
+            <a:r>
+              <a:rPr lang="pt-BR" sz="1800" baseline="0"/>
+              <a:t> Testes</a:t>
+            </a:r>
+          </a:p>
+        </c:rich>
+      </c:tx>
+      <c:layout/>
+      <c:overlay val="0"/>
+      <c:spPr>
+        <a:noFill/>
+        <a:ln>
+          <a:noFill/>
+        </a:ln>
+        <a:effectLst/>
+      </c:spPr>
+      <c:txPr>
+        <a:bodyPr rot="0" spcFirstLastPara="1" vertOverflow="ellipsis" vert="horz" wrap="square" anchor="ctr" anchorCtr="1"/>
+        <a:lstStyle/>
+        <a:p>
+          <a:pPr>
+            <a:defRPr sz="1800" b="1" i="0" u="none" strike="noStrike" kern="1200" cap="none" baseline="0">
+              <a:solidFill>
+                <a:schemeClr val="lt1">
+                  <a:lumMod val="85000"/>
+                </a:schemeClr>
+              </a:solidFill>
+              <a:latin typeface="+mn-lt"/>
+              <a:ea typeface="+mn-ea"/>
+              <a:cs typeface="+mn-cs"/>
+            </a:defRPr>
+          </a:pPr>
+          <a:endParaRPr lang="pt-BR"/>
+        </a:p>
+      </c:txPr>
+    </c:title>
+    <c:autoTitleDeleted val="0"/>
+    <c:plotArea>
+      <c:layout/>
+      <c:lineChart>
+        <c:grouping val="standard"/>
+        <c:varyColors val="0"/>
+        <c:ser>
+          <c:idx val="0"/>
+          <c:order val="0"/>
+          <c:tx>
+            <c:strRef>
+              <c:f>Plan1!$I$6</c:f>
+              <c:strCache>
+                <c:ptCount val="1"/>
+                <c:pt idx="0">
+                  <c:v>Gerenciar</c:v>
+                </c:pt>
+              </c:strCache>
+            </c:strRef>
+          </c:tx>
+          <c:spPr>
+            <a:ln w="22225" cap="rnd">
+              <a:solidFill>
+                <a:schemeClr val="accent1"/>
+              </a:solidFill>
+            </a:ln>
+            <a:effectLst>
+              <a:glow rad="139700">
+                <a:schemeClr val="accent1">
+                  <a:satMod val="175000"/>
+                  <a:alpha val="14000"/>
+                </a:schemeClr>
+              </a:glow>
+            </a:effectLst>
+          </c:spPr>
+          <c:marker>
+            <c:symbol val="none"/>
+          </c:marker>
+          <c:dLbls>
+            <c:spPr>
+              <a:noFill/>
+              <a:ln>
+                <a:noFill/>
+              </a:ln>
+              <a:effectLst/>
+            </c:spPr>
+            <c:txPr>
+              <a:bodyPr rot="0" spcFirstLastPara="1" vertOverflow="ellipsis" vert="horz" wrap="square" lIns="38100" tIns="19050" rIns="38100" bIns="19050" anchor="ctr" anchorCtr="1">
+                <a:spAutoFit/>
+              </a:bodyPr>
+              <a:lstStyle/>
+              <a:p>
+                <a:pPr>
+                  <a:defRPr sz="900" b="0" i="0" u="none" strike="noStrike" kern="1200" baseline="0">
+                    <a:solidFill>
+                      <a:schemeClr val="lt1">
+                        <a:lumMod val="75000"/>
+                      </a:schemeClr>
+                    </a:solidFill>
+                    <a:latin typeface="+mn-lt"/>
+                    <a:ea typeface="+mn-ea"/>
+                    <a:cs typeface="+mn-cs"/>
+                  </a:defRPr>
+                </a:pPr>
+                <a:endParaRPr lang="pt-BR"/>
+              </a:p>
+            </c:txPr>
+            <c:showLegendKey val="0"/>
+            <c:showVal val="1"/>
+            <c:showCatName val="0"/>
+            <c:showSerName val="0"/>
+            <c:showPercent val="0"/>
+            <c:showBubbleSize val="0"/>
+            <c:showLeaderLines val="0"/>
+            <c:extLst>
+              <c:ext xmlns:c15="http://schemas.microsoft.com/office/drawing/2012/chart" uri="{CE6537A1-D6FC-4f65-9D91-7224C49458BB}">
+                <c15:layout/>
+                <c15:showLeaderLines val="1"/>
+                <c15:leaderLines>
+                  <c:spPr>
+                    <a:ln w="9525">
+                      <a:solidFill>
+                        <a:schemeClr val="lt1">
+                          <a:lumMod val="50000"/>
+                        </a:schemeClr>
+                      </a:solidFill>
+                      <a:round/>
+                    </a:ln>
+                    <a:effectLst/>
+                  </c:spPr>
+                </c15:leaderLines>
+              </c:ext>
+            </c:extLst>
+          </c:dLbls>
+          <c:cat>
+            <c:strRef>
+              <c:f>Plan1!$H$7:$H$11</c:f>
+              <c:strCache>
+                <c:ptCount val="5"/>
+                <c:pt idx="0">
+                  <c:v>Projetados</c:v>
+                </c:pt>
+                <c:pt idx="1">
+                  <c:v>Executados</c:v>
+                </c:pt>
+                <c:pt idx="2">
+                  <c:v>Aprovados</c:v>
+                </c:pt>
+                <c:pt idx="3">
+                  <c:v>Reprovados</c:v>
+                </c:pt>
+                <c:pt idx="4">
+                  <c:v>Melhorias</c:v>
+                </c:pt>
+              </c:strCache>
+            </c:strRef>
+          </c:cat>
+          <c:val>
+            <c:numRef>
+              <c:f>Plan1!$I$7:$I$11</c:f>
+              <c:numCache>
+                <c:formatCode>General</c:formatCode>
+                <c:ptCount val="5"/>
+                <c:pt idx="0">
+                  <c:v>50</c:v>
+                </c:pt>
+                <c:pt idx="1">
+                  <c:v>50</c:v>
+                </c:pt>
+                <c:pt idx="2">
+                  <c:v>28</c:v>
+                </c:pt>
+                <c:pt idx="3">
+                  <c:v>18</c:v>
+                </c:pt>
+                <c:pt idx="4">
+                  <c:v>4</c:v>
+                </c:pt>
+              </c:numCache>
+            </c:numRef>
+          </c:val>
+          <c:smooth val="0"/>
+        </c:ser>
+        <c:ser>
+          <c:idx val="1"/>
+          <c:order val="1"/>
+          <c:tx>
+            <c:strRef>
+              <c:f>Plan1!$J$6</c:f>
+              <c:strCache>
+                <c:ptCount val="1"/>
+                <c:pt idx="0">
+                  <c:v>Iniciar</c:v>
+                </c:pt>
+              </c:strCache>
+            </c:strRef>
+          </c:tx>
+          <c:spPr>
+            <a:ln w="22225" cap="rnd">
+              <a:solidFill>
+                <a:schemeClr val="accent2"/>
+              </a:solidFill>
+            </a:ln>
+            <a:effectLst>
+              <a:glow rad="139700">
+                <a:schemeClr val="accent2">
+                  <a:satMod val="175000"/>
+                  <a:alpha val="14000"/>
+                </a:schemeClr>
+              </a:glow>
+            </a:effectLst>
+          </c:spPr>
+          <c:marker>
+            <c:symbol val="none"/>
+          </c:marker>
+          <c:dLbls>
+            <c:spPr>
+              <a:noFill/>
+              <a:ln>
+                <a:noFill/>
+              </a:ln>
+              <a:effectLst/>
+            </c:spPr>
+            <c:txPr>
+              <a:bodyPr rot="0" spcFirstLastPara="1" vertOverflow="ellipsis" vert="horz" wrap="square" lIns="38100" tIns="19050" rIns="38100" bIns="19050" anchor="ctr" anchorCtr="1">
+                <a:spAutoFit/>
+              </a:bodyPr>
+              <a:lstStyle/>
+              <a:p>
+                <a:pPr>
+                  <a:defRPr sz="900" b="0" i="0" u="none" strike="noStrike" kern="1200" baseline="0">
+                    <a:solidFill>
+                      <a:schemeClr val="lt1">
+                        <a:lumMod val="75000"/>
+                      </a:schemeClr>
+                    </a:solidFill>
+                    <a:latin typeface="+mn-lt"/>
+                    <a:ea typeface="+mn-ea"/>
+                    <a:cs typeface="+mn-cs"/>
+                  </a:defRPr>
+                </a:pPr>
+                <a:endParaRPr lang="pt-BR"/>
+              </a:p>
+            </c:txPr>
+            <c:showLegendKey val="0"/>
+            <c:showVal val="1"/>
+            <c:showCatName val="0"/>
+            <c:showSerName val="0"/>
+            <c:showPercent val="0"/>
+            <c:showBubbleSize val="0"/>
+            <c:showLeaderLines val="0"/>
+            <c:extLst>
+              <c:ext xmlns:c15="http://schemas.microsoft.com/office/drawing/2012/chart" uri="{CE6537A1-D6FC-4f65-9D91-7224C49458BB}">
+                <c15:layout/>
+                <c15:showLeaderLines val="1"/>
+                <c15:leaderLines>
+                  <c:spPr>
+                    <a:ln w="9525">
+                      <a:solidFill>
+                        <a:schemeClr val="lt1">
+                          <a:lumMod val="50000"/>
+                        </a:schemeClr>
+                      </a:solidFill>
+                      <a:round/>
+                    </a:ln>
+                    <a:effectLst/>
+                  </c:spPr>
+                </c15:leaderLines>
+              </c:ext>
+            </c:extLst>
+          </c:dLbls>
+          <c:cat>
+            <c:strRef>
+              <c:f>Plan1!$H$7:$H$11</c:f>
+              <c:strCache>
+                <c:ptCount val="5"/>
+                <c:pt idx="0">
+                  <c:v>Projetados</c:v>
+                </c:pt>
+                <c:pt idx="1">
+                  <c:v>Executados</c:v>
+                </c:pt>
+                <c:pt idx="2">
+                  <c:v>Aprovados</c:v>
+                </c:pt>
+                <c:pt idx="3">
+                  <c:v>Reprovados</c:v>
+                </c:pt>
+                <c:pt idx="4">
+                  <c:v>Melhorias</c:v>
+                </c:pt>
+              </c:strCache>
+            </c:strRef>
+          </c:cat>
+          <c:val>
+            <c:numRef>
+              <c:f>Plan1!$J$7:$J$11</c:f>
+              <c:numCache>
+                <c:formatCode>General</c:formatCode>
+                <c:ptCount val="5"/>
+                <c:pt idx="0">
+                  <c:v>20</c:v>
+                </c:pt>
+                <c:pt idx="1">
+                  <c:v>20</c:v>
+                </c:pt>
+                <c:pt idx="2">
+                  <c:v>13</c:v>
+                </c:pt>
+                <c:pt idx="3">
+                  <c:v>7</c:v>
+                </c:pt>
+                <c:pt idx="4">
+                  <c:v>0</c:v>
+                </c:pt>
+              </c:numCache>
+            </c:numRef>
+          </c:val>
+          <c:smooth val="0"/>
+        </c:ser>
+        <c:ser>
+          <c:idx val="2"/>
+          <c:order val="2"/>
+          <c:tx>
+            <c:strRef>
+              <c:f>Plan1!$K$6</c:f>
+              <c:strCache>
+                <c:ptCount val="1"/>
+                <c:pt idx="0">
+                  <c:v>Jogar</c:v>
+                </c:pt>
+              </c:strCache>
+            </c:strRef>
+          </c:tx>
+          <c:spPr>
+            <a:ln w="22225" cap="rnd">
+              <a:solidFill>
+                <a:schemeClr val="accent3"/>
+              </a:solidFill>
+            </a:ln>
+            <a:effectLst>
+              <a:glow rad="139700">
+                <a:schemeClr val="accent3">
+                  <a:satMod val="175000"/>
+                  <a:alpha val="14000"/>
+                </a:schemeClr>
+              </a:glow>
+            </a:effectLst>
+          </c:spPr>
+          <c:marker>
+            <c:symbol val="none"/>
+          </c:marker>
+          <c:dLbls>
+            <c:spPr>
+              <a:noFill/>
+              <a:ln>
+                <a:noFill/>
+              </a:ln>
+              <a:effectLst/>
+            </c:spPr>
+            <c:txPr>
+              <a:bodyPr rot="0" spcFirstLastPara="1" vertOverflow="ellipsis" vert="horz" wrap="square" lIns="38100" tIns="19050" rIns="38100" bIns="19050" anchor="ctr" anchorCtr="1">
+                <a:spAutoFit/>
+              </a:bodyPr>
+              <a:lstStyle/>
+              <a:p>
+                <a:pPr>
+                  <a:defRPr sz="900" b="0" i="0" u="none" strike="noStrike" kern="1200" baseline="0">
+                    <a:solidFill>
+                      <a:schemeClr val="lt1">
+                        <a:lumMod val="75000"/>
+                      </a:schemeClr>
+                    </a:solidFill>
+                    <a:latin typeface="+mn-lt"/>
+                    <a:ea typeface="+mn-ea"/>
+                    <a:cs typeface="+mn-cs"/>
+                  </a:defRPr>
+                </a:pPr>
+                <a:endParaRPr lang="pt-BR"/>
+              </a:p>
+            </c:txPr>
+            <c:dLblPos val="ctr"/>
+            <c:showLegendKey val="0"/>
+            <c:showVal val="1"/>
+            <c:showCatName val="0"/>
+            <c:showSerName val="0"/>
+            <c:showPercent val="0"/>
+            <c:showBubbleSize val="0"/>
+            <c:showLeaderLines val="0"/>
+            <c:extLst>
+              <c:ext xmlns:c15="http://schemas.microsoft.com/office/drawing/2012/chart" uri="{CE6537A1-D6FC-4f65-9D91-7224C49458BB}">
+                <c15:layout/>
+                <c15:showLeaderLines val="1"/>
+                <c15:leaderLines>
+                  <c:spPr>
+                    <a:ln w="9525">
+                      <a:solidFill>
+                        <a:schemeClr val="lt1">
+                          <a:lumMod val="50000"/>
+                        </a:schemeClr>
+                      </a:solidFill>
+                      <a:round/>
+                    </a:ln>
+                    <a:effectLst/>
+                  </c:spPr>
+                </c15:leaderLines>
+              </c:ext>
+            </c:extLst>
+          </c:dLbls>
+          <c:cat>
+            <c:strRef>
+              <c:f>Plan1!$H$7:$H$11</c:f>
+              <c:strCache>
+                <c:ptCount val="5"/>
+                <c:pt idx="0">
+                  <c:v>Projetados</c:v>
+                </c:pt>
+                <c:pt idx="1">
+                  <c:v>Executados</c:v>
+                </c:pt>
+                <c:pt idx="2">
+                  <c:v>Aprovados</c:v>
+                </c:pt>
+                <c:pt idx="3">
+                  <c:v>Reprovados</c:v>
+                </c:pt>
+                <c:pt idx="4">
+                  <c:v>Melhorias</c:v>
+                </c:pt>
+              </c:strCache>
+            </c:strRef>
+          </c:cat>
+          <c:val>
+            <c:numRef>
+              <c:f>Plan1!$K$7:$K$11</c:f>
+              <c:numCache>
+                <c:formatCode>General</c:formatCode>
+                <c:ptCount val="5"/>
+                <c:pt idx="0">
+                  <c:v>8</c:v>
+                </c:pt>
+                <c:pt idx="1">
+                  <c:v>0</c:v>
+                </c:pt>
+                <c:pt idx="2">
+                  <c:v>0</c:v>
+                </c:pt>
+                <c:pt idx="3">
+                  <c:v>0</c:v>
+                </c:pt>
+                <c:pt idx="4">
+                  <c:v>0</c:v>
+                </c:pt>
+              </c:numCache>
+            </c:numRef>
+          </c:val>
+          <c:smooth val="0"/>
+        </c:ser>
+        <c:ser>
+          <c:idx val="3"/>
+          <c:order val="3"/>
+          <c:tx>
+            <c:strRef>
+              <c:f>Plan1!$L$6</c:f>
+              <c:strCache>
+                <c:ptCount val="1"/>
+                <c:pt idx="0">
+                  <c:v>Interface</c:v>
+                </c:pt>
+              </c:strCache>
+            </c:strRef>
+          </c:tx>
+          <c:spPr>
+            <a:ln w="22225" cap="rnd">
+              <a:solidFill>
+                <a:schemeClr val="accent4"/>
+              </a:solidFill>
+            </a:ln>
+            <a:effectLst>
+              <a:glow rad="139700">
+                <a:schemeClr val="accent4">
+                  <a:satMod val="175000"/>
+                  <a:alpha val="14000"/>
+                </a:schemeClr>
+              </a:glow>
+            </a:effectLst>
+          </c:spPr>
+          <c:marker>
+            <c:symbol val="none"/>
+          </c:marker>
+          <c:dLbls>
+            <c:spPr>
+              <a:noFill/>
+              <a:ln>
+                <a:noFill/>
+              </a:ln>
+              <a:effectLst/>
+            </c:spPr>
+            <c:txPr>
+              <a:bodyPr rot="0" spcFirstLastPara="1" vertOverflow="ellipsis" vert="horz" wrap="square" lIns="38100" tIns="19050" rIns="38100" bIns="19050" anchor="ctr" anchorCtr="1">
+                <a:spAutoFit/>
+              </a:bodyPr>
+              <a:lstStyle/>
+              <a:p>
+                <a:pPr>
+                  <a:defRPr sz="900" b="0" i="0" u="none" strike="noStrike" kern="1200" baseline="0">
+                    <a:solidFill>
+                      <a:schemeClr val="lt1">
+                        <a:lumMod val="75000"/>
+                      </a:schemeClr>
+                    </a:solidFill>
+                    <a:latin typeface="+mn-lt"/>
+                    <a:ea typeface="+mn-ea"/>
+                    <a:cs typeface="+mn-cs"/>
+                  </a:defRPr>
+                </a:pPr>
+                <a:endParaRPr lang="pt-BR"/>
+              </a:p>
+            </c:txPr>
+            <c:showLegendKey val="0"/>
+            <c:showVal val="1"/>
+            <c:showCatName val="0"/>
+            <c:showSerName val="0"/>
+            <c:showPercent val="0"/>
+            <c:showBubbleSize val="0"/>
+            <c:showLeaderLines val="0"/>
+            <c:extLst>
+              <c:ext xmlns:c15="http://schemas.microsoft.com/office/drawing/2012/chart" uri="{CE6537A1-D6FC-4f65-9D91-7224C49458BB}">
+                <c15:layout/>
+                <c15:showLeaderLines val="1"/>
+                <c15:leaderLines>
+                  <c:spPr>
+                    <a:ln w="9525">
+                      <a:solidFill>
+                        <a:schemeClr val="lt1">
+                          <a:lumMod val="50000"/>
+                        </a:schemeClr>
+                      </a:solidFill>
+                      <a:round/>
+                    </a:ln>
+                    <a:effectLst/>
+                  </c:spPr>
+                </c15:leaderLines>
+              </c:ext>
+            </c:extLst>
+          </c:dLbls>
+          <c:cat>
+            <c:strRef>
+              <c:f>Plan1!$H$7:$H$11</c:f>
+              <c:strCache>
+                <c:ptCount val="5"/>
+                <c:pt idx="0">
+                  <c:v>Projetados</c:v>
+                </c:pt>
+                <c:pt idx="1">
+                  <c:v>Executados</c:v>
+                </c:pt>
+                <c:pt idx="2">
+                  <c:v>Aprovados</c:v>
+                </c:pt>
+                <c:pt idx="3">
+                  <c:v>Reprovados</c:v>
+                </c:pt>
+                <c:pt idx="4">
+                  <c:v>Melhorias</c:v>
+                </c:pt>
+              </c:strCache>
+            </c:strRef>
+          </c:cat>
+          <c:val>
+            <c:numRef>
+              <c:f>Plan1!$L$7:$L$11</c:f>
+              <c:numCache>
+                <c:formatCode>General</c:formatCode>
+                <c:ptCount val="5"/>
+                <c:pt idx="0">
+                  <c:v>9</c:v>
+                </c:pt>
+                <c:pt idx="1">
+                  <c:v>0</c:v>
+                </c:pt>
+                <c:pt idx="2">
+                  <c:v>0</c:v>
+                </c:pt>
+                <c:pt idx="3">
+                  <c:v>0</c:v>
+                </c:pt>
+                <c:pt idx="4">
+                  <c:v>0</c:v>
+                </c:pt>
+              </c:numCache>
+            </c:numRef>
+          </c:val>
+          <c:smooth val="0"/>
+        </c:ser>
+        <c:dLbls>
+          <c:showLegendKey val="0"/>
+          <c:showVal val="0"/>
+          <c:showCatName val="0"/>
+          <c:showSerName val="0"/>
+          <c:showPercent val="0"/>
+          <c:showBubbleSize val="0"/>
+        </c:dLbls>
+        <c:smooth val="0"/>
+        <c:axId val="202262048"/>
+        <c:axId val="202262608"/>
+      </c:lineChart>
+      <c:catAx>
+        <c:axId val="202262048"/>
+        <c:scaling>
+          <c:orientation val="minMax"/>
+        </c:scaling>
+        <c:delete val="0"/>
+        <c:axPos val="b"/>
+        <c:majorGridlines>
+          <c:spPr>
+            <a:ln w="9525" cap="flat" cmpd="sng" algn="ctr">
+              <a:gradFill>
+                <a:gsLst>
+                  <a:gs pos="100000">
+                    <a:schemeClr val="dk1">
+                      <a:lumMod val="75000"/>
+                      <a:lumOff val="25000"/>
+                    </a:schemeClr>
+                  </a:gs>
+                  <a:gs pos="0">
+                    <a:schemeClr val="dk1">
+                      <a:lumMod val="65000"/>
+                      <a:lumOff val="35000"/>
+                    </a:schemeClr>
+                  </a:gs>
+                </a:gsLst>
+                <a:lin ang="5400000" scaled="0"/>
+              </a:gradFill>
+              <a:round/>
+            </a:ln>
+            <a:effectLst/>
+          </c:spPr>
+        </c:majorGridlines>
+        <c:numFmt formatCode="General" sourceLinked="1"/>
+        <c:majorTickMark val="none"/>
+        <c:minorTickMark val="none"/>
+        <c:tickLblPos val="nextTo"/>
+        <c:spPr>
+          <a:noFill/>
+          <a:ln>
+            <a:noFill/>
+          </a:ln>
+          <a:effectLst/>
+        </c:spPr>
+        <c:txPr>
+          <a:bodyPr rot="-60000000" spcFirstLastPara="1" vertOverflow="ellipsis" vert="horz" wrap="square" anchor="ctr" anchorCtr="1"/>
+          <a:lstStyle/>
+          <a:p>
+            <a:pPr>
+              <a:defRPr sz="1200" b="0" i="0" u="none" strike="noStrike" kern="1200" baseline="0">
+                <a:solidFill>
+                  <a:schemeClr val="lt1">
+                    <a:lumMod val="75000"/>
+                  </a:schemeClr>
+                </a:solidFill>
+                <a:latin typeface="+mn-lt"/>
+                <a:ea typeface="+mn-ea"/>
+                <a:cs typeface="+mn-cs"/>
+              </a:defRPr>
+            </a:pPr>
+            <a:endParaRPr lang="pt-BR"/>
+          </a:p>
+        </c:txPr>
+        <c:crossAx val="202262608"/>
+        <c:crosses val="autoZero"/>
+        <c:auto val="1"/>
+        <c:lblAlgn val="ctr"/>
+        <c:lblOffset val="100"/>
+        <c:noMultiLvlLbl val="0"/>
+      </c:catAx>
+      <c:valAx>
+        <c:axId val="202262608"/>
+        <c:scaling>
+          <c:orientation val="minMax"/>
+          <c:max val="55"/>
+          <c:min val="0"/>
+        </c:scaling>
+        <c:delete val="0"/>
+        <c:axPos val="l"/>
+        <c:majorGridlines>
+          <c:spPr>
+            <a:ln w="9525" cap="flat" cmpd="sng" algn="ctr">
+              <a:gradFill>
+                <a:gsLst>
+                  <a:gs pos="100000">
+                    <a:schemeClr val="dk1">
+                      <a:lumMod val="75000"/>
+                      <a:lumOff val="25000"/>
+                    </a:schemeClr>
+                  </a:gs>
+                  <a:gs pos="0">
+                    <a:schemeClr val="dk1">
+                      <a:lumMod val="65000"/>
+                      <a:lumOff val="35000"/>
+                    </a:schemeClr>
+                  </a:gs>
+                </a:gsLst>
+                <a:lin ang="5400000" scaled="0"/>
+              </a:gradFill>
+              <a:round/>
+            </a:ln>
+            <a:effectLst/>
+          </c:spPr>
+        </c:majorGridlines>
+        <c:numFmt formatCode="General" sourceLinked="1"/>
+        <c:majorTickMark val="none"/>
+        <c:minorTickMark val="none"/>
+        <c:tickLblPos val="nextTo"/>
+        <c:spPr>
+          <a:noFill/>
+          <a:ln>
+            <a:noFill/>
+          </a:ln>
+          <a:effectLst/>
+        </c:spPr>
+        <c:txPr>
+          <a:bodyPr rot="-60000000" spcFirstLastPara="1" vertOverflow="ellipsis" vert="horz" wrap="square" anchor="ctr" anchorCtr="1"/>
+          <a:lstStyle/>
+          <a:p>
+            <a:pPr>
+              <a:defRPr sz="900" b="0" i="0" u="none" strike="noStrike" kern="1200" baseline="0">
+                <a:solidFill>
+                  <a:schemeClr val="lt1">
+                    <a:lumMod val="75000"/>
+                  </a:schemeClr>
+                </a:solidFill>
+                <a:latin typeface="+mn-lt"/>
+                <a:ea typeface="+mn-ea"/>
+                <a:cs typeface="+mn-cs"/>
+              </a:defRPr>
+            </a:pPr>
+            <a:endParaRPr lang="pt-BR"/>
+          </a:p>
+        </c:txPr>
+        <c:crossAx val="202262048"/>
+        <c:crosses val="autoZero"/>
+        <c:crossBetween val="between"/>
+        <c:majorUnit val="10"/>
+      </c:valAx>
+      <c:spPr>
+        <a:noFill/>
+        <a:ln>
+          <a:noFill/>
+        </a:ln>
+        <a:effectLst/>
+      </c:spPr>
+    </c:plotArea>
+    <c:legend>
+      <c:legendPos val="t"/>
+      <c:layout>
+        <c:manualLayout>
+          <c:xMode val="edge"/>
+          <c:yMode val="edge"/>
+          <c:x val="5.6344198001732286E-2"/>
+          <c:y val="0.11052445785593715"/>
+          <c:w val="0.85564077022725638"/>
+          <c:h val="7.7221727181893768E-2"/>
+        </c:manualLayout>
+      </c:layout>
+      <c:overlay val="0"/>
+      <c:spPr>
+        <a:noFill/>
+        <a:ln>
+          <a:noFill/>
+        </a:ln>
+        <a:effectLst/>
+      </c:spPr>
+      <c:txPr>
+        <a:bodyPr rot="0" spcFirstLastPara="1" vertOverflow="ellipsis" vert="horz" wrap="square" anchor="ctr" anchorCtr="1"/>
+        <a:lstStyle/>
+        <a:p>
+          <a:pPr>
+            <a:defRPr sz="1200" b="0" i="0" u="sng" strike="noStrike" kern="1200" baseline="0">
+              <a:solidFill>
+                <a:schemeClr val="lt1">
+                  <a:lumMod val="75000"/>
+                </a:schemeClr>
+              </a:solidFill>
+              <a:latin typeface="+mn-lt"/>
+              <a:ea typeface="+mn-ea"/>
+              <a:cs typeface="+mn-cs"/>
+            </a:defRPr>
+          </a:pPr>
+          <a:endParaRPr lang="pt-BR"/>
+        </a:p>
+      </c:txPr>
+    </c:legend>
+    <c:plotVisOnly val="1"/>
+    <c:dispBlanksAs val="gap"/>
+    <c:showDLblsOverMax val="0"/>
+  </c:chart>
+  <c:spPr>
+    <a:solidFill>
+      <a:schemeClr val="dk1">
+        <a:lumMod val="75000"/>
+        <a:lumOff val="25000"/>
+      </a:schemeClr>
+    </a:solidFill>
+    <a:ln w="9525" cap="flat" cmpd="sng" algn="ctr">
+      <a:solidFill>
+        <a:schemeClr val="dk1">
+          <a:lumMod val="15000"/>
+          <a:lumOff val="85000"/>
+        </a:schemeClr>
+      </a:solidFill>
+      <a:round/>
+    </a:ln>
+    <a:effectLst/>
+  </c:spPr>
+  <c:txPr>
+    <a:bodyPr/>
+    <a:lstStyle/>
+    <a:p>
+      <a:pPr>
+        <a:defRPr/>
+      </a:pPr>
+      <a:endParaRPr lang="pt-BR"/>
+    </a:p>
+  </c:txPr>
+  <c:externalData r:id="rId3">
+    <c:autoUpdate val="0"/>
+  </c:externalData>
+</c:chartSpace>
+</file>
+
+<file path=ppt/charts/colors1.xml><?xml version="1.0" encoding="utf-8"?>
+<cs:colorStyle xmlns:cs="http://schemas.microsoft.com/office/drawing/2012/chartStyle" xmlns:a="http://schemas.openxmlformats.org/drawingml/2006/main" meth="cycle" id="10">
+  <a:schemeClr val="accent1"/>
+  <a:schemeClr val="accent2"/>
+  <a:schemeClr val="accent3"/>
+  <a:schemeClr val="accent4"/>
+  <a:schemeClr val="accent5"/>
+  <a:schemeClr val="accent6"/>
+  <cs:variation/>
+  <cs:variation>
+    <a:lumMod val="60000"/>
+  </cs:variation>
+  <cs:variation>
+    <a:lumMod val="80000"/>
+    <a:lumOff val="20000"/>
+  </cs:variation>
+  <cs:variation>
+    <a:lumMod val="80000"/>
+  </cs:variation>
+  <cs:variation>
+    <a:lumMod val="60000"/>
+    <a:lumOff val="40000"/>
+  </cs:variation>
+  <cs:variation>
+    <a:lumMod val="50000"/>
+  </cs:variation>
+  <cs:variation>
+    <a:lumMod val="70000"/>
+    <a:lumOff val="30000"/>
+  </cs:variation>
+  <cs:variation>
+    <a:lumMod val="70000"/>
+  </cs:variation>
+  <cs:variation>
+    <a:lumMod val="50000"/>
+    <a:lumOff val="50000"/>
+  </cs:variation>
+</cs:colorStyle>
+</file>
+
+<file path=ppt/charts/style1.xml><?xml version="1.0" encoding="utf-8"?>
+<cs:chartStyle xmlns:cs="http://schemas.microsoft.com/office/drawing/2012/chartStyle" xmlns:a="http://schemas.openxmlformats.org/drawingml/2006/main" id="236">
+  <cs:axisTitle>
+    <cs:lnRef idx="0"/>
+    <cs:fillRef idx="0"/>
+    <cs:effectRef idx="0"/>
+    <cs:fontRef idx="minor">
+      <a:schemeClr val="lt1">
+        <a:lumMod val="75000"/>
+      </a:schemeClr>
+    </cs:fontRef>
+    <cs:defRPr sz="900" b="1" kern="1200"/>
+  </cs:axisTitle>
+  <cs:categoryAxis>
+    <cs:lnRef idx="0"/>
+    <cs:fillRef idx="0"/>
+    <cs:effectRef idx="0"/>
+    <cs:fontRef idx="minor">
+      <a:schemeClr val="lt1">
+        <a:lumMod val="75000"/>
+      </a:schemeClr>
+    </cs:fontRef>
+    <cs:defRPr sz="900" kern="1200"/>
+  </cs:categoryAxis>
+  <cs:chartArea>
+    <cs:lnRef idx="0"/>
+    <cs:fillRef idx="0"/>
+    <cs:effectRef idx="0"/>
+    <cs:fontRef idx="minor">
+      <a:schemeClr val="dk1"/>
+    </cs:fontRef>
+    <cs:spPr>
+      <a:solidFill>
+        <a:schemeClr val="dk1">
+          <a:lumMod val="75000"/>
+          <a:lumOff val="25000"/>
+        </a:schemeClr>
+      </a:solidFill>
+      <a:ln w="9525" cap="flat" cmpd="sng" algn="ctr">
+        <a:solidFill>
+          <a:schemeClr val="dk1">
+            <a:lumMod val="15000"/>
+            <a:lumOff val="85000"/>
+          </a:schemeClr>
+        </a:solidFill>
+        <a:round/>
+      </a:ln>
+    </cs:spPr>
+    <cs:defRPr sz="900" kern="1200"/>
+  </cs:chartArea>
+  <cs:dataLabel>
+    <cs:lnRef idx="0"/>
+    <cs:fillRef idx="0"/>
+    <cs:effectRef idx="0"/>
+    <cs:fontRef idx="minor">
+      <a:schemeClr val="lt1">
+        <a:lumMod val="75000"/>
+      </a:schemeClr>
+    </cs:fontRef>
+    <cs:defRPr sz="900" kern="1200"/>
+  </cs:dataLabel>
+  <cs:dataLabelCallout>
+    <cs:lnRef idx="0"/>
+    <cs:fillRef idx="0"/>
+    <cs:effectRef idx="0"/>
+    <cs:fontRef idx="minor">
+      <a:schemeClr val="lt1">
+        <a:lumMod val="15000"/>
+        <a:lumOff val="85000"/>
+      </a:schemeClr>
+    </cs:fontRef>
+    <cs:spPr>
+      <a:solidFill>
+        <a:schemeClr val="dk1">
+          <a:lumMod val="65000"/>
+          <a:lumOff val="35000"/>
+        </a:schemeClr>
+      </a:solidFill>
+    </cs:spPr>
+    <cs:defRPr sz="900" kern="1200"/>
+    <cs:bodyPr rot="0" spcFirstLastPara="1" vertOverflow="clip" horzOverflow="clip" vert="horz" wrap="square" lIns="36576" tIns="18288" rIns="36576" bIns="18288" anchor="ctr" anchorCtr="1">
+      <a:spAutoFit/>
+    </cs:bodyPr>
+  </cs:dataLabelCallout>
+  <cs:dataPoint>
+    <cs:lnRef idx="0">
+      <cs:styleClr val="auto"/>
+    </cs:lnRef>
+    <cs:fillRef idx="0"/>
+    <cs:effectRef idx="0">
+      <cs:styleClr val="auto"/>
+    </cs:effectRef>
+    <cs:fontRef idx="minor">
+      <a:schemeClr val="dk1"/>
+    </cs:fontRef>
+    <cs:spPr>
+      <a:ln w="9525" cap="flat" cmpd="sng" algn="ctr">
+        <a:solidFill>
+          <a:schemeClr val="phClr"/>
+        </a:solidFill>
+        <a:miter lim="800000"/>
+      </a:ln>
+      <a:effectLst>
+        <a:glow rad="63500">
+          <a:schemeClr val="phClr">
+            <a:satMod val="175000"/>
+            <a:alpha val="25000"/>
+          </a:schemeClr>
+        </a:glow>
+      </a:effectLst>
+    </cs:spPr>
+  </cs:dataPoint>
+  <cs:dataPoint3D>
+    <cs:lnRef idx="0">
+      <cs:styleClr val="auto"/>
+    </cs:lnRef>
+    <cs:fillRef idx="0">
+      <cs:styleClr val="auto"/>
+    </cs:fillRef>
+    <cs:effectRef idx="0">
+      <cs:styleClr val="auto"/>
+    </cs:effectRef>
+    <cs:fontRef idx="minor">
+      <a:schemeClr val="dk1"/>
+    </cs:fontRef>
+    <cs:spPr>
+      <a:ln w="9525" cap="flat" cmpd="sng" algn="ctr">
+        <a:solidFill>
+          <a:schemeClr val="phClr"/>
+        </a:solidFill>
+        <a:miter lim="800000"/>
+      </a:ln>
+      <a:effectLst>
+        <a:glow rad="63500">
+          <a:schemeClr val="phClr">
+            <a:satMod val="175000"/>
+            <a:alpha val="25000"/>
+          </a:schemeClr>
+        </a:glow>
+      </a:effectLst>
+    </cs:spPr>
+  </cs:dataPoint3D>
+  <cs:dataPointLine>
+    <cs:lnRef idx="0">
+      <cs:styleClr val="auto"/>
+    </cs:lnRef>
+    <cs:fillRef idx="0">
+      <cs:styleClr val="auto"/>
+    </cs:fillRef>
+    <cs:effectRef idx="0">
+      <cs:styleClr val="auto"/>
+    </cs:effectRef>
+    <cs:fontRef idx="minor">
+      <a:schemeClr val="dk1"/>
+    </cs:fontRef>
+    <cs:spPr>
+      <a:ln w="22225" cap="rnd">
+        <a:solidFill>
+          <a:schemeClr val="phClr"/>
+        </a:solidFill>
+      </a:ln>
+      <a:effectLst>
+        <a:glow rad="139700">
+          <a:schemeClr val="phClr">
+            <a:satMod val="175000"/>
+            <a:alpha val="14000"/>
+          </a:schemeClr>
+        </a:glow>
+      </a:effectLst>
+    </cs:spPr>
+  </cs:dataPointLine>
+  <cs:dataPointMarker>
+    <cs:lnRef idx="0">
+      <cs:styleClr val="auto"/>
+    </cs:lnRef>
+    <cs:fillRef idx="0">
+      <cs:styleClr val="auto"/>
+    </cs:fillRef>
+    <cs:effectRef idx="0">
+      <cs:styleClr val="auto"/>
+    </cs:effectRef>
+    <cs:fontRef idx="minor">
+      <a:schemeClr val="dk1"/>
+    </cs:fontRef>
+    <cs:spPr>
+      <a:solidFill>
+        <a:schemeClr val="phClr">
+          <a:lumMod val="60000"/>
+          <a:lumOff val="40000"/>
+        </a:schemeClr>
+      </a:solidFill>
+      <a:effectLst>
+        <a:glow rad="63500">
+          <a:schemeClr val="phClr">
+            <a:satMod val="175000"/>
+            <a:alpha val="25000"/>
+          </a:schemeClr>
+        </a:glow>
+      </a:effectLst>
+    </cs:spPr>
+  </cs:dataPointMarker>
+  <cs:dataPointMarkerLayout symbol="circle" size="4"/>
+  <cs:dataPointWireframe>
+    <cs:lnRef idx="0">
+      <cs:styleClr val="auto"/>
+    </cs:lnRef>
+    <cs:fillRef idx="0"/>
+    <cs:effectRef idx="0"/>
+    <cs:fontRef idx="minor">
+      <a:schemeClr val="dk1"/>
+    </cs:fontRef>
+    <cs:spPr>
+      <a:ln w="9525" cap="rnd">
+        <a:solidFill>
+          <a:schemeClr val="phClr"/>
+        </a:solidFill>
+        <a:round/>
+      </a:ln>
+    </cs:spPr>
+  </cs:dataPointWireframe>
+  <cs:dataTable>
+    <cs:lnRef idx="0"/>
+    <cs:fillRef idx="0"/>
+    <cs:effectRef idx="0"/>
+    <cs:fontRef idx="minor">
+      <a:schemeClr val="lt1">
+        <a:lumMod val="75000"/>
+      </a:schemeClr>
+    </cs:fontRef>
+    <cs:spPr>
+      <a:ln w="9525">
+        <a:solidFill>
+          <a:schemeClr val="dk1">
+            <a:lumMod val="50000"/>
+            <a:lumOff val="50000"/>
+          </a:schemeClr>
+        </a:solidFill>
+      </a:ln>
+    </cs:spPr>
+    <cs:defRPr sz="900" kern="1200"/>
+  </cs:dataTable>
+  <cs:downBar>
+    <cs:lnRef idx="0"/>
+    <cs:fillRef idx="0"/>
+    <cs:effectRef idx="0"/>
+    <cs:fontRef idx="minor">
+      <a:schemeClr val="lt1"/>
+    </cs:fontRef>
+    <cs:spPr>
+      <a:solidFill>
+        <a:schemeClr val="dk1">
+          <a:lumMod val="50000"/>
+          <a:lumOff val="50000"/>
+        </a:schemeClr>
+      </a:solidFill>
+      <a:ln w="9525">
+        <a:solidFill>
+          <a:schemeClr val="dk1">
+            <a:lumMod val="75000"/>
+          </a:schemeClr>
+        </a:solidFill>
+        <a:round/>
+      </a:ln>
+    </cs:spPr>
+  </cs:downBar>
+  <cs:dropLine>
+    <cs:lnRef idx="0"/>
+    <cs:fillRef idx="0"/>
+    <cs:effectRef idx="0"/>
+    <cs:fontRef idx="minor">
+      <a:schemeClr val="dk1"/>
+    </cs:fontRef>
+    <cs:spPr>
+      <a:ln w="9525">
+        <a:solidFill>
+          <a:schemeClr val="lt1">
+            <a:lumMod val="50000"/>
+          </a:schemeClr>
+        </a:solidFill>
+        <a:round/>
+      </a:ln>
+    </cs:spPr>
+  </cs:dropLine>
+  <cs:errorBar>
+    <cs:lnRef idx="0"/>
+    <cs:fillRef idx="0"/>
+    <cs:effectRef idx="0"/>
+    <cs:fontRef idx="minor">
+      <a:schemeClr val="dk1"/>
+    </cs:fontRef>
+    <cs:spPr>
+      <a:ln w="9525">
+        <a:solidFill>
+          <a:schemeClr val="lt1">
+            <a:lumMod val="50000"/>
+          </a:schemeClr>
+        </a:solidFill>
+        <a:round/>
+      </a:ln>
+    </cs:spPr>
+  </cs:errorBar>
+  <cs:floor>
+    <cs:lnRef idx="0"/>
+    <cs:fillRef idx="0"/>
+    <cs:effectRef idx="0"/>
+    <cs:fontRef idx="minor">
+      <a:schemeClr val="dk1"/>
+    </cs:fontRef>
+  </cs:floor>
+  <cs:gridlineMajor>
+    <cs:lnRef idx="0"/>
+    <cs:fillRef idx="0"/>
+    <cs:effectRef idx="0"/>
+    <cs:fontRef idx="minor">
+      <a:schemeClr val="dk1"/>
+    </cs:fontRef>
+    <cs:spPr>
+      <a:ln w="9525" cap="flat" cmpd="sng" algn="ctr">
+        <a:gradFill>
+          <a:gsLst>
+            <a:gs pos="100000">
+              <a:schemeClr val="dk1">
+                <a:lumMod val="75000"/>
+                <a:lumOff val="25000"/>
+              </a:schemeClr>
+            </a:gs>
+            <a:gs pos="0">
+              <a:schemeClr val="dk1">
+                <a:lumMod val="65000"/>
+                <a:lumOff val="35000"/>
+              </a:schemeClr>
+            </a:gs>
+          </a:gsLst>
+          <a:lin ang="5400000" scaled="0"/>
+        </a:gradFill>
+        <a:round/>
+      </a:ln>
+    </cs:spPr>
+  </cs:gridlineMajor>
+  <cs:gridlineMinor>
+    <cs:lnRef idx="0"/>
+    <cs:fillRef idx="0"/>
+    <cs:effectRef idx="0"/>
+    <cs:fontRef idx="minor">
+      <a:schemeClr val="dk1"/>
+    </cs:fontRef>
+    <cs:spPr>
+      <a:ln w="9525" cap="flat" cmpd="sng" algn="ctr">
+        <a:gradFill>
+          <a:gsLst>
+            <a:gs pos="100000">
+              <a:schemeClr val="dk1">
+                <a:lumMod val="75000"/>
+                <a:lumOff val="25000"/>
+                <a:alpha val="25000"/>
+              </a:schemeClr>
+            </a:gs>
+            <a:gs pos="0">
+              <a:schemeClr val="dk1">
+                <a:lumMod val="65000"/>
+                <a:lumOff val="35000"/>
+                <a:alpha val="25000"/>
+              </a:schemeClr>
+            </a:gs>
+          </a:gsLst>
+          <a:lin ang="5400000" scaled="0"/>
+        </a:gradFill>
+        <a:round/>
+      </a:ln>
+    </cs:spPr>
+  </cs:gridlineMinor>
+  <cs:hiLoLine>
+    <cs:lnRef idx="0"/>
+    <cs:fillRef idx="0"/>
+    <cs:effectRef idx="0"/>
+    <cs:fontRef idx="minor">
+      <a:schemeClr val="dk1"/>
+    </cs:fontRef>
+    <cs:spPr>
+      <a:ln w="9525">
+        <a:solidFill>
+          <a:schemeClr val="lt1">
+            <a:lumMod val="50000"/>
+          </a:schemeClr>
+        </a:solidFill>
+        <a:round/>
+      </a:ln>
+    </cs:spPr>
+  </cs:hiLoLine>
+  <cs:leaderLine>
+    <cs:lnRef idx="0"/>
+    <cs:fillRef idx="0"/>
+    <cs:effectRef idx="0"/>
+    <cs:fontRef idx="minor">
+      <a:schemeClr val="dk1"/>
+    </cs:fontRef>
+    <cs:spPr>
+      <a:ln w="9525">
+        <a:solidFill>
+          <a:schemeClr val="lt1">
+            <a:lumMod val="50000"/>
+          </a:schemeClr>
+        </a:solidFill>
+        <a:round/>
+      </a:ln>
+    </cs:spPr>
+  </cs:leaderLine>
+  <cs:legend>
+    <cs:lnRef idx="0"/>
+    <cs:fillRef idx="0"/>
+    <cs:effectRef idx="0"/>
+    <cs:fontRef idx="minor">
+      <a:schemeClr val="lt1">
+        <a:lumMod val="75000"/>
+      </a:schemeClr>
+    </cs:fontRef>
+    <cs:defRPr sz="900" kern="1200"/>
+  </cs:legend>
+  <cs:plotArea>
+    <cs:lnRef idx="0"/>
+    <cs:fillRef idx="0"/>
+    <cs:effectRef idx="0"/>
+    <cs:fontRef idx="minor">
+      <a:schemeClr val="dk1"/>
+    </cs:fontRef>
+  </cs:plotArea>
+  <cs:plotArea3D>
+    <cs:lnRef idx="0"/>
+    <cs:fillRef idx="0"/>
+    <cs:effectRef idx="0"/>
+    <cs:fontRef idx="minor">
+      <a:schemeClr val="dk1"/>
+    </cs:fontRef>
+  </cs:plotArea3D>
+  <cs:seriesAxis>
+    <cs:lnRef idx="0"/>
+    <cs:fillRef idx="0"/>
+    <cs:effectRef idx="0"/>
+    <cs:fontRef idx="minor">
+      <a:schemeClr val="lt1">
+        <a:lumMod val="75000"/>
+      </a:schemeClr>
+    </cs:fontRef>
+    <cs:defRPr sz="900" kern="1200"/>
+  </cs:seriesAxis>
+  <cs:seriesLine>
+    <cs:lnRef idx="0"/>
+    <cs:fillRef idx="0"/>
+    <cs:effectRef idx="0"/>
+    <cs:fontRef idx="minor">
+      <a:schemeClr val="dk1"/>
+    </cs:fontRef>
+    <cs:spPr>
+      <a:ln w="9525">
+        <a:solidFill>
+          <a:schemeClr val="lt1">
+            <a:lumMod val="50000"/>
+          </a:schemeClr>
+        </a:solidFill>
+        <a:round/>
+      </a:ln>
+    </cs:spPr>
+  </cs:seriesLine>
+  <cs:title>
+    <cs:lnRef idx="0"/>
+    <cs:fillRef idx="0"/>
+    <cs:effectRef idx="0"/>
+    <cs:fontRef idx="minor">
+      <a:schemeClr val="lt1">
+        <a:lumMod val="85000"/>
+      </a:schemeClr>
+    </cs:fontRef>
+    <cs:defRPr sz="1400" b="1" kern="1200" cap="none" baseline="0"/>
+  </cs:title>
+  <cs:trendline>
+    <cs:lnRef idx="0">
+      <cs:styleClr val="auto"/>
+    </cs:lnRef>
+    <cs:fillRef idx="0"/>
+    <cs:effectRef idx="0"/>
+    <cs:fontRef idx="minor">
+      <a:schemeClr val="lt1"/>
+    </cs:fontRef>
+    <cs:spPr>
+      <a:ln w="25400" cap="rnd">
+        <a:solidFill>
+          <a:schemeClr val="phClr">
+            <a:alpha val="50000"/>
+          </a:schemeClr>
+        </a:solidFill>
+      </a:ln>
+    </cs:spPr>
+  </cs:trendline>
+  <cs:trendlineLabel>
+    <cs:lnRef idx="0"/>
+    <cs:fillRef idx="0"/>
+    <cs:effectRef idx="0"/>
+    <cs:fontRef idx="minor">
+      <a:schemeClr val="lt1">
+        <a:lumMod val="75000"/>
+      </a:schemeClr>
+    </cs:fontRef>
+    <cs:defRPr sz="900" kern="1200"/>
+  </cs:trendlineLabel>
+  <cs:upBar>
+    <cs:lnRef idx="0"/>
+    <cs:fillRef idx="0"/>
+    <cs:effectRef idx="0"/>
+    <cs:fontRef idx="minor">
+      <a:schemeClr val="dk1"/>
+    </cs:fontRef>
+    <cs:spPr>
+      <a:solidFill>
+        <a:schemeClr val="lt1">
+          <a:lumMod val="85000"/>
+        </a:schemeClr>
+      </a:solidFill>
+      <a:ln w="9525">
+        <a:solidFill>
+          <a:schemeClr val="dk1">
+            <a:lumMod val="50000"/>
+          </a:schemeClr>
+        </a:solidFill>
+        <a:round/>
+      </a:ln>
+    </cs:spPr>
+  </cs:upBar>
+  <cs:valueAxis>
+    <cs:lnRef idx="0"/>
+    <cs:fillRef idx="0"/>
+    <cs:effectRef idx="0"/>
+    <cs:fontRef idx="minor">
+      <a:schemeClr val="lt1">
+        <a:lumMod val="75000"/>
+      </a:schemeClr>
+    </cs:fontRef>
+    <cs:defRPr sz="900" kern="1200"/>
+  </cs:valueAxis>
+  <cs:wall>
+    <cs:lnRef idx="0"/>
+    <cs:fillRef idx="0"/>
+    <cs:effectRef idx="0"/>
+    <cs:fontRef idx="minor">
+      <a:schemeClr val="dk1"/>
+    </cs:fontRef>
+  </cs:wall>
+</cs:chartStyle>
 </file>
 
 <file path=ppt/slideLayouts/slideLayout1.xml><?xml version="1.0" encoding="utf-8"?>
@@ -3254,7 +4708,236 @@
                   <a:schemeClr val="bg1"/>
                 </a:solidFill>
               </a:rPr>
-              <a:t>Riscos e suas mitigações</a:t>
+              <a:t>Ambiente de teste</a:t>
+            </a:r>
+            <a:endParaRPr lang="pt-BR" sz="2300" dirty="0">
+              <a:solidFill>
+                <a:schemeClr val="bg1"/>
+              </a:solidFill>
+            </a:endParaRPr>
+          </a:p>
+        </p:txBody>
+      </p:sp>
+      <p:sp>
+        <p:nvSpPr>
+          <p:cNvPr id="5" name="CaixaDeTexto 4"/>
+          <p:cNvSpPr txBox="1"/>
+          <p:nvPr/>
+        </p:nvSpPr>
+        <p:spPr>
+          <a:xfrm>
+            <a:off x="1142976" y="1857364"/>
+            <a:ext cx="6929486" cy="4247317"/>
+          </a:xfrm>
+          <a:prstGeom prst="rect">
+            <a:avLst/>
+          </a:prstGeom>
+          <a:noFill/>
+        </p:spPr>
+        <p:txBody>
+          <a:bodyPr wrap="square" rtlCol="0">
+            <a:spAutoFit/>
+          </a:bodyPr>
+          <a:lstStyle/>
+          <a:p>
+            <a:pPr marL="342900" indent="-342900">
+              <a:buFont typeface="Arial" panose="020B0604020202020204" pitchFamily="34" charset="0"/>
+              <a:buChar char="•"/>
+            </a:pPr>
+            <a:r>
+              <a:rPr lang="pt-BR" dirty="0" smtClean="0"/>
+              <a:t>Foram utilizadas as seguintes ferramentas:</a:t>
+            </a:r>
+          </a:p>
+          <a:p>
+            <a:pPr marL="800100" lvl="1" indent="-342900">
+              <a:buFont typeface="+mj-lt"/>
+              <a:buAutoNum type="arabicPeriod"/>
+            </a:pPr>
+            <a:r>
+              <a:rPr lang="pt-BR" dirty="0" smtClean="0"/>
+              <a:t>Microsoft Word, Excel e PowerPoint 2013, para elaboração de plano, projeto</a:t>
+            </a:r>
+            <a:r>
+              <a:rPr lang="pt-BR" dirty="0"/>
+              <a:t> </a:t>
+            </a:r>
+            <a:r>
+              <a:rPr lang="pt-BR" dirty="0" smtClean="0"/>
+              <a:t>e avaliação dos testes, além de outros documentos, como o de Solicitação de Mudanças;</a:t>
+            </a:r>
+          </a:p>
+          <a:p>
+            <a:pPr marL="800100" lvl="1" indent="-342900">
+              <a:buFont typeface="+mj-lt"/>
+              <a:buAutoNum type="arabicPeriod"/>
+            </a:pPr>
+            <a:r>
+              <a:rPr lang="pt-BR" dirty="0" err="1" smtClean="0"/>
+              <a:t>GitHub</a:t>
+            </a:r>
+            <a:r>
+              <a:rPr lang="pt-BR" dirty="0" smtClean="0"/>
+              <a:t> na sua versão para desktop , para o gerenciamento de configuração dos documentos utilizados.</a:t>
+            </a:r>
+            <a:endParaRPr lang="pt-BR" dirty="0"/>
+          </a:p>
+          <a:p>
+            <a:endParaRPr lang="pt-BR" dirty="0"/>
+          </a:p>
+          <a:p>
+            <a:pPr marL="342900" indent="-342900">
+              <a:buFont typeface="Arial" panose="020B0604020202020204" pitchFamily="34" charset="0"/>
+              <a:buChar char="•"/>
+            </a:pPr>
+            <a:r>
+              <a:rPr lang="pt-BR" dirty="0" smtClean="0"/>
+              <a:t>Foram necessários os seguintes componentes:</a:t>
+            </a:r>
+          </a:p>
+          <a:p>
+            <a:pPr marL="800100" lvl="1" indent="-342900">
+              <a:buFont typeface="+mj-lt"/>
+              <a:buAutoNum type="arabicPeriod"/>
+            </a:pPr>
+            <a:r>
+              <a:rPr lang="pt-BR" dirty="0" smtClean="0"/>
+              <a:t>Notebook com Windows 8 instalado;</a:t>
+            </a:r>
+          </a:p>
+          <a:p>
+            <a:pPr marL="800100" lvl="1" indent="-342900">
+              <a:buFont typeface="+mj-lt"/>
+              <a:buAutoNum type="arabicPeriod"/>
+            </a:pPr>
+            <a:r>
+              <a:rPr lang="pt-BR" dirty="0" smtClean="0"/>
+              <a:t>Computador com Windows 7 instalado;</a:t>
+            </a:r>
+          </a:p>
+          <a:p>
+            <a:pPr lvl="1"/>
+            <a:endParaRPr lang="pt-BR" dirty="0" smtClean="0"/>
+          </a:p>
+          <a:p>
+            <a:pPr marL="285750" indent="-285750">
+              <a:buFont typeface="Arial" panose="020B0604020202020204" pitchFamily="34" charset="0"/>
+              <a:buChar char="•"/>
+            </a:pPr>
+            <a:r>
+              <a:rPr lang="pt-BR" dirty="0" smtClean="0"/>
+              <a:t>Todas as ferramentas atenderam as expectativas para as atividades que foram solicitadas.</a:t>
+            </a:r>
+            <a:endParaRPr lang="pt-BR" dirty="0"/>
+          </a:p>
+          <a:p>
+            <a:pPr lvl="1"/>
+            <a:endParaRPr lang="pt-BR" dirty="0" smtClean="0"/>
+          </a:p>
+          <a:p>
+            <a:pPr lvl="1"/>
+            <a:endParaRPr lang="pt-BR" dirty="0" smtClean="0"/>
+          </a:p>
+        </p:txBody>
+      </p:sp>
+    </p:spTree>
+    <p:extLst>
+      <p:ext uri="{BB962C8B-B14F-4D97-AF65-F5344CB8AC3E}">
+        <p14:creationId xmlns:p14="http://schemas.microsoft.com/office/powerpoint/2010/main" val="385561133"/>
+      </p:ext>
+    </p:extLst>
+  </p:cSld>
+  <p:clrMapOvr>
+    <a:masterClrMapping/>
+  </p:clrMapOvr>
+  <p:timing>
+    <p:tnLst>
+      <p:par>
+        <p:cTn id="1" dur="indefinite" restart="never" nodeType="tmRoot"/>
+      </p:par>
+    </p:tnLst>
+  </p:timing>
+</p:sld>
+</file>
+
+<file path=ppt/slides/slide11.xml><?xml version="1.0" encoding="utf-8"?>
+<p:sld xmlns:a="http://schemas.openxmlformats.org/drawingml/2006/main" xmlns:r="http://schemas.openxmlformats.org/officeDocument/2006/relationships" xmlns:p="http://schemas.openxmlformats.org/presentationml/2006/main">
+  <p:cSld>
+    <p:spTree>
+      <p:nvGrpSpPr>
+        <p:cNvPr id="1" name=""/>
+        <p:cNvGrpSpPr/>
+        <p:nvPr/>
+      </p:nvGrpSpPr>
+      <p:grpSpPr>
+        <a:xfrm>
+          <a:off x="0" y="0"/>
+          <a:ext cx="0" cy="0"/>
+          <a:chOff x="0" y="0"/>
+          <a:chExt cx="0" cy="0"/>
+        </a:xfrm>
+      </p:grpSpPr>
+      <p:pic>
+        <p:nvPicPr>
+          <p:cNvPr id="7" name="Espaço Reservado para Conteúdo 6" descr="Nova140722(ppt_novaroma)B-2.jpg"/>
+          <p:cNvPicPr>
+            <a:picLocks noGrp="1" noChangeAspect="1"/>
+          </p:cNvPicPr>
+          <p:nvPr>
+            <p:ph idx="1"/>
+          </p:nvPr>
+        </p:nvPicPr>
+        <p:blipFill>
+          <a:blip r:embed="rId2"/>
+          <a:stretch>
+            <a:fillRect/>
+          </a:stretch>
+        </p:blipFill>
+        <p:spPr>
+          <a:xfrm>
+            <a:off x="0" y="0"/>
+            <a:ext cx="9144000" cy="6858000"/>
+          </a:xfrm>
+        </p:spPr>
+      </p:pic>
+      <p:sp>
+        <p:nvSpPr>
+          <p:cNvPr id="2" name="Título 1"/>
+          <p:cNvSpPr>
+            <a:spLocks noGrp="1"/>
+          </p:cNvSpPr>
+          <p:nvPr>
+            <p:ph type="title"/>
+          </p:nvPr>
+        </p:nvSpPr>
+        <p:spPr>
+          <a:xfrm>
+            <a:off x="714348" y="357166"/>
+            <a:ext cx="5214974" cy="642942"/>
+          </a:xfrm>
+        </p:spPr>
+        <p:txBody>
+          <a:bodyPr>
+            <a:normAutofit/>
+          </a:bodyPr>
+          <a:lstStyle/>
+          <a:p>
+            <a:pPr algn="l"/>
+            <a:r>
+              <a:rPr lang="pt-BR" sz="2300" dirty="0" smtClean="0">
+                <a:solidFill>
+                  <a:schemeClr val="bg1"/>
+                </a:solidFill>
+              </a:rPr>
+              <a:t>Cobertura de </a:t>
+            </a:r>
+            <a:r>
+              <a:rPr lang="pt-BR" sz="2300" dirty="0" smtClean="0">
+                <a:solidFill>
+                  <a:schemeClr val="bg1"/>
+                </a:solidFill>
+              </a:rPr>
+              <a:t>Testes</a:t>
             </a:r>
             <a:endParaRPr lang="pt-BR" sz="2300" dirty="0">
               <a:solidFill>
@@ -3292,18 +4975,426 @@
             </a:pPr>
             <a:r>
               <a:rPr lang="pt-BR" dirty="0" smtClean="0"/>
-              <a:t>Atraso na elaboração e execução dos casos de teste:</a:t>
-            </a:r>
-          </a:p>
-          <a:p>
-            <a:pPr marL="742950" lvl="1" indent="-285750">
-              <a:buFont typeface="Arial" panose="020B0604020202020204" pitchFamily="34" charset="0"/>
-              <a:buChar char="•"/>
-            </a:pPr>
-            <a:endParaRPr lang="pt-BR" dirty="0" smtClean="0"/>
-          </a:p>
-        </p:txBody>
-      </p:sp>
+              <a:t>Todas as informações dos casos de testes refletiram o que precisava ser testado.</a:t>
+            </a:r>
+            <a:endParaRPr lang="pt-BR" dirty="0"/>
+          </a:p>
+        </p:txBody>
+      </p:sp>
+      <p:graphicFrame>
+        <p:nvGraphicFramePr>
+          <p:cNvPr id="6" name="Tabela 5"/>
+          <p:cNvGraphicFramePr>
+            <a:graphicFrameLocks noGrp="1"/>
+          </p:cNvGraphicFramePr>
+          <p:nvPr>
+            <p:extLst>
+              <p:ext uri="{D42A27DB-BD31-4B8C-83A1-F6EECF244321}">
+                <p14:modId xmlns:p14="http://schemas.microsoft.com/office/powerpoint/2010/main" val="1230747029"/>
+              </p:ext>
+            </p:extLst>
+          </p:nvPr>
+        </p:nvGraphicFramePr>
+        <p:xfrm>
+          <a:off x="1043323" y="4797152"/>
+          <a:ext cx="7128791" cy="505067"/>
+        </p:xfrm>
+        <a:graphic>
+          <a:graphicData uri="http://schemas.openxmlformats.org/drawingml/2006/table">
+            <a:tbl>
+              <a:tblPr>
+                <a:tableStyleId>{5C22544A-7EE6-4342-B048-85BDC9FD1C3A}</a:tableStyleId>
+              </a:tblPr>
+              <a:tblGrid>
+                <a:gridCol w="406530"/>
+                <a:gridCol w="1829384"/>
+                <a:gridCol w="2156060"/>
+                <a:gridCol w="588016"/>
+                <a:gridCol w="2148801"/>
+              </a:tblGrid>
+              <a:tr h="505067">
+                <a:tc>
+                  <a:txBody>
+                    <a:bodyPr/>
+                    <a:lstStyle/>
+                    <a:p>
+                      <a:pPr algn="ctr" fontAlgn="ctr"/>
+                      <a:r>
+                        <a:rPr lang="pt-BR" sz="700" u="none" strike="noStrike" dirty="0">
+                          <a:effectLst/>
+                        </a:rPr>
+                        <a:t>CT070</a:t>
+                      </a:r>
+                      <a:endParaRPr lang="pt-BR" sz="700" b="0" i="0" u="none" strike="noStrike" dirty="0">
+                        <a:effectLst/>
+                        <a:latin typeface="Arial" panose="020B0604020202020204" pitchFamily="34" charset="0"/>
+                      </a:endParaRPr>
+                    </a:p>
+                  </a:txBody>
+                  <a:tcPr marL="6285" marR="6285" marT="6285" marB="0" anchor="ctr"/>
+                </a:tc>
+                <a:tc>
+                  <a:txBody>
+                    <a:bodyPr/>
+                    <a:lstStyle/>
+                    <a:p>
+                      <a:pPr algn="ctr" fontAlgn="ctr"/>
+                      <a:r>
+                        <a:rPr lang="pt-BR" sz="700" u="none" strike="noStrike">
+                          <a:effectLst/>
+                        </a:rPr>
+                        <a:t>Verificar se a nova versão do software realiza a alteração de um jogo com sucesso</a:t>
+                      </a:r>
+                      <a:endParaRPr lang="pt-BR" sz="700" b="0" i="0" u="none" strike="noStrike">
+                        <a:effectLst/>
+                        <a:latin typeface="Arial" panose="020B0604020202020204" pitchFamily="34" charset="0"/>
+                      </a:endParaRPr>
+                    </a:p>
+                  </a:txBody>
+                  <a:tcPr marL="6285" marR="6285" marT="6285" marB="0" anchor="ctr"/>
+                </a:tc>
+                <a:tc>
+                  <a:txBody>
+                    <a:bodyPr/>
+                    <a:lstStyle/>
+                    <a:p>
+                      <a:pPr algn="ctr" fontAlgn="ctr"/>
+                      <a:r>
+                        <a:rPr lang="pt-BR" sz="700" u="none" strike="noStrike" dirty="0">
+                          <a:effectLst/>
+                        </a:rPr>
+                        <a:t>Exibir mensagem informando que o jogo foi alterado com sucesso.</a:t>
+                      </a:r>
+                      <a:endParaRPr lang="pt-BR" sz="700" b="0" i="0" u="none" strike="noStrike" dirty="0">
+                        <a:solidFill>
+                          <a:srgbClr val="000000"/>
+                        </a:solidFill>
+                        <a:effectLst/>
+                        <a:latin typeface="Arial" panose="020B0604020202020204" pitchFamily="34" charset="0"/>
+                      </a:endParaRPr>
+                    </a:p>
+                  </a:txBody>
+                  <a:tcPr marL="6285" marR="6285" marT="6285" marB="0" anchor="ctr"/>
+                </a:tc>
+                <a:tc>
+                  <a:txBody>
+                    <a:bodyPr/>
+                    <a:lstStyle/>
+                    <a:p>
+                      <a:pPr algn="ctr" fontAlgn="ctr"/>
+                      <a:r>
+                        <a:rPr lang="pt-BR" sz="700" u="none" strike="noStrike" dirty="0">
+                          <a:effectLst/>
+                        </a:rPr>
+                        <a:t>Reprovado</a:t>
+                      </a:r>
+                      <a:endParaRPr lang="pt-BR" sz="700" b="0" i="0" u="none" strike="noStrike" dirty="0">
+                        <a:effectLst/>
+                        <a:latin typeface="Arial" panose="020B0604020202020204" pitchFamily="34" charset="0"/>
+                      </a:endParaRPr>
+                    </a:p>
+                  </a:txBody>
+                  <a:tcPr marL="6285" marR="6285" marT="6285" marB="0" anchor="ctr"/>
+                </a:tc>
+                <a:tc>
+                  <a:txBody>
+                    <a:bodyPr/>
+                    <a:lstStyle/>
+                    <a:p>
+                      <a:pPr algn="ctr" fontAlgn="ctr"/>
+                      <a:r>
+                        <a:rPr lang="pt-BR" sz="700" u="none" strike="noStrike" dirty="0">
+                          <a:effectLst/>
+                        </a:rPr>
+                        <a:t>O software só realiza a alteração do nome do jogo</a:t>
+                      </a:r>
+                      <a:endParaRPr lang="pt-BR" sz="700" b="0" i="0" u="none" strike="noStrike" dirty="0">
+                        <a:effectLst/>
+                        <a:latin typeface="Arial" panose="020B0604020202020204" pitchFamily="34" charset="0"/>
+                      </a:endParaRPr>
+                    </a:p>
+                  </a:txBody>
+                  <a:tcPr marL="6285" marR="6285" marT="6285" marB="0" anchor="ctr"/>
+                </a:tc>
+              </a:tr>
+            </a:tbl>
+          </a:graphicData>
+        </a:graphic>
+      </p:graphicFrame>
+      <p:graphicFrame>
+        <p:nvGraphicFramePr>
+          <p:cNvPr id="9" name="Tabela 8"/>
+          <p:cNvGraphicFramePr>
+            <a:graphicFrameLocks noGrp="1"/>
+          </p:cNvGraphicFramePr>
+          <p:nvPr>
+            <p:extLst>
+              <p:ext uri="{D42A27DB-BD31-4B8C-83A1-F6EECF244321}">
+                <p14:modId xmlns:p14="http://schemas.microsoft.com/office/powerpoint/2010/main" val="2419538302"/>
+              </p:ext>
+            </p:extLst>
+          </p:nvPr>
+        </p:nvGraphicFramePr>
+        <p:xfrm>
+          <a:off x="1043323" y="3976012"/>
+          <a:ext cx="7128792" cy="469890"/>
+        </p:xfrm>
+        <a:graphic>
+          <a:graphicData uri="http://schemas.openxmlformats.org/drawingml/2006/table">
+            <a:tbl>
+              <a:tblPr>
+                <a:tableStyleId>{5C22544A-7EE6-4342-B048-85BDC9FD1C3A}</a:tableStyleId>
+              </a:tblPr>
+              <a:tblGrid>
+                <a:gridCol w="406530"/>
+                <a:gridCol w="1829385"/>
+                <a:gridCol w="2156060"/>
+                <a:gridCol w="588016"/>
+                <a:gridCol w="2148801"/>
+              </a:tblGrid>
+              <a:tr h="469890">
+                <a:tc>
+                  <a:txBody>
+                    <a:bodyPr/>
+                    <a:lstStyle/>
+                    <a:p>
+                      <a:pPr algn="ctr" fontAlgn="ctr"/>
+                      <a:r>
+                        <a:rPr lang="pt-BR" sz="700" u="none" strike="noStrike" dirty="0">
+                          <a:effectLst/>
+                        </a:rPr>
+                        <a:t>CT009</a:t>
+                      </a:r>
+                      <a:endParaRPr lang="pt-BR" sz="700" b="0" i="0" u="none" strike="noStrike" dirty="0">
+                        <a:effectLst/>
+                        <a:latin typeface="Arial" panose="020B0604020202020204" pitchFamily="34" charset="0"/>
+                      </a:endParaRPr>
+                    </a:p>
+                  </a:txBody>
+                  <a:tcPr marL="6285" marR="6285" marT="6285" marB="0" anchor="ctr"/>
+                </a:tc>
+                <a:tc>
+                  <a:txBody>
+                    <a:bodyPr/>
+                    <a:lstStyle/>
+                    <a:p>
+                      <a:pPr algn="ctr" fontAlgn="ctr"/>
+                      <a:r>
+                        <a:rPr lang="pt-BR" sz="700" u="none" strike="noStrike" dirty="0">
+                          <a:effectLst/>
+                        </a:rPr>
+                        <a:t>Verificar se há um limite de caracteres que podem ser inseridos no nome de um jogo</a:t>
+                      </a:r>
+                      <a:endParaRPr lang="pt-BR" sz="700" b="0" i="0" u="none" strike="noStrike" dirty="0">
+                        <a:effectLst/>
+                        <a:latin typeface="Arial" panose="020B0604020202020204" pitchFamily="34" charset="0"/>
+                      </a:endParaRPr>
+                    </a:p>
+                  </a:txBody>
+                  <a:tcPr marL="6285" marR="6285" marT="6285" marB="0" anchor="ctr"/>
+                </a:tc>
+                <a:tc>
+                  <a:txBody>
+                    <a:bodyPr/>
+                    <a:lstStyle/>
+                    <a:p>
+                      <a:pPr algn="ctr" fontAlgn="ctr"/>
+                      <a:r>
+                        <a:rPr lang="pt-BR" sz="700" u="none" strike="noStrike" dirty="0">
+                          <a:effectLst/>
+                        </a:rPr>
+                        <a:t>Não deixar inserir mais caracteres do que o definido e/ou exibir mensagem informando que a quantidade inserida excede o limite</a:t>
+                      </a:r>
+                      <a:endParaRPr lang="pt-BR" sz="700" b="0" i="0" u="none" strike="noStrike" dirty="0">
+                        <a:effectLst/>
+                        <a:latin typeface="Arial" panose="020B0604020202020204" pitchFamily="34" charset="0"/>
+                      </a:endParaRPr>
+                    </a:p>
+                  </a:txBody>
+                  <a:tcPr marL="6285" marR="6285" marT="6285" marB="0" anchor="ctr"/>
+                </a:tc>
+                <a:tc>
+                  <a:txBody>
+                    <a:bodyPr/>
+                    <a:lstStyle/>
+                    <a:p>
+                      <a:pPr algn="ctr" fontAlgn="ctr"/>
+                      <a:r>
+                        <a:rPr lang="pt-BR" sz="700" u="none" strike="noStrike" dirty="0">
+                          <a:effectLst/>
+                        </a:rPr>
+                        <a:t>Reprovado</a:t>
+                      </a:r>
+                      <a:endParaRPr lang="pt-BR" sz="700" b="0" i="0" u="none" strike="noStrike" dirty="0">
+                        <a:effectLst/>
+                        <a:latin typeface="Arial" panose="020B0604020202020204" pitchFamily="34" charset="0"/>
+                      </a:endParaRPr>
+                    </a:p>
+                  </a:txBody>
+                  <a:tcPr marL="6285" marR="6285" marT="6285" marB="0" anchor="ctr"/>
+                </a:tc>
+                <a:tc>
+                  <a:txBody>
+                    <a:bodyPr/>
+                    <a:lstStyle/>
+                    <a:p>
+                      <a:pPr algn="ctr" fontAlgn="ctr"/>
+                      <a:r>
+                        <a:rPr lang="pt-BR" sz="700" u="none" strike="noStrike" dirty="0">
+                          <a:effectLst/>
+                        </a:rPr>
+                        <a:t>O jogo não apresenta limite de caracteres para o nome do jogo</a:t>
+                      </a:r>
+                      <a:endParaRPr lang="pt-BR" sz="700" b="0" i="0" u="none" strike="noStrike" dirty="0">
+                        <a:effectLst/>
+                        <a:latin typeface="Arial" panose="020B0604020202020204" pitchFamily="34" charset="0"/>
+                      </a:endParaRPr>
+                    </a:p>
+                  </a:txBody>
+                  <a:tcPr marL="6285" marR="6285" marT="6285" marB="0" anchor="ctr"/>
+                </a:tc>
+              </a:tr>
+            </a:tbl>
+          </a:graphicData>
+        </a:graphic>
+      </p:graphicFrame>
+      <p:graphicFrame>
+        <p:nvGraphicFramePr>
+          <p:cNvPr id="10" name="Tabela 9"/>
+          <p:cNvGraphicFramePr>
+            <a:graphicFrameLocks noGrp="1"/>
+          </p:cNvGraphicFramePr>
+          <p:nvPr>
+            <p:extLst>
+              <p:ext uri="{D42A27DB-BD31-4B8C-83A1-F6EECF244321}">
+                <p14:modId xmlns:p14="http://schemas.microsoft.com/office/powerpoint/2010/main" val="969050897"/>
+              </p:ext>
+            </p:extLst>
+          </p:nvPr>
+        </p:nvGraphicFramePr>
+        <p:xfrm>
+          <a:off x="1038151" y="3101617"/>
+          <a:ext cx="7139136" cy="518667"/>
+        </p:xfrm>
+        <a:graphic>
+          <a:graphicData uri="http://schemas.openxmlformats.org/drawingml/2006/table">
+            <a:tbl>
+              <a:tblPr>
+                <a:tableStyleId>{5C22544A-7EE6-4342-B048-85BDC9FD1C3A}</a:tableStyleId>
+              </a:tblPr>
+              <a:tblGrid>
+                <a:gridCol w="407120"/>
+                <a:gridCol w="1832039"/>
+                <a:gridCol w="2159189"/>
+                <a:gridCol w="588869"/>
+                <a:gridCol w="2151919"/>
+              </a:tblGrid>
+              <a:tr h="518667">
+                <a:tc>
+                  <a:txBody>
+                    <a:bodyPr/>
+                    <a:lstStyle/>
+                    <a:p>
+                      <a:pPr algn="ctr" fontAlgn="ctr"/>
+                      <a:r>
+                        <a:rPr lang="pt-BR" sz="700" u="none" strike="noStrike" dirty="0">
+                          <a:effectLst/>
+                        </a:rPr>
+                        <a:t>CT049</a:t>
+                      </a:r>
+                      <a:endParaRPr lang="pt-BR" sz="700" b="0" i="0" u="none" strike="noStrike" dirty="0">
+                        <a:effectLst/>
+                        <a:latin typeface="Arial" panose="020B0604020202020204" pitchFamily="34" charset="0"/>
+                      </a:endParaRPr>
+                    </a:p>
+                  </a:txBody>
+                  <a:tcPr marL="6285" marR="6285" marT="6285" marB="0" anchor="ctr"/>
+                </a:tc>
+                <a:tc>
+                  <a:txBody>
+                    <a:bodyPr/>
+                    <a:lstStyle/>
+                    <a:p>
+                      <a:pPr algn="ctr" fontAlgn="ctr"/>
+                      <a:r>
+                        <a:rPr lang="pt-BR" sz="700" u="none" strike="noStrike">
+                          <a:effectLst/>
+                        </a:rPr>
+                        <a:t>Tentar realizar o cadastro de um jogo preenchendo o campo de quantidade de peões com espaços em branco</a:t>
+                      </a:r>
+                      <a:endParaRPr lang="pt-BR" sz="700" b="0" i="0" u="none" strike="noStrike">
+                        <a:effectLst/>
+                        <a:latin typeface="Arial" panose="020B0604020202020204" pitchFamily="34" charset="0"/>
+                      </a:endParaRPr>
+                    </a:p>
+                  </a:txBody>
+                  <a:tcPr marL="6285" marR="6285" marT="6285" marB="0" anchor="ctr"/>
+                </a:tc>
+                <a:tc>
+                  <a:txBody>
+                    <a:bodyPr/>
+                    <a:lstStyle/>
+                    <a:p>
+                      <a:pPr algn="ctr" fontAlgn="ctr"/>
+                      <a:r>
+                        <a:rPr lang="pt-BR" sz="700" u="none" strike="noStrike" dirty="0">
+                          <a:effectLst/>
+                        </a:rPr>
+                        <a:t>Não realizar o cadastro e informar ao usuário que o campo deve ser preenchido com caracteres válidos</a:t>
+                      </a:r>
+                      <a:endParaRPr lang="pt-BR" sz="700" b="0" i="0" u="none" strike="noStrike" dirty="0">
+                        <a:effectLst/>
+                        <a:latin typeface="Arial" panose="020B0604020202020204" pitchFamily="34" charset="0"/>
+                      </a:endParaRPr>
+                    </a:p>
+                  </a:txBody>
+                  <a:tcPr marL="6285" marR="6285" marT="6285" marB="0" anchor="ctr"/>
+                </a:tc>
+                <a:tc>
+                  <a:txBody>
+                    <a:bodyPr/>
+                    <a:lstStyle/>
+                    <a:p>
+                      <a:pPr algn="ctr" fontAlgn="ctr"/>
+                      <a:r>
+                        <a:rPr lang="pt-BR" sz="700" u="none" strike="noStrike">
+                          <a:effectLst/>
+                        </a:rPr>
+                        <a:t>Reprovado</a:t>
+                      </a:r>
+                      <a:endParaRPr lang="pt-BR" sz="700" b="0" i="0" u="none" strike="noStrike">
+                        <a:effectLst/>
+                        <a:latin typeface="Arial" panose="020B0604020202020204" pitchFamily="34" charset="0"/>
+                      </a:endParaRPr>
+                    </a:p>
+                  </a:txBody>
+                  <a:tcPr marL="6285" marR="6285" marT="6285" marB="0" anchor="ctr"/>
+                </a:tc>
+                <a:tc>
+                  <a:txBody>
+                    <a:bodyPr/>
+                    <a:lstStyle/>
+                    <a:p>
+                      <a:pPr algn="ctr" fontAlgn="ctr"/>
+                      <a:r>
+                        <a:rPr lang="pt-BR" sz="700" u="none" strike="noStrike" dirty="0">
+                          <a:effectLst/>
+                        </a:rPr>
+                        <a:t>O software permite que a quantidade de peões do jogo seja preenchendo apenas com espaços em branco</a:t>
+                      </a:r>
+                      <a:endParaRPr lang="pt-BR" sz="700" b="0" i="0" u="none" strike="noStrike" dirty="0">
+                        <a:effectLst/>
+                        <a:latin typeface="Arial" panose="020B0604020202020204" pitchFamily="34" charset="0"/>
+                      </a:endParaRPr>
+                    </a:p>
+                  </a:txBody>
+                  <a:tcPr marL="6285" marR="6285" marT="6285" marB="0" anchor="ctr"/>
+                </a:tc>
+              </a:tr>
+            </a:tbl>
+          </a:graphicData>
+        </a:graphic>
+      </p:graphicFrame>
     </p:spTree>
     <p:extLst>
       <p:ext uri="{BB962C8B-B14F-4D97-AF65-F5344CB8AC3E}">
@@ -3324,7 +5415,146 @@
 </p:sld>
 </file>
 
-<file path=ppt/slides/slide11.xml><?xml version="1.0" encoding="utf-8"?>
+<file path=ppt/slides/slide12.xml><?xml version="1.0" encoding="utf-8"?>
+<p:sld xmlns:a="http://schemas.openxmlformats.org/drawingml/2006/main" xmlns:r="http://schemas.openxmlformats.org/officeDocument/2006/relationships" xmlns:p="http://schemas.openxmlformats.org/presentationml/2006/main">
+  <p:cSld>
+    <p:spTree>
+      <p:nvGrpSpPr>
+        <p:cNvPr id="1" name=""/>
+        <p:cNvGrpSpPr/>
+        <p:nvPr/>
+      </p:nvGrpSpPr>
+      <p:grpSpPr>
+        <a:xfrm>
+          <a:off x="0" y="0"/>
+          <a:ext cx="0" cy="0"/>
+          <a:chOff x="0" y="0"/>
+          <a:chExt cx="0" cy="0"/>
+        </a:xfrm>
+      </p:grpSpPr>
+      <p:pic>
+        <p:nvPicPr>
+          <p:cNvPr id="7" name="Espaço Reservado para Conteúdo 6" descr="Nova140722(ppt_novaroma)B-2.jpg"/>
+          <p:cNvPicPr>
+            <a:picLocks noGrp="1" noChangeAspect="1"/>
+          </p:cNvPicPr>
+          <p:nvPr>
+            <p:ph idx="1"/>
+          </p:nvPr>
+        </p:nvPicPr>
+        <p:blipFill>
+          <a:blip r:embed="rId2"/>
+          <a:stretch>
+            <a:fillRect/>
+          </a:stretch>
+        </p:blipFill>
+        <p:spPr>
+          <a:xfrm>
+            <a:off x="0" y="0"/>
+            <a:ext cx="9144000" cy="6858000"/>
+          </a:xfrm>
+        </p:spPr>
+      </p:pic>
+      <p:sp>
+        <p:nvSpPr>
+          <p:cNvPr id="2" name="Título 1"/>
+          <p:cNvSpPr>
+            <a:spLocks noGrp="1"/>
+          </p:cNvSpPr>
+          <p:nvPr>
+            <p:ph type="title"/>
+          </p:nvPr>
+        </p:nvSpPr>
+        <p:spPr>
+          <a:xfrm>
+            <a:off x="714348" y="357166"/>
+            <a:ext cx="5214974" cy="642942"/>
+          </a:xfrm>
+        </p:spPr>
+        <p:txBody>
+          <a:bodyPr>
+            <a:normAutofit/>
+          </a:bodyPr>
+          <a:lstStyle/>
+          <a:p>
+            <a:pPr algn="l"/>
+            <a:r>
+              <a:rPr lang="pt-BR" sz="2300" dirty="0" smtClean="0">
+                <a:solidFill>
+                  <a:schemeClr val="bg1"/>
+                </a:solidFill>
+              </a:rPr>
+              <a:t>Riscos e suas mitigações</a:t>
+            </a:r>
+            <a:endParaRPr lang="pt-BR" sz="2300" dirty="0">
+              <a:solidFill>
+                <a:schemeClr val="bg1"/>
+              </a:solidFill>
+            </a:endParaRPr>
+          </a:p>
+        </p:txBody>
+      </p:sp>
+      <p:sp>
+        <p:nvSpPr>
+          <p:cNvPr id="5" name="CaixaDeTexto 4"/>
+          <p:cNvSpPr txBox="1"/>
+          <p:nvPr/>
+        </p:nvSpPr>
+        <p:spPr>
+          <a:xfrm>
+            <a:off x="1142976" y="1857364"/>
+            <a:ext cx="6929486" cy="646331"/>
+          </a:xfrm>
+          <a:prstGeom prst="rect">
+            <a:avLst/>
+          </a:prstGeom>
+          <a:noFill/>
+        </p:spPr>
+        <p:txBody>
+          <a:bodyPr wrap="square" rtlCol="0">
+            <a:spAutoFit/>
+          </a:bodyPr>
+          <a:lstStyle/>
+          <a:p>
+            <a:pPr marL="285750" indent="-285750">
+              <a:buFont typeface="Arial" panose="020B0604020202020204" pitchFamily="34" charset="0"/>
+              <a:buChar char="•"/>
+            </a:pPr>
+            <a:r>
+              <a:rPr lang="pt-BR" dirty="0" smtClean="0"/>
+              <a:t>Atraso na elaboração e execução dos casos de teste:</a:t>
+            </a:r>
+          </a:p>
+          <a:p>
+            <a:pPr marL="742950" lvl="1" indent="-285750">
+              <a:buFont typeface="Arial" panose="020B0604020202020204" pitchFamily="34" charset="0"/>
+              <a:buChar char="•"/>
+            </a:pPr>
+            <a:endParaRPr lang="pt-BR" dirty="0" smtClean="0"/>
+          </a:p>
+        </p:txBody>
+      </p:sp>
+    </p:spTree>
+    <p:extLst>
+      <p:ext uri="{BB962C8B-B14F-4D97-AF65-F5344CB8AC3E}">
+        <p14:creationId xmlns:p14="http://schemas.microsoft.com/office/powerpoint/2010/main" val="658029853"/>
+      </p:ext>
+    </p:extLst>
+  </p:cSld>
+  <p:clrMapOvr>
+    <a:masterClrMapping/>
+  </p:clrMapOvr>
+  <p:timing>
+    <p:tnLst>
+      <p:par>
+        <p:cTn id="1" dur="indefinite" restart="never" nodeType="tmRoot"/>
+      </p:par>
+    </p:tnLst>
+  </p:timing>
+</p:sld>
+</file>
+
+<file path=ppt/slides/slide13.xml><?xml version="1.0" encoding="utf-8"?>
 <p:sld xmlns:a="http://schemas.openxmlformats.org/drawingml/2006/main" xmlns:r="http://schemas.openxmlformats.org/officeDocument/2006/relationships" xmlns:p="http://schemas.openxmlformats.org/presentationml/2006/main">
   <p:cSld>
     <p:spTree>
@@ -3468,7 +5698,7 @@
         <p:spPr>
           <a:xfrm>
             <a:off x="928662" y="1714488"/>
-            <a:ext cx="7715304" cy="923330"/>
+            <a:ext cx="7715304" cy="1200329"/>
           </a:xfrm>
           <a:prstGeom prst="rect">
             <a:avLst/>
@@ -3486,21 +5716,15 @@
               <a:buChar char="•"/>
             </a:pPr>
             <a:r>
+              <a:rPr lang="pt-BR" b="1" dirty="0" smtClean="0"/>
+              <a:t>Nome: </a:t>
+            </a:r>
+            <a:r>
               <a:rPr lang="pt-BR" dirty="0" smtClean="0"/>
-              <a:t>Nome: </a:t>
-            </a:r>
-            <a:r>
-              <a:rPr lang="pt-BR" dirty="0" err="1" smtClean="0"/>
-              <a:t>Nosce</a:t>
-            </a:r>
-            <a:r>
-              <a:rPr lang="pt-BR" dirty="0" smtClean="0"/>
-              <a:t> Te </a:t>
-            </a:r>
-            <a:r>
-              <a:rPr lang="pt-BR" dirty="0" err="1" smtClean="0"/>
-              <a:t>Ipsum</a:t>
-            </a:r>
+              <a:t>Nosce Te Ipsum</a:t>
+            </a:r>
+          </a:p>
+          <a:p>
             <a:endParaRPr lang="pt-BR" dirty="0" smtClean="0"/>
           </a:p>
           <a:p>
@@ -3637,7 +5861,7 @@
               <a:buChar char="•"/>
             </a:pPr>
             <a:r>
-              <a:rPr lang="pt-BR" dirty="0" smtClean="0"/>
+              <a:rPr lang="pt-BR" b="1" dirty="0" smtClean="0"/>
               <a:t>Os testes foram divididos em quatro módulos:</a:t>
             </a:r>
           </a:p>
@@ -3793,8 +6017,8 @@
         </p:nvSpPr>
         <p:spPr>
           <a:xfrm>
-            <a:off x="1142976" y="1857364"/>
-            <a:ext cx="6929486" cy="3416320"/>
+            <a:off x="1115616" y="1857364"/>
+            <a:ext cx="6929486" cy="3693319"/>
           </a:xfrm>
           <a:prstGeom prst="rect">
             <a:avLst/>
@@ -3808,9 +6032,16 @@
           <a:lstStyle/>
           <a:p>
             <a:r>
+              <a:rPr lang="pt-BR" b="1" dirty="0" smtClean="0"/>
+              <a:t>Foram aplicados os seguintes tipos de testes</a:t>
+            </a:r>
+            <a:r>
               <a:rPr lang="pt-BR" dirty="0" smtClean="0"/>
-              <a:t>Foram aplicados os seguintes tipos de testes:</a:t>
-            </a:r>
+              <a:t>:</a:t>
+            </a:r>
+          </a:p>
+          <a:p>
+            <a:endParaRPr lang="pt-BR" dirty="0" smtClean="0"/>
           </a:p>
           <a:p>
             <a:pPr marL="342900" indent="-342900">
@@ -3906,7 +6137,6 @@
               <a:rPr lang="pt-BR" dirty="0" smtClean="0"/>
               <a:t>Teste de Instalação</a:t>
             </a:r>
-            <a:endParaRPr lang="pt-BR" dirty="0" smtClean="0"/>
           </a:p>
         </p:txBody>
       </p:sp>
@@ -4032,8 +6262,25 @@
           <a:lstStyle/>
           <a:p>
             <a:r>
+              <a:rPr lang="pt-BR" b="1" dirty="0" smtClean="0"/>
+              <a:t>Casos de testes projetados: </a:t>
+            </a:r>
+            <a:r>
               <a:rPr lang="pt-BR" dirty="0" smtClean="0"/>
-              <a:t>Casos de testes projetados: 50</a:t>
+              <a:t>50</a:t>
+            </a:r>
+          </a:p>
+          <a:p>
+            <a:endParaRPr lang="pt-BR" b="1" dirty="0" smtClean="0"/>
+          </a:p>
+          <a:p>
+            <a:r>
+              <a:rPr lang="pt-BR" b="1" dirty="0" smtClean="0"/>
+              <a:t>Casos de testes executados: </a:t>
+            </a:r>
+            <a:r>
+              <a:rPr lang="pt-BR" dirty="0" smtClean="0"/>
+              <a:t>50</a:t>
             </a:r>
           </a:p>
           <a:p>
@@ -4041,29 +6288,32 @@
           </a:p>
           <a:p>
             <a:r>
+              <a:rPr lang="pt-BR" b="1" dirty="0" smtClean="0"/>
+              <a:t>Aprovados: </a:t>
+            </a:r>
+            <a:r>
               <a:rPr lang="pt-BR" dirty="0" smtClean="0"/>
-              <a:t>Casos de testes executados: 50</a:t>
-            </a:r>
-          </a:p>
-          <a:p>
-            <a:endParaRPr lang="pt-BR" dirty="0" smtClean="0"/>
-          </a:p>
-          <a:p>
+              <a:t>28</a:t>
+            </a:r>
+          </a:p>
+          <a:p>
+            <a:r>
+              <a:rPr lang="pt-BR" b="1" dirty="0" smtClean="0"/>
+              <a:t>Reprovados: </a:t>
+            </a:r>
             <a:r>
               <a:rPr lang="pt-BR" dirty="0" smtClean="0"/>
-              <a:t>Aprovados: 28</a:t>
-            </a:r>
-          </a:p>
-          <a:p>
+              <a:t>18</a:t>
+            </a:r>
+          </a:p>
+          <a:p>
+            <a:r>
+              <a:rPr lang="pt-BR" b="1" dirty="0" smtClean="0"/>
+              <a:t>Melhorias: </a:t>
+            </a:r>
             <a:r>
               <a:rPr lang="pt-BR" dirty="0" smtClean="0"/>
-              <a:t>Reprovados: 18</a:t>
-            </a:r>
-          </a:p>
-          <a:p>
-            <a:r>
-              <a:rPr lang="pt-BR" dirty="0" smtClean="0"/>
-              <a:t>Melhorias: 4</a:t>
+              <a:t>4</a:t>
             </a:r>
           </a:p>
           <a:p>
@@ -4191,8 +6441,12 @@
           <a:lstStyle/>
           <a:p>
             <a:r>
+              <a:rPr lang="pt-BR" b="1" dirty="0" smtClean="0"/>
+              <a:t>Casos de testes projetados: </a:t>
+            </a:r>
+            <a:r>
               <a:rPr lang="pt-BR" dirty="0" smtClean="0"/>
-              <a:t>Casos de testes projetados: 20</a:t>
+              <a:t>20</a:t>
             </a:r>
           </a:p>
           <a:p>
@@ -4200,8 +6454,12 @@
           </a:p>
           <a:p>
             <a:r>
+              <a:rPr lang="pt-BR" b="1" dirty="0" smtClean="0"/>
+              <a:t>Casos de testes executados: </a:t>
+            </a:r>
+            <a:r>
               <a:rPr lang="pt-BR" dirty="0" smtClean="0"/>
-              <a:t>Casos de testes executados: 20</a:t>
+              <a:t>20</a:t>
             </a:r>
           </a:p>
           <a:p>
@@ -4209,20 +6467,32 @@
           </a:p>
           <a:p>
             <a:r>
+              <a:rPr lang="pt-BR" b="1" dirty="0" smtClean="0"/>
+              <a:t>Aprovados: </a:t>
+            </a:r>
+            <a:r>
               <a:rPr lang="pt-BR" dirty="0" smtClean="0"/>
-              <a:t>Aprovados: 13</a:t>
-            </a:r>
-          </a:p>
-          <a:p>
+              <a:t>13</a:t>
+            </a:r>
+          </a:p>
+          <a:p>
+            <a:r>
+              <a:rPr lang="pt-BR" b="1" dirty="0" smtClean="0"/>
+              <a:t>Reprovados: </a:t>
+            </a:r>
             <a:r>
               <a:rPr lang="pt-BR" dirty="0" smtClean="0"/>
-              <a:t>Reprovados: 7</a:t>
-            </a:r>
-          </a:p>
-          <a:p>
+              <a:t>7</a:t>
+            </a:r>
+          </a:p>
+          <a:p>
+            <a:r>
+              <a:rPr lang="pt-BR" b="1" dirty="0" smtClean="0"/>
+              <a:t>Melhorias: </a:t>
+            </a:r>
             <a:r>
               <a:rPr lang="pt-BR" dirty="0" smtClean="0"/>
-              <a:t>Melhorias: 0</a:t>
+              <a:t>0</a:t>
             </a:r>
           </a:p>
         </p:txBody>
@@ -4344,8 +6614,12 @@
           <a:lstStyle/>
           <a:p>
             <a:r>
+              <a:rPr lang="pt-BR" b="1" dirty="0" smtClean="0"/>
+              <a:t>Casos de testes projetados: </a:t>
+            </a:r>
+            <a:r>
               <a:rPr lang="pt-BR" dirty="0" smtClean="0"/>
-              <a:t>Casos de testes projetados: 8</a:t>
+              <a:t>8</a:t>
             </a:r>
           </a:p>
           <a:p>
@@ -4353,8 +6627,12 @@
           </a:p>
           <a:p>
             <a:r>
+              <a:rPr lang="pt-BR" b="1" dirty="0" smtClean="0"/>
+              <a:t>Casos de testes executados: </a:t>
+            </a:r>
+            <a:r>
               <a:rPr lang="pt-BR" dirty="0" smtClean="0"/>
-              <a:t>Casos de testes executados: 0</a:t>
+              <a:t>0</a:t>
             </a:r>
           </a:p>
           <a:p>
@@ -4362,20 +6640,32 @@
           </a:p>
           <a:p>
             <a:r>
+              <a:rPr lang="pt-BR" b="1" dirty="0" smtClean="0"/>
+              <a:t>Aprovados: </a:t>
+            </a:r>
+            <a:r>
               <a:rPr lang="pt-BR" dirty="0" smtClean="0"/>
-              <a:t>Aprovados: 0</a:t>
-            </a:r>
-          </a:p>
-          <a:p>
+              <a:t>0</a:t>
+            </a:r>
+          </a:p>
+          <a:p>
+            <a:r>
+              <a:rPr lang="pt-BR" b="1" dirty="0" smtClean="0"/>
+              <a:t>Reprovados: </a:t>
+            </a:r>
             <a:r>
               <a:rPr lang="pt-BR" dirty="0" smtClean="0"/>
-              <a:t>Reprovados: 0</a:t>
-            </a:r>
-          </a:p>
-          <a:p>
+              <a:t>0</a:t>
+            </a:r>
+          </a:p>
+          <a:p>
+            <a:r>
+              <a:rPr lang="pt-BR" b="1" dirty="0" smtClean="0"/>
+              <a:t>Melhorias: </a:t>
+            </a:r>
             <a:r>
               <a:rPr lang="pt-BR" dirty="0" smtClean="0"/>
-              <a:t>Melhorias: 0</a:t>
+              <a:t>0</a:t>
             </a:r>
           </a:p>
         </p:txBody>
@@ -4497,8 +6787,12 @@
           <a:lstStyle/>
           <a:p>
             <a:r>
+              <a:rPr lang="pt-BR" b="1" dirty="0" smtClean="0"/>
+              <a:t>Casos de testes projetados: </a:t>
+            </a:r>
+            <a:r>
               <a:rPr lang="pt-BR" dirty="0" smtClean="0"/>
-              <a:t>Casos de testes projetados: 9</a:t>
+              <a:t>9</a:t>
             </a:r>
           </a:p>
           <a:p>
@@ -4506,8 +6800,12 @@
           </a:p>
           <a:p>
             <a:r>
+              <a:rPr lang="pt-BR" b="1" dirty="0" smtClean="0"/>
+              <a:t>Casos de testes executados: </a:t>
+            </a:r>
+            <a:r>
               <a:rPr lang="pt-BR" dirty="0" smtClean="0"/>
-              <a:t>Casos de testes executados: 0</a:t>
+              <a:t>0</a:t>
             </a:r>
           </a:p>
           <a:p>
@@ -4515,20 +6813,32 @@
           </a:p>
           <a:p>
             <a:r>
+              <a:rPr lang="pt-BR" b="1" dirty="0" smtClean="0"/>
+              <a:t>Aprovados: </a:t>
+            </a:r>
+            <a:r>
               <a:rPr lang="pt-BR" dirty="0" smtClean="0"/>
-              <a:t>Aprovados: 0</a:t>
-            </a:r>
-          </a:p>
-          <a:p>
+              <a:t>0</a:t>
+            </a:r>
+          </a:p>
+          <a:p>
+            <a:r>
+              <a:rPr lang="pt-BR" b="1" dirty="0" smtClean="0"/>
+              <a:t>Reprovados: </a:t>
+            </a:r>
             <a:r>
               <a:rPr lang="pt-BR" dirty="0" smtClean="0"/>
-              <a:t>Reprovados: 0</a:t>
-            </a:r>
-          </a:p>
-          <a:p>
+              <a:t>0</a:t>
+            </a:r>
+          </a:p>
+          <a:p>
+            <a:r>
+              <a:rPr lang="pt-BR" b="1" dirty="0" smtClean="0"/>
+              <a:t>Melhorias: </a:t>
+            </a:r>
             <a:r>
               <a:rPr lang="pt-BR" dirty="0" smtClean="0"/>
-              <a:t>Melhorias: 0</a:t>
+              <a:t>0</a:t>
             </a:r>
           </a:p>
         </p:txBody>
@@ -4617,7 +6927,7 @@
                   <a:schemeClr val="bg1"/>
                 </a:solidFill>
               </a:rPr>
-              <a:t>Ambiente de teste</a:t>
+              <a:t>Gráfico Resultado Geral</a:t>
             </a:r>
             <a:endParaRPr lang="pt-BR" sz="2300" dirty="0">
               <a:solidFill>
@@ -4627,115 +6937,34 @@
           </a:p>
         </p:txBody>
       </p:sp>
-      <p:sp>
-        <p:nvSpPr>
-          <p:cNvPr id="5" name="CaixaDeTexto 4"/>
-          <p:cNvSpPr txBox="1"/>
-          <p:nvPr/>
-        </p:nvSpPr>
-        <p:spPr>
-          <a:xfrm>
-            <a:off x="1142976" y="1857364"/>
-            <a:ext cx="6929486" cy="3139321"/>
-          </a:xfrm>
-          <a:prstGeom prst="rect">
-            <a:avLst/>
-          </a:prstGeom>
-          <a:noFill/>
-        </p:spPr>
-        <p:txBody>
-          <a:bodyPr wrap="square" rtlCol="0">
-            <a:spAutoFit/>
-          </a:bodyPr>
-          <a:lstStyle/>
-          <a:p>
-            <a:r>
-              <a:rPr lang="pt-BR" dirty="0" smtClean="0"/>
-              <a:t>Para a realização dos testes previstos:</a:t>
-            </a:r>
-          </a:p>
-          <a:p>
-            <a:pPr marL="342900" indent="-342900">
-              <a:buFont typeface="Arial" panose="020B0604020202020204" pitchFamily="34" charset="0"/>
-              <a:buChar char="•"/>
-            </a:pPr>
-            <a:r>
-              <a:rPr lang="pt-BR" dirty="0" smtClean="0"/>
-              <a:t>Foram utilizadas as seguintes ferramentas:</a:t>
-            </a:r>
-          </a:p>
-          <a:p>
-            <a:pPr marL="800100" lvl="1" indent="-342900">
-              <a:buFont typeface="+mj-lt"/>
-              <a:buAutoNum type="arabicPeriod"/>
-            </a:pPr>
-            <a:r>
-              <a:rPr lang="pt-BR" dirty="0" smtClean="0"/>
-              <a:t>Microsoft Word, Excel e PowerPoint 2013, para elaboração de plano, projeto</a:t>
-            </a:r>
-            <a:r>
-              <a:rPr lang="pt-BR" dirty="0"/>
-              <a:t> </a:t>
-            </a:r>
-            <a:r>
-              <a:rPr lang="pt-BR" dirty="0" smtClean="0"/>
-              <a:t>e avaliação dos testes, além de outros documentos, como o de Solicitação de Mudanças;</a:t>
-            </a:r>
-          </a:p>
-          <a:p>
-            <a:pPr marL="800100" lvl="1" indent="-342900">
-              <a:buFont typeface="+mj-lt"/>
-              <a:buAutoNum type="arabicPeriod"/>
-            </a:pPr>
-            <a:r>
-              <a:rPr lang="pt-BR" dirty="0" err="1" smtClean="0"/>
-              <a:t>GitHub</a:t>
-            </a:r>
-            <a:r>
-              <a:rPr lang="pt-BR" dirty="0" smtClean="0"/>
-              <a:t> na sua versão para desktop , para o gerenciamento de configuração dos documentos utilizados.</a:t>
-            </a:r>
-            <a:endParaRPr lang="pt-BR" dirty="0"/>
-          </a:p>
-          <a:p>
-            <a:endParaRPr lang="pt-BR" dirty="0"/>
-          </a:p>
-          <a:p>
-            <a:pPr marL="342900" indent="-342900">
-              <a:buFont typeface="Arial" panose="020B0604020202020204" pitchFamily="34" charset="0"/>
-              <a:buChar char="•"/>
-            </a:pPr>
-            <a:r>
-              <a:rPr lang="pt-BR" dirty="0" smtClean="0"/>
-              <a:t>Foram necessários os seguintes componentes:</a:t>
-            </a:r>
-          </a:p>
-          <a:p>
-            <a:pPr marL="800100" lvl="1" indent="-342900">
-              <a:buFont typeface="+mj-lt"/>
-              <a:buAutoNum type="arabicPeriod"/>
-            </a:pPr>
-            <a:r>
-              <a:rPr lang="pt-BR" dirty="0" smtClean="0"/>
-              <a:t>Notebook com Windows 8 instalado;</a:t>
-            </a:r>
-          </a:p>
-          <a:p>
-            <a:pPr marL="800100" lvl="1" indent="-342900">
-              <a:buFont typeface="+mj-lt"/>
-              <a:buAutoNum type="arabicPeriod"/>
-            </a:pPr>
-            <a:r>
-              <a:rPr lang="pt-BR" dirty="0" smtClean="0"/>
-              <a:t>Computador com Windows 7 instalado;</a:t>
-            </a:r>
-          </a:p>
-        </p:txBody>
-      </p:sp>
+      <p:graphicFrame>
+        <p:nvGraphicFramePr>
+          <p:cNvPr id="6" name="Gráfico 5"/>
+          <p:cNvGraphicFramePr>
+            <a:graphicFrameLocks/>
+          </p:cNvGraphicFramePr>
+          <p:nvPr>
+            <p:extLst>
+              <p:ext uri="{D42A27DB-BD31-4B8C-83A1-F6EECF244321}">
+                <p14:modId xmlns:p14="http://schemas.microsoft.com/office/powerpoint/2010/main" val="2054678751"/>
+              </p:ext>
+            </p:extLst>
+          </p:nvPr>
+        </p:nvGraphicFramePr>
+        <p:xfrm>
+          <a:off x="827584" y="1628800"/>
+          <a:ext cx="7416824" cy="4464496"/>
+        </p:xfrm>
+        <a:graphic>
+          <a:graphicData uri="http://schemas.openxmlformats.org/drawingml/2006/chart">
+            <c:chart xmlns:c="http://schemas.openxmlformats.org/drawingml/2006/chart" xmlns:r="http://schemas.openxmlformats.org/officeDocument/2006/relationships" r:id="rId3"/>
+          </a:graphicData>
+        </a:graphic>
+      </p:graphicFrame>
     </p:spTree>
     <p:extLst>
       <p:ext uri="{BB962C8B-B14F-4D97-AF65-F5344CB8AC3E}">
-        <p14:creationId xmlns:p14="http://schemas.microsoft.com/office/powerpoint/2010/main" val="3056095027"/>
+        <p14:creationId xmlns:p14="http://schemas.microsoft.com/office/powerpoint/2010/main" val="1291680229"/>
       </p:ext>
     </p:extLst>
   </p:cSld>

</xml_diff>

<commit_message>
Atualização da Avaliação e Projeto de Testes
Documento de Avaliação dos Testes atualizado; Inclusão dos resultados
dos testes dos módulos Jogar e Interface Gráfica.
</commit_message>
<xml_diff>
--- a/FINDERRORS_-_Avaliação_dos_Testes.pptx
+++ b/FINDERRORS_-_Avaliação_dos_Testes.pptx
@@ -17,7 +17,8 @@
     <p:sldId id="267" r:id="rId11"/>
     <p:sldId id="266" r:id="rId12"/>
     <p:sldId id="269" r:id="rId13"/>
-    <p:sldId id="258" r:id="rId14"/>
+    <p:sldId id="270" r:id="rId14"/>
+    <p:sldId id="258" r:id="rId15"/>
   </p:sldIdLst>
   <p:sldSz cx="9144000" cy="6858000" type="screen4x3"/>
   <p:notesSz cx="6858000" cy="9144000"/>
@@ -156,10 +157,11 @@
           <a:lstStyle/>
           <a:p>
             <a:pPr>
-              <a:defRPr sz="1800" b="1" i="0" u="none" strike="noStrike" kern="1200" cap="none" baseline="0">
+              <a:defRPr sz="1862" b="0" i="0" u="none" strike="noStrike" kern="1200" spc="0" baseline="0">
                 <a:solidFill>
-                  <a:schemeClr val="lt1">
-                    <a:lumMod val="85000"/>
+                  <a:schemeClr val="tx1">
+                    <a:lumMod val="65000"/>
+                    <a:lumOff val="35000"/>
                   </a:schemeClr>
                 </a:solidFill>
                 <a:latin typeface="+mn-lt"/>
@@ -168,13 +170,10 @@
               </a:defRPr>
             </a:pPr>
             <a:r>
-              <a:rPr lang="pt-BR" sz="1800"/>
-              <a:t>Resultado Geral dos</a:t>
-            </a:r>
-            <a:r>
-              <a:rPr lang="pt-BR" sz="1800" baseline="0"/>
-              <a:t> Testes</a:t>
-            </a:r>
+              <a:rPr lang="pt-BR" dirty="0" smtClean="0"/>
+              <a:t>Avaliação dos Testes</a:t>
+            </a:r>
+            <a:endParaRPr lang="pt-BR" dirty="0"/>
           </a:p>
         </c:rich>
       </c:tx>
@@ -192,10 +191,11 @@
         <a:lstStyle/>
         <a:p>
           <a:pPr>
-            <a:defRPr sz="1800" b="1" i="0" u="none" strike="noStrike" kern="1200" cap="none" baseline="0">
+            <a:defRPr sz="1862" b="0" i="0" u="none" strike="noStrike" kern="1200" spc="0" baseline="0">
               <a:solidFill>
-                <a:schemeClr val="lt1">
-                  <a:lumMod val="85000"/>
+                <a:schemeClr val="tx1">
+                  <a:lumMod val="65000"/>
+                  <a:lumOff val="35000"/>
                 </a:schemeClr>
               </a:solidFill>
               <a:latin typeface="+mn-lt"/>
@@ -210,403 +210,194 @@
     <c:autoTitleDeleted val="0"/>
     <c:plotArea>
       <c:layout/>
-      <c:lineChart>
-        <c:grouping val="standard"/>
+      <c:barChart>
+        <c:barDir val="col"/>
+        <c:grouping val="clustered"/>
         <c:varyColors val="0"/>
         <c:ser>
           <c:idx val="0"/>
           <c:order val="0"/>
           <c:tx>
             <c:strRef>
-              <c:f>Plan1!$I$6</c:f>
+              <c:f>Plan1!$B$1</c:f>
               <c:strCache>
                 <c:ptCount val="1"/>
                 <c:pt idx="0">
-                  <c:v>Gerenciar</c:v>
+                  <c:v>Aprovados</c:v>
                 </c:pt>
               </c:strCache>
             </c:strRef>
           </c:tx>
           <c:spPr>
-            <a:ln w="22225" cap="rnd">
-              <a:solidFill>
-                <a:schemeClr val="accent1"/>
-              </a:solidFill>
+            <a:solidFill>
+              <a:schemeClr val="accent1"/>
+            </a:solidFill>
+            <a:ln>
+              <a:noFill/>
             </a:ln>
-            <a:effectLst>
-              <a:glow rad="139700">
-                <a:schemeClr val="accent1">
-                  <a:satMod val="175000"/>
-                  <a:alpha val="14000"/>
-                </a:schemeClr>
-              </a:glow>
-            </a:effectLst>
+            <a:effectLst/>
           </c:spPr>
-          <c:marker>
-            <c:symbol val="none"/>
-          </c:marker>
-          <c:dLbls>
-            <c:spPr>
-              <a:noFill/>
-              <a:ln>
-                <a:noFill/>
-              </a:ln>
-              <a:effectLst/>
-            </c:spPr>
-            <c:txPr>
-              <a:bodyPr rot="0" spcFirstLastPara="1" vertOverflow="ellipsis" vert="horz" wrap="square" lIns="38100" tIns="19050" rIns="38100" bIns="19050" anchor="ctr" anchorCtr="1">
-                <a:spAutoFit/>
-              </a:bodyPr>
-              <a:lstStyle/>
-              <a:p>
-                <a:pPr>
-                  <a:defRPr sz="900" b="0" i="0" u="none" strike="noStrike" kern="1200" baseline="0">
-                    <a:solidFill>
-                      <a:schemeClr val="lt1">
-                        <a:lumMod val="75000"/>
-                      </a:schemeClr>
-                    </a:solidFill>
-                    <a:latin typeface="+mn-lt"/>
-                    <a:ea typeface="+mn-ea"/>
-                    <a:cs typeface="+mn-cs"/>
-                  </a:defRPr>
-                </a:pPr>
-                <a:endParaRPr lang="pt-BR"/>
-              </a:p>
-            </c:txPr>
-            <c:showLegendKey val="0"/>
-            <c:showVal val="1"/>
-            <c:showCatName val="0"/>
-            <c:showSerName val="0"/>
-            <c:showPercent val="0"/>
-            <c:showBubbleSize val="0"/>
-            <c:showLeaderLines val="0"/>
-            <c:extLst>
-              <c:ext xmlns:c15="http://schemas.microsoft.com/office/drawing/2012/chart" uri="{CE6537A1-D6FC-4f65-9D91-7224C49458BB}">
-                <c15:layout/>
-                <c15:showLeaderLines val="1"/>
-                <c15:leaderLines>
-                  <c:spPr>
-                    <a:ln w="9525">
-                      <a:solidFill>
-                        <a:schemeClr val="lt1">
-                          <a:lumMod val="50000"/>
-                        </a:schemeClr>
-                      </a:solidFill>
-                      <a:round/>
-                    </a:ln>
-                    <a:effectLst/>
-                  </c:spPr>
-                </c15:leaderLines>
-              </c:ext>
-            </c:extLst>
-          </c:dLbls>
+          <c:invertIfNegative val="0"/>
           <c:cat>
             <c:strRef>
-              <c:f>Plan1!$H$7:$H$11</c:f>
+              <c:f>Plan1!$A$2:$A$5</c:f>
               <c:strCache>
-                <c:ptCount val="5"/>
+                <c:ptCount val="4"/>
                 <c:pt idx="0">
-                  <c:v>Projetados</c:v>
+                  <c:v>Módulo 1</c:v>
                 </c:pt>
                 <c:pt idx="1">
-                  <c:v>Executados</c:v>
+                  <c:v>Módulo 2</c:v>
                 </c:pt>
                 <c:pt idx="2">
-                  <c:v>Aprovados</c:v>
+                  <c:v>Módulo 3</c:v>
                 </c:pt>
                 <c:pt idx="3">
-                  <c:v>Reprovados</c:v>
-                </c:pt>
-                <c:pt idx="4">
-                  <c:v>Melhorias</c:v>
+                  <c:v>Módulo 4</c:v>
                 </c:pt>
               </c:strCache>
             </c:strRef>
           </c:cat>
           <c:val>
             <c:numRef>
-              <c:f>Plan1!$I$7:$I$11</c:f>
+              <c:f>Plan1!$B$2:$B$5</c:f>
               <c:numCache>
                 <c:formatCode>General</c:formatCode>
-                <c:ptCount val="5"/>
+                <c:ptCount val="4"/>
                 <c:pt idx="0">
-                  <c:v>50</c:v>
+                  <c:v>28</c:v>
                 </c:pt>
                 <c:pt idx="1">
-                  <c:v>50</c:v>
+                  <c:v>13</c:v>
                 </c:pt>
                 <c:pt idx="2">
-                  <c:v>28</c:v>
+                  <c:v>8</c:v>
                 </c:pt>
                 <c:pt idx="3">
-                  <c:v>18</c:v>
-                </c:pt>
-                <c:pt idx="4">
-                  <c:v>4</c:v>
+                  <c:v>5</c:v>
                 </c:pt>
               </c:numCache>
             </c:numRef>
           </c:val>
-          <c:smooth val="0"/>
         </c:ser>
         <c:ser>
           <c:idx val="1"/>
           <c:order val="1"/>
           <c:tx>
             <c:strRef>
-              <c:f>Plan1!$J$6</c:f>
+              <c:f>Plan1!$C$1</c:f>
               <c:strCache>
                 <c:ptCount val="1"/>
                 <c:pt idx="0">
-                  <c:v>Iniciar</c:v>
+                  <c:v>Reprovados</c:v>
                 </c:pt>
               </c:strCache>
             </c:strRef>
           </c:tx>
           <c:spPr>
-            <a:ln w="22225" cap="rnd">
-              <a:solidFill>
-                <a:schemeClr val="accent2"/>
-              </a:solidFill>
+            <a:solidFill>
+              <a:schemeClr val="accent2"/>
+            </a:solidFill>
+            <a:ln>
+              <a:noFill/>
             </a:ln>
-            <a:effectLst>
-              <a:glow rad="139700">
-                <a:schemeClr val="accent2">
-                  <a:satMod val="175000"/>
-                  <a:alpha val="14000"/>
-                </a:schemeClr>
-              </a:glow>
-            </a:effectLst>
+            <a:effectLst/>
           </c:spPr>
-          <c:marker>
-            <c:symbol val="none"/>
-          </c:marker>
-          <c:dLbls>
-            <c:spPr>
-              <a:noFill/>
-              <a:ln>
-                <a:noFill/>
-              </a:ln>
-              <a:effectLst/>
-            </c:spPr>
-            <c:txPr>
-              <a:bodyPr rot="0" spcFirstLastPara="1" vertOverflow="ellipsis" vert="horz" wrap="square" lIns="38100" tIns="19050" rIns="38100" bIns="19050" anchor="ctr" anchorCtr="1">
-                <a:spAutoFit/>
-              </a:bodyPr>
-              <a:lstStyle/>
-              <a:p>
-                <a:pPr>
-                  <a:defRPr sz="900" b="0" i="0" u="none" strike="noStrike" kern="1200" baseline="0">
-                    <a:solidFill>
-                      <a:schemeClr val="lt1">
-                        <a:lumMod val="75000"/>
-                      </a:schemeClr>
-                    </a:solidFill>
-                    <a:latin typeface="+mn-lt"/>
-                    <a:ea typeface="+mn-ea"/>
-                    <a:cs typeface="+mn-cs"/>
-                  </a:defRPr>
-                </a:pPr>
-                <a:endParaRPr lang="pt-BR"/>
-              </a:p>
-            </c:txPr>
-            <c:showLegendKey val="0"/>
-            <c:showVal val="1"/>
-            <c:showCatName val="0"/>
-            <c:showSerName val="0"/>
-            <c:showPercent val="0"/>
-            <c:showBubbleSize val="0"/>
-            <c:showLeaderLines val="0"/>
-            <c:extLst>
-              <c:ext xmlns:c15="http://schemas.microsoft.com/office/drawing/2012/chart" uri="{CE6537A1-D6FC-4f65-9D91-7224C49458BB}">
-                <c15:layout/>
-                <c15:showLeaderLines val="1"/>
-                <c15:leaderLines>
-                  <c:spPr>
-                    <a:ln w="9525">
-                      <a:solidFill>
-                        <a:schemeClr val="lt1">
-                          <a:lumMod val="50000"/>
-                        </a:schemeClr>
-                      </a:solidFill>
-                      <a:round/>
-                    </a:ln>
-                    <a:effectLst/>
-                  </c:spPr>
-                </c15:leaderLines>
-              </c:ext>
-            </c:extLst>
-          </c:dLbls>
+          <c:invertIfNegative val="0"/>
           <c:cat>
             <c:strRef>
-              <c:f>Plan1!$H$7:$H$11</c:f>
+              <c:f>Plan1!$A$2:$A$5</c:f>
               <c:strCache>
-                <c:ptCount val="5"/>
+                <c:ptCount val="4"/>
                 <c:pt idx="0">
-                  <c:v>Projetados</c:v>
+                  <c:v>Módulo 1</c:v>
                 </c:pt>
                 <c:pt idx="1">
-                  <c:v>Executados</c:v>
+                  <c:v>Módulo 2</c:v>
                 </c:pt>
                 <c:pt idx="2">
-                  <c:v>Aprovados</c:v>
+                  <c:v>Módulo 3</c:v>
                 </c:pt>
                 <c:pt idx="3">
-                  <c:v>Reprovados</c:v>
-                </c:pt>
-                <c:pt idx="4">
-                  <c:v>Melhorias</c:v>
+                  <c:v>Módulo 4</c:v>
                 </c:pt>
               </c:strCache>
             </c:strRef>
           </c:cat>
           <c:val>
             <c:numRef>
-              <c:f>Plan1!$J$7:$J$11</c:f>
+              <c:f>Plan1!$C$2:$C$5</c:f>
               <c:numCache>
                 <c:formatCode>General</c:formatCode>
-                <c:ptCount val="5"/>
+                <c:ptCount val="4"/>
                 <c:pt idx="0">
-                  <c:v>20</c:v>
+                  <c:v>18</c:v>
                 </c:pt>
                 <c:pt idx="1">
-                  <c:v>20</c:v>
+                  <c:v>7</c:v>
                 </c:pt>
                 <c:pt idx="2">
-                  <c:v>13</c:v>
+                  <c:v>1</c:v>
                 </c:pt>
                 <c:pt idx="3">
-                  <c:v>7</c:v>
-                </c:pt>
-                <c:pt idx="4">
-                  <c:v>0</c:v>
+                  <c:v>4</c:v>
                 </c:pt>
               </c:numCache>
             </c:numRef>
           </c:val>
-          <c:smooth val="0"/>
         </c:ser>
         <c:ser>
           <c:idx val="2"/>
           <c:order val="2"/>
           <c:tx>
             <c:strRef>
-              <c:f>Plan1!$K$6</c:f>
+              <c:f>Plan1!$D$1</c:f>
               <c:strCache>
                 <c:ptCount val="1"/>
                 <c:pt idx="0">
-                  <c:v>Jogar</c:v>
+                  <c:v>Melhorias</c:v>
                 </c:pt>
               </c:strCache>
             </c:strRef>
           </c:tx>
           <c:spPr>
-            <a:ln w="22225" cap="rnd">
-              <a:solidFill>
-                <a:schemeClr val="accent3"/>
-              </a:solidFill>
+            <a:solidFill>
+              <a:schemeClr val="accent3"/>
+            </a:solidFill>
+            <a:ln>
+              <a:noFill/>
             </a:ln>
-            <a:effectLst>
-              <a:glow rad="139700">
-                <a:schemeClr val="accent3">
-                  <a:satMod val="175000"/>
-                  <a:alpha val="14000"/>
-                </a:schemeClr>
-              </a:glow>
-            </a:effectLst>
+            <a:effectLst/>
           </c:spPr>
-          <c:marker>
-            <c:symbol val="none"/>
-          </c:marker>
-          <c:dLbls>
-            <c:spPr>
-              <a:noFill/>
-              <a:ln>
-                <a:noFill/>
-              </a:ln>
-              <a:effectLst/>
-            </c:spPr>
-            <c:txPr>
-              <a:bodyPr rot="0" spcFirstLastPara="1" vertOverflow="ellipsis" vert="horz" wrap="square" lIns="38100" tIns="19050" rIns="38100" bIns="19050" anchor="ctr" anchorCtr="1">
-                <a:spAutoFit/>
-              </a:bodyPr>
-              <a:lstStyle/>
-              <a:p>
-                <a:pPr>
-                  <a:defRPr sz="900" b="0" i="0" u="none" strike="noStrike" kern="1200" baseline="0">
-                    <a:solidFill>
-                      <a:schemeClr val="lt1">
-                        <a:lumMod val="75000"/>
-                      </a:schemeClr>
-                    </a:solidFill>
-                    <a:latin typeface="+mn-lt"/>
-                    <a:ea typeface="+mn-ea"/>
-                    <a:cs typeface="+mn-cs"/>
-                  </a:defRPr>
-                </a:pPr>
-                <a:endParaRPr lang="pt-BR"/>
-              </a:p>
-            </c:txPr>
-            <c:dLblPos val="ctr"/>
-            <c:showLegendKey val="0"/>
-            <c:showVal val="1"/>
-            <c:showCatName val="0"/>
-            <c:showSerName val="0"/>
-            <c:showPercent val="0"/>
-            <c:showBubbleSize val="0"/>
-            <c:showLeaderLines val="0"/>
-            <c:extLst>
-              <c:ext xmlns:c15="http://schemas.microsoft.com/office/drawing/2012/chart" uri="{CE6537A1-D6FC-4f65-9D91-7224C49458BB}">
-                <c15:layout/>
-                <c15:showLeaderLines val="1"/>
-                <c15:leaderLines>
-                  <c:spPr>
-                    <a:ln w="9525">
-                      <a:solidFill>
-                        <a:schemeClr val="lt1">
-                          <a:lumMod val="50000"/>
-                        </a:schemeClr>
-                      </a:solidFill>
-                      <a:round/>
-                    </a:ln>
-                    <a:effectLst/>
-                  </c:spPr>
-                </c15:leaderLines>
-              </c:ext>
-            </c:extLst>
-          </c:dLbls>
+          <c:invertIfNegative val="0"/>
           <c:cat>
             <c:strRef>
-              <c:f>Plan1!$H$7:$H$11</c:f>
+              <c:f>Plan1!$A$2:$A$5</c:f>
               <c:strCache>
-                <c:ptCount val="5"/>
+                <c:ptCount val="4"/>
                 <c:pt idx="0">
-                  <c:v>Projetados</c:v>
+                  <c:v>Módulo 1</c:v>
                 </c:pt>
                 <c:pt idx="1">
-                  <c:v>Executados</c:v>
+                  <c:v>Módulo 2</c:v>
                 </c:pt>
                 <c:pt idx="2">
-                  <c:v>Aprovados</c:v>
+                  <c:v>Módulo 3</c:v>
                 </c:pt>
                 <c:pt idx="3">
-                  <c:v>Reprovados</c:v>
-                </c:pt>
-                <c:pt idx="4">
-                  <c:v>Melhorias</c:v>
+                  <c:v>Módulo 4</c:v>
                 </c:pt>
               </c:strCache>
             </c:strRef>
           </c:cat>
           <c:val>
             <c:numRef>
-              <c:f>Plan1!$K$7:$K$11</c:f>
+              <c:f>Plan1!$D$2:$D$5</c:f>
               <c:numCache>
                 <c:formatCode>General</c:formatCode>
-                <c:ptCount val="5"/>
+                <c:ptCount val="4"/>
                 <c:pt idx="0">
-                  <c:v>8</c:v>
+                  <c:v>4</c:v>
                 </c:pt>
                 <c:pt idx="1">
                   <c:v>0</c:v>
@@ -615,152 +406,11 @@
                   <c:v>0</c:v>
                 </c:pt>
                 <c:pt idx="3">
-                  <c:v>0</c:v>
-                </c:pt>
-                <c:pt idx="4">
-                  <c:v>0</c:v>
+                  <c:v>1</c:v>
                 </c:pt>
               </c:numCache>
             </c:numRef>
           </c:val>
-          <c:smooth val="0"/>
-        </c:ser>
-        <c:ser>
-          <c:idx val="3"/>
-          <c:order val="3"/>
-          <c:tx>
-            <c:strRef>
-              <c:f>Plan1!$L$6</c:f>
-              <c:strCache>
-                <c:ptCount val="1"/>
-                <c:pt idx="0">
-                  <c:v>Interface</c:v>
-                </c:pt>
-              </c:strCache>
-            </c:strRef>
-          </c:tx>
-          <c:spPr>
-            <a:ln w="22225" cap="rnd">
-              <a:solidFill>
-                <a:schemeClr val="accent4"/>
-              </a:solidFill>
-            </a:ln>
-            <a:effectLst>
-              <a:glow rad="139700">
-                <a:schemeClr val="accent4">
-                  <a:satMod val="175000"/>
-                  <a:alpha val="14000"/>
-                </a:schemeClr>
-              </a:glow>
-            </a:effectLst>
-          </c:spPr>
-          <c:marker>
-            <c:symbol val="none"/>
-          </c:marker>
-          <c:dLbls>
-            <c:spPr>
-              <a:noFill/>
-              <a:ln>
-                <a:noFill/>
-              </a:ln>
-              <a:effectLst/>
-            </c:spPr>
-            <c:txPr>
-              <a:bodyPr rot="0" spcFirstLastPara="1" vertOverflow="ellipsis" vert="horz" wrap="square" lIns="38100" tIns="19050" rIns="38100" bIns="19050" anchor="ctr" anchorCtr="1">
-                <a:spAutoFit/>
-              </a:bodyPr>
-              <a:lstStyle/>
-              <a:p>
-                <a:pPr>
-                  <a:defRPr sz="900" b="0" i="0" u="none" strike="noStrike" kern="1200" baseline="0">
-                    <a:solidFill>
-                      <a:schemeClr val="lt1">
-                        <a:lumMod val="75000"/>
-                      </a:schemeClr>
-                    </a:solidFill>
-                    <a:latin typeface="+mn-lt"/>
-                    <a:ea typeface="+mn-ea"/>
-                    <a:cs typeface="+mn-cs"/>
-                  </a:defRPr>
-                </a:pPr>
-                <a:endParaRPr lang="pt-BR"/>
-              </a:p>
-            </c:txPr>
-            <c:showLegendKey val="0"/>
-            <c:showVal val="1"/>
-            <c:showCatName val="0"/>
-            <c:showSerName val="0"/>
-            <c:showPercent val="0"/>
-            <c:showBubbleSize val="0"/>
-            <c:showLeaderLines val="0"/>
-            <c:extLst>
-              <c:ext xmlns:c15="http://schemas.microsoft.com/office/drawing/2012/chart" uri="{CE6537A1-D6FC-4f65-9D91-7224C49458BB}">
-                <c15:layout/>
-                <c15:showLeaderLines val="1"/>
-                <c15:leaderLines>
-                  <c:spPr>
-                    <a:ln w="9525">
-                      <a:solidFill>
-                        <a:schemeClr val="lt1">
-                          <a:lumMod val="50000"/>
-                        </a:schemeClr>
-                      </a:solidFill>
-                      <a:round/>
-                    </a:ln>
-                    <a:effectLst/>
-                  </c:spPr>
-                </c15:leaderLines>
-              </c:ext>
-            </c:extLst>
-          </c:dLbls>
-          <c:cat>
-            <c:strRef>
-              <c:f>Plan1!$H$7:$H$11</c:f>
-              <c:strCache>
-                <c:ptCount val="5"/>
-                <c:pt idx="0">
-                  <c:v>Projetados</c:v>
-                </c:pt>
-                <c:pt idx="1">
-                  <c:v>Executados</c:v>
-                </c:pt>
-                <c:pt idx="2">
-                  <c:v>Aprovados</c:v>
-                </c:pt>
-                <c:pt idx="3">
-                  <c:v>Reprovados</c:v>
-                </c:pt>
-                <c:pt idx="4">
-                  <c:v>Melhorias</c:v>
-                </c:pt>
-              </c:strCache>
-            </c:strRef>
-          </c:cat>
-          <c:val>
-            <c:numRef>
-              <c:f>Plan1!$L$7:$L$11</c:f>
-              <c:numCache>
-                <c:formatCode>General</c:formatCode>
-                <c:ptCount val="5"/>
-                <c:pt idx="0">
-                  <c:v>9</c:v>
-                </c:pt>
-                <c:pt idx="1">
-                  <c:v>0</c:v>
-                </c:pt>
-                <c:pt idx="2">
-                  <c:v>0</c:v>
-                </c:pt>
-                <c:pt idx="3">
-                  <c:v>0</c:v>
-                </c:pt>
-                <c:pt idx="4">
-                  <c:v>0</c:v>
-                </c:pt>
-              </c:numCache>
-            </c:numRef>
-          </c:val>
-          <c:smooth val="0"/>
         </c:ser>
         <c:dLbls>
           <c:showLegendKey val="0"/>
@@ -770,37 +420,78 @@
           <c:showPercent val="0"/>
           <c:showBubbleSize val="0"/>
         </c:dLbls>
-        <c:smooth val="0"/>
-        <c:axId val="202262048"/>
-        <c:axId val="202262608"/>
-      </c:lineChart>
+        <c:gapWidth val="219"/>
+        <c:overlap val="-27"/>
+        <c:axId val="294722232"/>
+        <c:axId val="294724976"/>
+      </c:barChart>
       <c:catAx>
-        <c:axId val="202262048"/>
+        <c:axId val="294722232"/>
         <c:scaling>
           <c:orientation val="minMax"/>
         </c:scaling>
         <c:delete val="0"/>
         <c:axPos val="b"/>
+        <c:numFmt formatCode="General" sourceLinked="1"/>
+        <c:majorTickMark val="none"/>
+        <c:minorTickMark val="none"/>
+        <c:tickLblPos val="nextTo"/>
+        <c:spPr>
+          <a:noFill/>
+          <a:ln w="9525" cap="flat" cmpd="sng" algn="ctr">
+            <a:solidFill>
+              <a:schemeClr val="tx1">
+                <a:lumMod val="15000"/>
+                <a:lumOff val="85000"/>
+              </a:schemeClr>
+            </a:solidFill>
+            <a:round/>
+          </a:ln>
+          <a:effectLst/>
+        </c:spPr>
+        <c:txPr>
+          <a:bodyPr rot="-60000000" spcFirstLastPara="1" vertOverflow="ellipsis" vert="horz" wrap="square" anchor="ctr" anchorCtr="1"/>
+          <a:lstStyle/>
+          <a:p>
+            <a:pPr>
+              <a:defRPr sz="1197" b="0" i="0" u="none" strike="noStrike" kern="1200" baseline="0">
+                <a:solidFill>
+                  <a:schemeClr val="tx1">
+                    <a:lumMod val="65000"/>
+                    <a:lumOff val="35000"/>
+                  </a:schemeClr>
+                </a:solidFill>
+                <a:latin typeface="+mn-lt"/>
+                <a:ea typeface="+mn-ea"/>
+                <a:cs typeface="+mn-cs"/>
+              </a:defRPr>
+            </a:pPr>
+            <a:endParaRPr lang="pt-BR"/>
+          </a:p>
+        </c:txPr>
+        <c:crossAx val="294724976"/>
+        <c:crosses val="autoZero"/>
+        <c:auto val="1"/>
+        <c:lblAlgn val="ctr"/>
+        <c:lblOffset val="100"/>
+        <c:noMultiLvlLbl val="0"/>
+      </c:catAx>
+      <c:valAx>
+        <c:axId val="294724976"/>
+        <c:scaling>
+          <c:orientation val="minMax"/>
+        </c:scaling>
+        <c:delete val="0"/>
+        <c:axPos val="l"/>
         <c:majorGridlines>
           <c:spPr>
             <a:ln w="9525" cap="flat" cmpd="sng" algn="ctr">
-              <a:gradFill>
-                <a:gsLst>
-                  <a:gs pos="100000">
-                    <a:schemeClr val="dk1">
-                      <a:lumMod val="75000"/>
-                      <a:lumOff val="25000"/>
-                    </a:schemeClr>
-                  </a:gs>
-                  <a:gs pos="0">
-                    <a:schemeClr val="dk1">
-                      <a:lumMod val="65000"/>
-                      <a:lumOff val="35000"/>
-                    </a:schemeClr>
-                  </a:gs>
-                </a:gsLst>
-                <a:lin ang="5400000" scaled="0"/>
-              </a:gradFill>
+              <a:solidFill>
+                <a:schemeClr val="tx1">
+                  <a:lumMod val="15000"/>
+                  <a:lumOff val="85000"/>
+                </a:schemeClr>
+              </a:solidFill>
               <a:round/>
             </a:ln>
             <a:effectLst/>
@@ -822,10 +513,11 @@
           <a:lstStyle/>
           <a:p>
             <a:pPr>
-              <a:defRPr sz="1200" b="0" i="0" u="none" strike="noStrike" kern="1200" baseline="0">
+              <a:defRPr sz="1197" b="0" i="0" u="none" strike="noStrike" kern="1200" baseline="0">
                 <a:solidFill>
-                  <a:schemeClr val="lt1">
-                    <a:lumMod val="75000"/>
+                  <a:schemeClr val="tx1">
+                    <a:lumMod val="65000"/>
+                    <a:lumOff val="35000"/>
                   </a:schemeClr>
                 </a:solidFill>
                 <a:latin typeface="+mn-lt"/>
@@ -836,81 +528,9 @@
             <a:endParaRPr lang="pt-BR"/>
           </a:p>
         </c:txPr>
-        <c:crossAx val="202262608"/>
-        <c:crosses val="autoZero"/>
-        <c:auto val="1"/>
-        <c:lblAlgn val="ctr"/>
-        <c:lblOffset val="100"/>
-        <c:noMultiLvlLbl val="0"/>
-      </c:catAx>
-      <c:valAx>
-        <c:axId val="202262608"/>
-        <c:scaling>
-          <c:orientation val="minMax"/>
-          <c:max val="55"/>
-          <c:min val="0"/>
-        </c:scaling>
-        <c:delete val="0"/>
-        <c:axPos val="l"/>
-        <c:majorGridlines>
-          <c:spPr>
-            <a:ln w="9525" cap="flat" cmpd="sng" algn="ctr">
-              <a:gradFill>
-                <a:gsLst>
-                  <a:gs pos="100000">
-                    <a:schemeClr val="dk1">
-                      <a:lumMod val="75000"/>
-                      <a:lumOff val="25000"/>
-                    </a:schemeClr>
-                  </a:gs>
-                  <a:gs pos="0">
-                    <a:schemeClr val="dk1">
-                      <a:lumMod val="65000"/>
-                      <a:lumOff val="35000"/>
-                    </a:schemeClr>
-                  </a:gs>
-                </a:gsLst>
-                <a:lin ang="5400000" scaled="0"/>
-              </a:gradFill>
-              <a:round/>
-            </a:ln>
-            <a:effectLst/>
-          </c:spPr>
-        </c:majorGridlines>
-        <c:numFmt formatCode="General" sourceLinked="1"/>
-        <c:majorTickMark val="none"/>
-        <c:minorTickMark val="none"/>
-        <c:tickLblPos val="nextTo"/>
-        <c:spPr>
-          <a:noFill/>
-          <a:ln>
-            <a:noFill/>
-          </a:ln>
-          <a:effectLst/>
-        </c:spPr>
-        <c:txPr>
-          <a:bodyPr rot="-60000000" spcFirstLastPara="1" vertOverflow="ellipsis" vert="horz" wrap="square" anchor="ctr" anchorCtr="1"/>
-          <a:lstStyle/>
-          <a:p>
-            <a:pPr>
-              <a:defRPr sz="900" b="0" i="0" u="none" strike="noStrike" kern="1200" baseline="0">
-                <a:solidFill>
-                  <a:schemeClr val="lt1">
-                    <a:lumMod val="75000"/>
-                  </a:schemeClr>
-                </a:solidFill>
-                <a:latin typeface="+mn-lt"/>
-                <a:ea typeface="+mn-ea"/>
-                <a:cs typeface="+mn-cs"/>
-              </a:defRPr>
-            </a:pPr>
-            <a:endParaRPr lang="pt-BR"/>
-          </a:p>
-        </c:txPr>
-        <c:crossAx val="202262048"/>
+        <c:crossAx val="294722232"/>
         <c:crosses val="autoZero"/>
         <c:crossBetween val="between"/>
-        <c:majorUnit val="10"/>
       </c:valAx>
       <c:spPr>
         <a:noFill/>
@@ -921,17 +541,8 @@
       </c:spPr>
     </c:plotArea>
     <c:legend>
-      <c:legendPos val="t"/>
-      <c:layout>
-        <c:manualLayout>
-          <c:xMode val="edge"/>
-          <c:yMode val="edge"/>
-          <c:x val="5.6344198001732286E-2"/>
-          <c:y val="0.11052445785593715"/>
-          <c:w val="0.85564077022725638"/>
-          <c:h val="7.7221727181893768E-2"/>
-        </c:manualLayout>
-      </c:layout>
+      <c:legendPos val="b"/>
+      <c:layout/>
       <c:overlay val="0"/>
       <c:spPr>
         <a:noFill/>
@@ -945,10 +556,11 @@
         <a:lstStyle/>
         <a:p>
           <a:pPr>
-            <a:defRPr sz="1200" b="0" i="0" u="sng" strike="noStrike" kern="1200" baseline="0">
+            <a:defRPr sz="1197" b="0" i="0" u="none" strike="noStrike" kern="1200" baseline="0">
               <a:solidFill>
-                <a:schemeClr val="lt1">
-                  <a:lumMod val="75000"/>
+                <a:schemeClr val="tx1">
+                  <a:lumMod val="65000"/>
+                  <a:lumOff val="35000"/>
                 </a:schemeClr>
               </a:solidFill>
               <a:latin typeface="+mn-lt"/>
@@ -965,20 +577,9 @@
     <c:showDLblsOverMax val="0"/>
   </c:chart>
   <c:spPr>
-    <a:solidFill>
-      <a:schemeClr val="dk1">
-        <a:lumMod val="75000"/>
-        <a:lumOff val="25000"/>
-      </a:schemeClr>
-    </a:solidFill>
-    <a:ln w="9525" cap="flat" cmpd="sng" algn="ctr">
-      <a:solidFill>
-        <a:schemeClr val="dk1">
-          <a:lumMod val="15000"/>
-          <a:lumOff val="85000"/>
-        </a:schemeClr>
-      </a:solidFill>
-      <a:round/>
+    <a:noFill/>
+    <a:ln>
+      <a:noFill/>
     </a:ln>
     <a:effectLst/>
   </c:spPr>
@@ -1039,46 +640,33 @@
 </file>
 
 <file path=ppt/charts/style1.xml><?xml version="1.0" encoding="utf-8"?>
-<cs:chartStyle xmlns:cs="http://schemas.microsoft.com/office/drawing/2012/chartStyle" xmlns:a="http://schemas.openxmlformats.org/drawingml/2006/main" id="236">
+<cs:chartStyle xmlns:cs="http://schemas.microsoft.com/office/drawing/2012/chartStyle" xmlns:a="http://schemas.openxmlformats.org/drawingml/2006/main" id="201">
   <cs:axisTitle>
     <cs:lnRef idx="0"/>
     <cs:fillRef idx="0"/>
     <cs:effectRef idx="0"/>
     <cs:fontRef idx="minor">
-      <a:schemeClr val="lt1">
-        <a:lumMod val="75000"/>
+      <a:schemeClr val="tx1">
+        <a:lumMod val="65000"/>
+        <a:lumOff val="35000"/>
       </a:schemeClr>
     </cs:fontRef>
-    <cs:defRPr sz="900" b="1" kern="1200"/>
+    <cs:defRPr sz="1330" kern="1200"/>
   </cs:axisTitle>
   <cs:categoryAxis>
     <cs:lnRef idx="0"/>
     <cs:fillRef idx="0"/>
     <cs:effectRef idx="0"/>
     <cs:fontRef idx="minor">
-      <a:schemeClr val="lt1">
-        <a:lumMod val="75000"/>
+      <a:schemeClr val="tx1">
+        <a:lumMod val="65000"/>
+        <a:lumOff val="35000"/>
       </a:schemeClr>
     </cs:fontRef>
-    <cs:defRPr sz="900" kern="1200"/>
-  </cs:categoryAxis>
-  <cs:chartArea>
-    <cs:lnRef idx="0"/>
-    <cs:fillRef idx="0"/>
-    <cs:effectRef idx="0"/>
-    <cs:fontRef idx="minor">
-      <a:schemeClr val="dk1"/>
-    </cs:fontRef>
     <cs:spPr>
-      <a:solidFill>
-        <a:schemeClr val="dk1">
-          <a:lumMod val="75000"/>
-          <a:lumOff val="25000"/>
-        </a:schemeClr>
-      </a:solidFill>
       <a:ln w="9525" cap="flat" cmpd="sng" algn="ctr">
         <a:solidFill>
-          <a:schemeClr val="dk1">
+          <a:schemeClr val="tx1">
             <a:lumMod val="15000"/>
             <a:lumOff val="85000"/>
           </a:schemeClr>
@@ -1086,168 +674,137 @@
         <a:round/>
       </a:ln>
     </cs:spPr>
-    <cs:defRPr sz="900" kern="1200"/>
+    <cs:defRPr sz="1197" kern="1200"/>
+  </cs:categoryAxis>
+  <cs:chartArea mods="allowNoFillOverride allowNoLineOverride">
+    <cs:lnRef idx="0"/>
+    <cs:fillRef idx="0"/>
+    <cs:effectRef idx="0"/>
+    <cs:fontRef idx="minor">
+      <a:schemeClr val="tx1"/>
+    </cs:fontRef>
+    <cs:spPr>
+      <a:solidFill>
+        <a:schemeClr val="bg1"/>
+      </a:solidFill>
+      <a:ln w="9525" cap="flat" cmpd="sng" algn="ctr">
+        <a:solidFill>
+          <a:schemeClr val="tx1">
+            <a:lumMod val="15000"/>
+            <a:lumOff val="85000"/>
+          </a:schemeClr>
+        </a:solidFill>
+        <a:round/>
+      </a:ln>
+    </cs:spPr>
+    <cs:defRPr sz="1330" kern="1200"/>
   </cs:chartArea>
   <cs:dataLabel>
     <cs:lnRef idx="0"/>
     <cs:fillRef idx="0"/>
     <cs:effectRef idx="0"/>
     <cs:fontRef idx="minor">
-      <a:schemeClr val="lt1">
+      <a:schemeClr val="tx1">
         <a:lumMod val="75000"/>
+        <a:lumOff val="25000"/>
       </a:schemeClr>
     </cs:fontRef>
-    <cs:defRPr sz="900" kern="1200"/>
+    <cs:defRPr sz="1197" kern="1200"/>
   </cs:dataLabel>
   <cs:dataLabelCallout>
     <cs:lnRef idx="0"/>
     <cs:fillRef idx="0"/>
     <cs:effectRef idx="0"/>
     <cs:fontRef idx="minor">
-      <a:schemeClr val="lt1">
-        <a:lumMod val="15000"/>
-        <a:lumOff val="85000"/>
+      <a:schemeClr val="dk1">
+        <a:lumMod val="65000"/>
+        <a:lumOff val="35000"/>
       </a:schemeClr>
     </cs:fontRef>
     <cs:spPr>
       <a:solidFill>
-        <a:schemeClr val="dk1">
-          <a:lumMod val="65000"/>
-          <a:lumOff val="35000"/>
-        </a:schemeClr>
+        <a:schemeClr val="lt1"/>
       </a:solidFill>
+      <a:ln>
+        <a:solidFill>
+          <a:schemeClr val="dk1">
+            <a:lumMod val="25000"/>
+            <a:lumOff val="75000"/>
+          </a:schemeClr>
+        </a:solidFill>
+      </a:ln>
     </cs:spPr>
-    <cs:defRPr sz="900" kern="1200"/>
+    <cs:defRPr sz="1197" kern="1200"/>
     <cs:bodyPr rot="0" spcFirstLastPara="1" vertOverflow="clip" horzOverflow="clip" vert="horz" wrap="square" lIns="36576" tIns="18288" rIns="36576" bIns="18288" anchor="ctr" anchorCtr="1">
       <a:spAutoFit/>
     </cs:bodyPr>
   </cs:dataLabelCallout>
   <cs:dataPoint>
-    <cs:lnRef idx="0">
+    <cs:lnRef idx="0"/>
+    <cs:fillRef idx="1">
       <cs:styleClr val="auto"/>
-    </cs:lnRef>
-    <cs:fillRef idx="0"/>
-    <cs:effectRef idx="0">
-      <cs:styleClr val="auto"/>
-    </cs:effectRef>
+    </cs:fillRef>
+    <cs:effectRef idx="0"/>
     <cs:fontRef idx="minor">
-      <a:schemeClr val="dk1"/>
+      <a:schemeClr val="tx1"/>
     </cs:fontRef>
-    <cs:spPr>
-      <a:ln w="9525" cap="flat" cmpd="sng" algn="ctr">
-        <a:solidFill>
-          <a:schemeClr val="phClr"/>
-        </a:solidFill>
-        <a:miter lim="800000"/>
-      </a:ln>
-      <a:effectLst>
-        <a:glow rad="63500">
-          <a:schemeClr val="phClr">
-            <a:satMod val="175000"/>
-            <a:alpha val="25000"/>
-          </a:schemeClr>
-        </a:glow>
-      </a:effectLst>
-    </cs:spPr>
   </cs:dataPoint>
   <cs:dataPoint3D>
-    <cs:lnRef idx="0">
-      <cs:styleClr val="auto"/>
-    </cs:lnRef>
-    <cs:fillRef idx="0">
+    <cs:lnRef idx="0"/>
+    <cs:fillRef idx="1">
       <cs:styleClr val="auto"/>
     </cs:fillRef>
-    <cs:effectRef idx="0">
-      <cs:styleClr val="auto"/>
-    </cs:effectRef>
+    <cs:effectRef idx="0"/>
     <cs:fontRef idx="minor">
-      <a:schemeClr val="dk1"/>
+      <a:schemeClr val="tx1"/>
     </cs:fontRef>
-    <cs:spPr>
-      <a:ln w="9525" cap="flat" cmpd="sng" algn="ctr">
-        <a:solidFill>
-          <a:schemeClr val="phClr"/>
-        </a:solidFill>
-        <a:miter lim="800000"/>
-      </a:ln>
-      <a:effectLst>
-        <a:glow rad="63500">
-          <a:schemeClr val="phClr">
-            <a:satMod val="175000"/>
-            <a:alpha val="25000"/>
-          </a:schemeClr>
-        </a:glow>
-      </a:effectLst>
-    </cs:spPr>
   </cs:dataPoint3D>
   <cs:dataPointLine>
     <cs:lnRef idx="0">
       <cs:styleClr val="auto"/>
     </cs:lnRef>
-    <cs:fillRef idx="0">
-      <cs:styleClr val="auto"/>
-    </cs:fillRef>
-    <cs:effectRef idx="0">
-      <cs:styleClr val="auto"/>
-    </cs:effectRef>
+    <cs:fillRef idx="1"/>
+    <cs:effectRef idx="0"/>
     <cs:fontRef idx="minor">
-      <a:schemeClr val="dk1"/>
+      <a:schemeClr val="tx1"/>
     </cs:fontRef>
     <cs:spPr>
-      <a:ln w="22225" cap="rnd">
+      <a:ln w="28575" cap="rnd">
         <a:solidFill>
           <a:schemeClr val="phClr"/>
         </a:solidFill>
+        <a:round/>
       </a:ln>
-      <a:effectLst>
-        <a:glow rad="139700">
-          <a:schemeClr val="phClr">
-            <a:satMod val="175000"/>
-            <a:alpha val="14000"/>
-          </a:schemeClr>
-        </a:glow>
-      </a:effectLst>
     </cs:spPr>
   </cs:dataPointLine>
   <cs:dataPointMarker>
     <cs:lnRef idx="0">
       <cs:styleClr val="auto"/>
     </cs:lnRef>
-    <cs:fillRef idx="0">
+    <cs:fillRef idx="1">
       <cs:styleClr val="auto"/>
     </cs:fillRef>
-    <cs:effectRef idx="0">
-      <cs:styleClr val="auto"/>
-    </cs:effectRef>
+    <cs:effectRef idx="0"/>
     <cs:fontRef idx="minor">
-      <a:schemeClr val="dk1"/>
+      <a:schemeClr val="tx1"/>
     </cs:fontRef>
     <cs:spPr>
-      <a:solidFill>
-        <a:schemeClr val="phClr">
-          <a:lumMod val="60000"/>
-          <a:lumOff val="40000"/>
-        </a:schemeClr>
-      </a:solidFill>
-      <a:effectLst>
-        <a:glow rad="63500">
-          <a:schemeClr val="phClr">
-            <a:satMod val="175000"/>
-            <a:alpha val="25000"/>
-          </a:schemeClr>
-        </a:glow>
-      </a:effectLst>
+      <a:ln w="9525">
+        <a:solidFill>
+          <a:schemeClr val="phClr"/>
+        </a:solidFill>
+      </a:ln>
     </cs:spPr>
   </cs:dataPointMarker>
-  <cs:dataPointMarkerLayout symbol="circle" size="4"/>
+  <cs:dataPointMarkerLayout symbol="circle" size="5"/>
   <cs:dataPointWireframe>
     <cs:lnRef idx="0">
       <cs:styleClr val="auto"/>
     </cs:lnRef>
-    <cs:fillRef idx="0"/>
+    <cs:fillRef idx="1"/>
     <cs:effectRef idx="0"/>
     <cs:fontRef idx="minor">
-      <a:schemeClr val="dk1"/>
+      <a:schemeClr val="tx1"/>
     </cs:fontRef>
     <cs:spPr>
       <a:ln w="9525" cap="rnd">
@@ -1263,43 +820,46 @@
     <cs:fillRef idx="0"/>
     <cs:effectRef idx="0"/>
     <cs:fontRef idx="minor">
-      <a:schemeClr val="lt1">
-        <a:lumMod val="75000"/>
+      <a:schemeClr val="tx1">
+        <a:lumMod val="65000"/>
+        <a:lumOff val="35000"/>
       </a:schemeClr>
     </cs:fontRef>
     <cs:spPr>
-      <a:ln w="9525">
+      <a:noFill/>
+      <a:ln w="9525" cap="flat" cmpd="sng" algn="ctr">
         <a:solidFill>
-          <a:schemeClr val="dk1">
-            <a:lumMod val="50000"/>
-            <a:lumOff val="50000"/>
+          <a:schemeClr val="tx1">
+            <a:lumMod val="15000"/>
+            <a:lumOff val="85000"/>
           </a:schemeClr>
         </a:solidFill>
+        <a:round/>
       </a:ln>
     </cs:spPr>
-    <cs:defRPr sz="900" kern="1200"/>
+    <cs:defRPr sz="1197" kern="1200"/>
   </cs:dataTable>
   <cs:downBar>
     <cs:lnRef idx="0"/>
     <cs:fillRef idx="0"/>
     <cs:effectRef idx="0"/>
     <cs:fontRef idx="minor">
-      <a:schemeClr val="lt1"/>
+      <a:schemeClr val="dk1"/>
     </cs:fontRef>
     <cs:spPr>
       <a:solidFill>
         <a:schemeClr val="dk1">
-          <a:lumMod val="50000"/>
-          <a:lumOff val="50000"/>
+          <a:lumMod val="65000"/>
+          <a:lumOff val="35000"/>
         </a:schemeClr>
       </a:solidFill>
       <a:ln w="9525">
         <a:solidFill>
-          <a:schemeClr val="dk1">
-            <a:lumMod val="75000"/>
+          <a:schemeClr val="tx1">
+            <a:lumMod val="65000"/>
+            <a:lumOff val="35000"/>
           </a:schemeClr>
         </a:solidFill>
-        <a:round/>
       </a:ln>
     </cs:spPr>
   </cs:downBar>
@@ -1308,13 +868,14 @@
     <cs:fillRef idx="0"/>
     <cs:effectRef idx="0"/>
     <cs:fontRef idx="minor">
-      <a:schemeClr val="dk1"/>
+      <a:schemeClr val="tx1"/>
     </cs:fontRef>
     <cs:spPr>
-      <a:ln w="9525">
+      <a:ln w="9525" cap="flat" cmpd="sng" algn="ctr">
         <a:solidFill>
-          <a:schemeClr val="lt1">
-            <a:lumMod val="50000"/>
+          <a:schemeClr val="tx1">
+            <a:lumMod val="35000"/>
+            <a:lumOff val="65000"/>
           </a:schemeClr>
         </a:solidFill>
         <a:round/>
@@ -1326,13 +887,14 @@
     <cs:fillRef idx="0"/>
     <cs:effectRef idx="0"/>
     <cs:fontRef idx="minor">
-      <a:schemeClr val="dk1"/>
+      <a:schemeClr val="tx1"/>
     </cs:fontRef>
     <cs:spPr>
-      <a:ln w="9525">
+      <a:ln w="9525" cap="flat" cmpd="sng" algn="ctr">
         <a:solidFill>
-          <a:schemeClr val="lt1">
-            <a:lumMod val="50000"/>
+          <a:schemeClr val="tx1">
+            <a:lumMod val="65000"/>
+            <a:lumOff val="35000"/>
           </a:schemeClr>
         </a:solidFill>
         <a:round/>
@@ -1344,35 +906,30 @@
     <cs:fillRef idx="0"/>
     <cs:effectRef idx="0"/>
     <cs:fontRef idx="minor">
-      <a:schemeClr val="dk1"/>
+      <a:schemeClr val="tx1"/>
     </cs:fontRef>
+    <cs:spPr>
+      <a:noFill/>
+      <a:ln>
+        <a:noFill/>
+      </a:ln>
+    </cs:spPr>
   </cs:floor>
   <cs:gridlineMajor>
     <cs:lnRef idx="0"/>
     <cs:fillRef idx="0"/>
     <cs:effectRef idx="0"/>
     <cs:fontRef idx="minor">
-      <a:schemeClr val="dk1"/>
+      <a:schemeClr val="tx1"/>
     </cs:fontRef>
     <cs:spPr>
       <a:ln w="9525" cap="flat" cmpd="sng" algn="ctr">
-        <a:gradFill>
-          <a:gsLst>
-            <a:gs pos="100000">
-              <a:schemeClr val="dk1">
-                <a:lumMod val="75000"/>
-                <a:lumOff val="25000"/>
-              </a:schemeClr>
-            </a:gs>
-            <a:gs pos="0">
-              <a:schemeClr val="dk1">
-                <a:lumMod val="65000"/>
-                <a:lumOff val="35000"/>
-              </a:schemeClr>
-            </a:gs>
-          </a:gsLst>
-          <a:lin ang="5400000" scaled="0"/>
-        </a:gradFill>
+        <a:solidFill>
+          <a:schemeClr val="tx1">
+            <a:lumMod val="15000"/>
+            <a:lumOff val="85000"/>
+          </a:schemeClr>
+        </a:solidFill>
         <a:round/>
       </a:ln>
     </cs:spPr>
@@ -1382,29 +939,16 @@
     <cs:fillRef idx="0"/>
     <cs:effectRef idx="0"/>
     <cs:fontRef idx="minor">
-      <a:schemeClr val="dk1"/>
+      <a:schemeClr val="tx1"/>
     </cs:fontRef>
     <cs:spPr>
       <a:ln w="9525" cap="flat" cmpd="sng" algn="ctr">
-        <a:gradFill>
-          <a:gsLst>
-            <a:gs pos="100000">
-              <a:schemeClr val="dk1">
-                <a:lumMod val="75000"/>
-                <a:lumOff val="25000"/>
-                <a:alpha val="25000"/>
-              </a:schemeClr>
-            </a:gs>
-            <a:gs pos="0">
-              <a:schemeClr val="dk1">
-                <a:lumMod val="65000"/>
-                <a:lumOff val="35000"/>
-                <a:alpha val="25000"/>
-              </a:schemeClr>
-            </a:gs>
-          </a:gsLst>
-          <a:lin ang="5400000" scaled="0"/>
-        </a:gradFill>
+        <a:solidFill>
+          <a:schemeClr val="tx1">
+            <a:lumMod val="5000"/>
+            <a:lumOff val="95000"/>
+          </a:schemeClr>
+        </a:solidFill>
         <a:round/>
       </a:ln>
     </cs:spPr>
@@ -1414,13 +958,14 @@
     <cs:fillRef idx="0"/>
     <cs:effectRef idx="0"/>
     <cs:fontRef idx="minor">
-      <a:schemeClr val="dk1"/>
+      <a:schemeClr val="tx1"/>
     </cs:fontRef>
     <cs:spPr>
-      <a:ln w="9525">
+      <a:ln w="9525" cap="flat" cmpd="sng" algn="ctr">
         <a:solidFill>
-          <a:schemeClr val="lt1">
-            <a:lumMod val="50000"/>
+          <a:schemeClr val="tx1">
+            <a:lumMod val="75000"/>
+            <a:lumOff val="25000"/>
           </a:schemeClr>
         </a:solidFill>
         <a:round/>
@@ -1432,13 +977,14 @@
     <cs:fillRef idx="0"/>
     <cs:effectRef idx="0"/>
     <cs:fontRef idx="minor">
-      <a:schemeClr val="dk1"/>
+      <a:schemeClr val="tx1"/>
     </cs:fontRef>
     <cs:spPr>
-      <a:ln w="9525">
+      <a:ln w="9525" cap="flat" cmpd="sng" algn="ctr">
         <a:solidFill>
-          <a:schemeClr val="lt1">
-            <a:lumMod val="50000"/>
+          <a:schemeClr val="tx1">
+            <a:lumMod val="35000"/>
+            <a:lumOff val="65000"/>
           </a:schemeClr>
         </a:solidFill>
         <a:round/>
@@ -1450,26 +996,27 @@
     <cs:fillRef idx="0"/>
     <cs:effectRef idx="0"/>
     <cs:fontRef idx="minor">
-      <a:schemeClr val="lt1">
-        <a:lumMod val="75000"/>
+      <a:schemeClr val="tx1">
+        <a:lumMod val="65000"/>
+        <a:lumOff val="35000"/>
       </a:schemeClr>
     </cs:fontRef>
-    <cs:defRPr sz="900" kern="1200"/>
+    <cs:defRPr sz="1197" kern="1200"/>
   </cs:legend>
-  <cs:plotArea>
+  <cs:plotArea mods="allowNoFillOverride allowNoLineOverride">
     <cs:lnRef idx="0"/>
     <cs:fillRef idx="0"/>
     <cs:effectRef idx="0"/>
     <cs:fontRef idx="minor">
-      <a:schemeClr val="dk1"/>
+      <a:schemeClr val="tx1"/>
     </cs:fontRef>
   </cs:plotArea>
-  <cs:plotArea3D>
+  <cs:plotArea3D mods="allowNoFillOverride allowNoLineOverride">
     <cs:lnRef idx="0"/>
     <cs:fillRef idx="0"/>
     <cs:effectRef idx="0"/>
     <cs:fontRef idx="minor">
-      <a:schemeClr val="dk1"/>
+      <a:schemeClr val="tx1"/>
     </cs:fontRef>
   </cs:plotArea3D>
   <cs:seriesAxis>
@@ -1477,24 +1024,26 @@
     <cs:fillRef idx="0"/>
     <cs:effectRef idx="0"/>
     <cs:fontRef idx="minor">
-      <a:schemeClr val="lt1">
-        <a:lumMod val="75000"/>
+      <a:schemeClr val="tx1">
+        <a:lumMod val="65000"/>
+        <a:lumOff val="35000"/>
       </a:schemeClr>
     </cs:fontRef>
-    <cs:defRPr sz="900" kern="1200"/>
+    <cs:defRPr sz="1197" kern="1200"/>
   </cs:seriesAxis>
   <cs:seriesLine>
     <cs:lnRef idx="0"/>
     <cs:fillRef idx="0"/>
     <cs:effectRef idx="0"/>
     <cs:fontRef idx="minor">
-      <a:schemeClr val="dk1"/>
+      <a:schemeClr val="tx1"/>
     </cs:fontRef>
     <cs:spPr>
-      <a:ln w="9525">
+      <a:ln w="9525" cap="flat" cmpd="sng" algn="ctr">
         <a:solidFill>
-          <a:schemeClr val="lt1">
-            <a:lumMod val="50000"/>
+          <a:schemeClr val="tx1">
+            <a:lumMod val="35000"/>
+            <a:lumOff val="65000"/>
           </a:schemeClr>
         </a:solidFill>
         <a:round/>
@@ -1506,11 +1055,12 @@
     <cs:fillRef idx="0"/>
     <cs:effectRef idx="0"/>
     <cs:fontRef idx="minor">
-      <a:schemeClr val="lt1">
-        <a:lumMod val="85000"/>
+      <a:schemeClr val="tx1">
+        <a:lumMod val="65000"/>
+        <a:lumOff val="35000"/>
       </a:schemeClr>
     </cs:fontRef>
-    <cs:defRPr sz="1400" b="1" kern="1200" cap="none" baseline="0"/>
+    <cs:defRPr sz="1862" b="0" kern="1200" spc="0" baseline="0"/>
   </cs:title>
   <cs:trendline>
     <cs:lnRef idx="0">
@@ -1519,15 +1069,14 @@
     <cs:fillRef idx="0"/>
     <cs:effectRef idx="0"/>
     <cs:fontRef idx="minor">
-      <a:schemeClr val="lt1"/>
+      <a:schemeClr val="tx1"/>
     </cs:fontRef>
     <cs:spPr>
-      <a:ln w="25400" cap="rnd">
+      <a:ln w="19050" cap="rnd">
         <a:solidFill>
-          <a:schemeClr val="phClr">
-            <a:alpha val="50000"/>
-          </a:schemeClr>
+          <a:schemeClr val="phClr"/>
         </a:solidFill>
+        <a:prstDash val="sysDot"/>
       </a:ln>
     </cs:spPr>
   </cs:trendline>
@@ -1536,11 +1085,12 @@
     <cs:fillRef idx="0"/>
     <cs:effectRef idx="0"/>
     <cs:fontRef idx="minor">
-      <a:schemeClr val="lt1">
-        <a:lumMod val="75000"/>
+      <a:schemeClr val="tx1">
+        <a:lumMod val="65000"/>
+        <a:lumOff val="35000"/>
       </a:schemeClr>
     </cs:fontRef>
-    <cs:defRPr sz="900" kern="1200"/>
+    <cs:defRPr sz="1197" kern="1200"/>
   </cs:trendlineLabel>
   <cs:upBar>
     <cs:lnRef idx="0"/>
@@ -1551,17 +1101,15 @@
     </cs:fontRef>
     <cs:spPr>
       <a:solidFill>
-        <a:schemeClr val="lt1">
-          <a:lumMod val="85000"/>
-        </a:schemeClr>
+        <a:schemeClr val="lt1"/>
       </a:solidFill>
       <a:ln w="9525">
         <a:solidFill>
-          <a:schemeClr val="dk1">
-            <a:lumMod val="50000"/>
+          <a:schemeClr val="tx1">
+            <a:lumMod val="15000"/>
+            <a:lumOff val="85000"/>
           </a:schemeClr>
         </a:solidFill>
-        <a:round/>
       </a:ln>
     </cs:spPr>
   </cs:upBar>
@@ -1570,19 +1118,26 @@
     <cs:fillRef idx="0"/>
     <cs:effectRef idx="0"/>
     <cs:fontRef idx="minor">
-      <a:schemeClr val="lt1">
-        <a:lumMod val="75000"/>
+      <a:schemeClr val="tx1">
+        <a:lumMod val="65000"/>
+        <a:lumOff val="35000"/>
       </a:schemeClr>
     </cs:fontRef>
-    <cs:defRPr sz="900" kern="1200"/>
+    <cs:defRPr sz="1197" kern="1200"/>
   </cs:valueAxis>
   <cs:wall>
     <cs:lnRef idx="0"/>
     <cs:fillRef idx="0"/>
     <cs:effectRef idx="0"/>
     <cs:fontRef idx="minor">
-      <a:schemeClr val="dk1"/>
+      <a:schemeClr val="tx1"/>
     </cs:fontRef>
+    <cs:spPr>
+      <a:noFill/>
+      <a:ln>
+        <a:noFill/>
+      </a:ln>
+    </cs:spPr>
   </cs:wall>
 </cs:chartStyle>
 </file>
@@ -1769,7 +1324,7 @@
             <a:fld id="{F4448136-D4BD-40DD-93D0-3AD44E3A349C}" type="datetimeFigureOut">
               <a:rPr lang="pt-BR" smtClean="0"/>
               <a:pPr/>
-              <a:t>16/11/2014</a:t>
+              <a:t>19/11/2014</a:t>
             </a:fld>
             <a:endParaRPr lang="pt-BR"/>
           </a:p>
@@ -1936,7 +1491,7 @@
             <a:fld id="{F4448136-D4BD-40DD-93D0-3AD44E3A349C}" type="datetimeFigureOut">
               <a:rPr lang="pt-BR" smtClean="0"/>
               <a:pPr/>
-              <a:t>16/11/2014</a:t>
+              <a:t>19/11/2014</a:t>
             </a:fld>
             <a:endParaRPr lang="pt-BR"/>
           </a:p>
@@ -2113,7 +1668,7 @@
             <a:fld id="{F4448136-D4BD-40DD-93D0-3AD44E3A349C}" type="datetimeFigureOut">
               <a:rPr lang="pt-BR" smtClean="0"/>
               <a:pPr/>
-              <a:t>16/11/2014</a:t>
+              <a:t>19/11/2014</a:t>
             </a:fld>
             <a:endParaRPr lang="pt-BR"/>
           </a:p>
@@ -2280,7 +1835,7 @@
             <a:fld id="{F4448136-D4BD-40DD-93D0-3AD44E3A349C}" type="datetimeFigureOut">
               <a:rPr lang="pt-BR" smtClean="0"/>
               <a:pPr/>
-              <a:t>16/11/2014</a:t>
+              <a:t>19/11/2014</a:t>
             </a:fld>
             <a:endParaRPr lang="pt-BR"/>
           </a:p>
@@ -2523,7 +2078,7 @@
             <a:fld id="{F4448136-D4BD-40DD-93D0-3AD44E3A349C}" type="datetimeFigureOut">
               <a:rPr lang="pt-BR" smtClean="0"/>
               <a:pPr/>
-              <a:t>16/11/2014</a:t>
+              <a:t>19/11/2014</a:t>
             </a:fld>
             <a:endParaRPr lang="pt-BR"/>
           </a:p>
@@ -2808,7 +2363,7 @@
             <a:fld id="{F4448136-D4BD-40DD-93D0-3AD44E3A349C}" type="datetimeFigureOut">
               <a:rPr lang="pt-BR" smtClean="0"/>
               <a:pPr/>
-              <a:t>16/11/2014</a:t>
+              <a:t>19/11/2014</a:t>
             </a:fld>
             <a:endParaRPr lang="pt-BR"/>
           </a:p>
@@ -3227,7 +2782,7 @@
             <a:fld id="{F4448136-D4BD-40DD-93D0-3AD44E3A349C}" type="datetimeFigureOut">
               <a:rPr lang="pt-BR" smtClean="0"/>
               <a:pPr/>
-              <a:t>16/11/2014</a:t>
+              <a:t>19/11/2014</a:t>
             </a:fld>
             <a:endParaRPr lang="pt-BR"/>
           </a:p>
@@ -3342,7 +2897,7 @@
             <a:fld id="{F4448136-D4BD-40DD-93D0-3AD44E3A349C}" type="datetimeFigureOut">
               <a:rPr lang="pt-BR" smtClean="0"/>
               <a:pPr/>
-              <a:t>16/11/2014</a:t>
+              <a:t>19/11/2014</a:t>
             </a:fld>
             <a:endParaRPr lang="pt-BR"/>
           </a:p>
@@ -3434,7 +2989,7 @@
             <a:fld id="{F4448136-D4BD-40DD-93D0-3AD44E3A349C}" type="datetimeFigureOut">
               <a:rPr lang="pt-BR" smtClean="0"/>
               <a:pPr/>
-              <a:t>16/11/2014</a:t>
+              <a:t>19/11/2014</a:t>
             </a:fld>
             <a:endParaRPr lang="pt-BR"/>
           </a:p>
@@ -3708,7 +3263,7 @@
             <a:fld id="{F4448136-D4BD-40DD-93D0-3AD44E3A349C}" type="datetimeFigureOut">
               <a:rPr lang="pt-BR" smtClean="0"/>
               <a:pPr/>
-              <a:t>16/11/2014</a:t>
+              <a:t>19/11/2014</a:t>
             </a:fld>
             <a:endParaRPr lang="pt-BR"/>
           </a:p>
@@ -3958,7 +3513,7 @@
             <a:fld id="{F4448136-D4BD-40DD-93D0-3AD44E3A349C}" type="datetimeFigureOut">
               <a:rPr lang="pt-BR" smtClean="0"/>
               <a:pPr/>
-              <a:t>16/11/2014</a:t>
+              <a:t>19/11/2014</a:t>
             </a:fld>
             <a:endParaRPr lang="pt-BR"/>
           </a:p>
@@ -4168,7 +3723,7 @@
             <a:fld id="{F4448136-D4BD-40DD-93D0-3AD44E3A349C}" type="datetimeFigureOut">
               <a:rPr lang="pt-BR" smtClean="0"/>
               <a:pPr/>
-              <a:t>16/11/2014</a:t>
+              <a:t>19/11/2014</a:t>
             </a:fld>
             <a:endParaRPr lang="pt-BR"/>
           </a:p>
@@ -4895,7 +4450,7 @@
         </p:blipFill>
         <p:spPr>
           <a:xfrm>
-            <a:off x="0" y="0"/>
+            <a:off x="0" y="-27384"/>
             <a:ext cx="9144000" cy="6858000"/>
           </a:xfrm>
         </p:spPr>
@@ -4929,15 +4484,7 @@
                   <a:schemeClr val="bg1"/>
                 </a:solidFill>
               </a:rPr>
-              <a:t>Cobertura de </a:t>
-            </a:r>
-            <a:r>
-              <a:rPr lang="pt-BR" sz="2300" dirty="0" smtClean="0">
-                <a:solidFill>
-                  <a:schemeClr val="bg1"/>
-                </a:solidFill>
-              </a:rPr>
-              <a:t>Testes</a:t>
+              <a:t>Cobertura de Testes</a:t>
             </a:r>
             <a:endParaRPr lang="pt-BR" sz="2300" dirty="0">
               <a:solidFill>
@@ -4983,21 +4530,21 @@
       </p:sp>
       <p:graphicFrame>
         <p:nvGraphicFramePr>
-          <p:cNvPr id="6" name="Tabela 5"/>
+          <p:cNvPr id="3" name="Tabela 2"/>
           <p:cNvGraphicFramePr>
             <a:graphicFrameLocks noGrp="1"/>
           </p:cNvGraphicFramePr>
           <p:nvPr>
             <p:extLst>
               <p:ext uri="{D42A27DB-BD31-4B8C-83A1-F6EECF244321}">
-                <p14:modId xmlns:p14="http://schemas.microsoft.com/office/powerpoint/2010/main" val="1230747029"/>
+                <p14:modId xmlns:p14="http://schemas.microsoft.com/office/powerpoint/2010/main" val="1849334736"/>
               </p:ext>
             </p:extLst>
           </p:nvPr>
         </p:nvGraphicFramePr>
         <p:xfrm>
-          <a:off x="1043323" y="4797152"/>
-          <a:ext cx="7128791" cy="505067"/>
+          <a:off x="539551" y="2708920"/>
+          <a:ext cx="8085583" cy="936104"/>
         </p:xfrm>
         <a:graphic>
           <a:graphicData uri="http://schemas.openxmlformats.org/drawingml/2006/table">
@@ -5006,13 +4553,13 @@
                 <a:tableStyleId>{5C22544A-7EE6-4342-B048-85BDC9FD1C3A}</a:tableStyleId>
               </a:tblPr>
               <a:tblGrid>
-                <a:gridCol w="406530"/>
-                <a:gridCol w="1829384"/>
-                <a:gridCol w="2156060"/>
-                <a:gridCol w="588016"/>
-                <a:gridCol w="2148801"/>
+                <a:gridCol w="504057"/>
+                <a:gridCol w="1800199"/>
+                <a:gridCol w="1730821"/>
+                <a:gridCol w="1725564"/>
+                <a:gridCol w="2324942"/>
               </a:tblGrid>
-              <a:tr h="505067">
+              <a:tr h="936104">
                 <a:tc>
                   <a:txBody>
                     <a:bodyPr/>
@@ -5020,18 +4567,18 @@
                     <a:p>
                       <a:pPr algn="ctr" fontAlgn="ctr"/>
                       <a:r>
-                        <a:rPr lang="pt-BR" sz="700" u="none" strike="noStrike" dirty="0">
+                        <a:rPr lang="pt-BR" sz="1100" u="none" strike="noStrike" dirty="0">
                           <a:effectLst/>
                         </a:rPr>
-                        <a:t>CT070</a:t>
+                        <a:t>CT001</a:t>
                       </a:r>
-                      <a:endParaRPr lang="pt-BR" sz="700" b="0" i="0" u="none" strike="noStrike" dirty="0">
+                      <a:endParaRPr lang="pt-BR" sz="1100" b="0" i="0" u="none" strike="noStrike" dirty="0">
                         <a:effectLst/>
                         <a:latin typeface="Arial" panose="020B0604020202020204" pitchFamily="34" charset="0"/>
                       </a:endParaRPr>
                     </a:p>
                   </a:txBody>
-                  <a:tcPr marL="6285" marR="6285" marT="6285" marB="0" anchor="ctr"/>
+                  <a:tcPr marL="6436" marR="6436" marT="6436" marB="0" anchor="ctr"/>
                 </a:tc>
                 <a:tc>
                   <a:txBody>
@@ -5040,18 +4587,18 @@
                     <a:p>
                       <a:pPr algn="ctr" fontAlgn="ctr"/>
                       <a:r>
-                        <a:rPr lang="pt-BR" sz="700" u="none" strike="noStrike">
+                        <a:rPr lang="pt-BR" sz="1100" u="none" strike="noStrike" dirty="0">
                           <a:effectLst/>
                         </a:rPr>
-                        <a:t>Verificar se a nova versão do software realiza a alteração de um jogo com sucesso</a:t>
+                        <a:t>Verificar se o software é compatível com o SO Windows 7</a:t>
                       </a:r>
-                      <a:endParaRPr lang="pt-BR" sz="700" b="0" i="0" u="none" strike="noStrike">
+                      <a:endParaRPr lang="pt-BR" sz="1100" b="0" i="0" u="none" strike="noStrike" dirty="0">
                         <a:effectLst/>
                         <a:latin typeface="Arial" panose="020B0604020202020204" pitchFamily="34" charset="0"/>
                       </a:endParaRPr>
                     </a:p>
                   </a:txBody>
-                  <a:tcPr marL="6285" marR="6285" marT="6285" marB="0" anchor="ctr"/>
+                  <a:tcPr marL="6436" marR="6436" marT="6436" marB="0" anchor="ctr"/>
                 </a:tc>
                 <a:tc>
                   <a:txBody>
@@ -5060,12 +4607,213 @@
                     <a:p>
                       <a:pPr algn="ctr" fontAlgn="ctr"/>
                       <a:r>
-                        <a:rPr lang="pt-BR" sz="700" u="none" strike="noStrike" dirty="0">
+                        <a:rPr lang="pt-BR" sz="1100" u="none" strike="noStrike" dirty="0">
                           <a:effectLst/>
                         </a:rPr>
-                        <a:t>Exibir mensagem informando que o jogo foi alterado com sucesso.</a:t>
+                        <a:t>SO Windows 7 instalado e executável (.</a:t>
                       </a:r>
-                      <a:endParaRPr lang="pt-BR" sz="700" b="0" i="0" u="none" strike="noStrike" dirty="0">
+                      <a:r>
+                        <a:rPr lang="pt-BR" sz="1100" u="none" strike="noStrike" dirty="0" err="1">
+                          <a:effectLst/>
+                        </a:rPr>
+                        <a:t>jar</a:t>
+                      </a:r>
+                      <a:r>
+                        <a:rPr lang="pt-BR" sz="1100" u="none" strike="noStrike" dirty="0">
+                          <a:effectLst/>
+                        </a:rPr>
+                        <a:t>) do software</a:t>
+                      </a:r>
+                      <a:endParaRPr lang="pt-BR" sz="1100" b="0" i="0" u="none" strike="noStrike" dirty="0">
+                        <a:effectLst/>
+                        <a:latin typeface="Arial" panose="020B0604020202020204" pitchFamily="34" charset="0"/>
+                      </a:endParaRPr>
+                    </a:p>
+                  </a:txBody>
+                  <a:tcPr marL="6436" marR="6436" marT="6436" marB="0" anchor="ctr"/>
+                </a:tc>
+                <a:tc>
+                  <a:txBody>
+                    <a:bodyPr/>
+                    <a:lstStyle/>
+                    <a:p>
+                      <a:pPr algn="ctr" fontAlgn="ctr"/>
+                      <a:r>
+                        <a:rPr lang="pt-BR" sz="1100" u="none" strike="noStrike" dirty="0">
+                          <a:effectLst/>
+                        </a:rPr>
+                        <a:t>Executar o arquivo .</a:t>
+                      </a:r>
+                      <a:r>
+                        <a:rPr lang="pt-BR" sz="1100" u="none" strike="noStrike" dirty="0" err="1">
+                          <a:effectLst/>
+                        </a:rPr>
+                        <a:t>jar</a:t>
+                      </a:r>
+                      <a:r>
+                        <a:rPr lang="pt-BR" sz="1100" u="none" strike="noStrike" dirty="0">
+                          <a:effectLst/>
+                        </a:rPr>
+                        <a:t> do software no SO Windows 7</a:t>
+                      </a:r>
+                      <a:endParaRPr lang="pt-BR" sz="1100" b="0" i="0" u="none" strike="noStrike" dirty="0">
+                        <a:effectLst/>
+                        <a:latin typeface="Arial" panose="020B0604020202020204" pitchFamily="34" charset="0"/>
+                      </a:endParaRPr>
+                    </a:p>
+                  </a:txBody>
+                  <a:tcPr marL="6436" marR="6436" marT="6436" marB="0" anchor="ctr"/>
+                </a:tc>
+                <a:tc>
+                  <a:txBody>
+                    <a:bodyPr/>
+                    <a:lstStyle/>
+                    <a:p>
+                      <a:pPr algn="ctr" fontAlgn="ctr"/>
+                      <a:r>
+                        <a:rPr lang="pt-BR" sz="1100" u="none" strike="noStrike" dirty="0">
+                          <a:effectLst/>
+                        </a:rPr>
+                        <a:t>Execução do software sem apresentar erros</a:t>
+                      </a:r>
+                      <a:endParaRPr lang="pt-BR" sz="1100" b="0" i="0" u="none" strike="noStrike" dirty="0">
+                        <a:effectLst/>
+                        <a:latin typeface="Arial" panose="020B0604020202020204" pitchFamily="34" charset="0"/>
+                      </a:endParaRPr>
+                    </a:p>
+                  </a:txBody>
+                  <a:tcPr marL="6436" marR="6436" marT="6436" marB="0" anchor="ctr"/>
+                </a:tc>
+              </a:tr>
+            </a:tbl>
+          </a:graphicData>
+        </a:graphic>
+      </p:graphicFrame>
+      <p:graphicFrame>
+        <p:nvGraphicFramePr>
+          <p:cNvPr id="4" name="Tabela 3"/>
+          <p:cNvGraphicFramePr>
+            <a:graphicFrameLocks noGrp="1"/>
+          </p:cNvGraphicFramePr>
+          <p:nvPr>
+            <p:extLst>
+              <p:ext uri="{D42A27DB-BD31-4B8C-83A1-F6EECF244321}">
+                <p14:modId xmlns:p14="http://schemas.microsoft.com/office/powerpoint/2010/main" val="2725595992"/>
+              </p:ext>
+            </p:extLst>
+          </p:nvPr>
+        </p:nvGraphicFramePr>
+        <p:xfrm>
+          <a:off x="539551" y="3861048"/>
+          <a:ext cx="8157592" cy="792088"/>
+        </p:xfrm>
+        <a:graphic>
+          <a:graphicData uri="http://schemas.openxmlformats.org/drawingml/2006/table">
+            <a:tbl>
+              <a:tblPr>
+                <a:tableStyleId>{5C22544A-7EE6-4342-B048-85BDC9FD1C3A}</a:tableStyleId>
+              </a:tblPr>
+              <a:tblGrid>
+                <a:gridCol w="477984"/>
+                <a:gridCol w="1826273"/>
+                <a:gridCol w="1728192"/>
+                <a:gridCol w="1735224"/>
+                <a:gridCol w="2389919"/>
+              </a:tblGrid>
+              <a:tr h="792088">
+                <a:tc>
+                  <a:txBody>
+                    <a:bodyPr/>
+                    <a:lstStyle/>
+                    <a:p>
+                      <a:pPr algn="ctr" fontAlgn="ctr"/>
+                      <a:r>
+                        <a:rPr lang="pt-BR" sz="1100" u="none" strike="noStrike" dirty="0">
+                          <a:effectLst/>
+                        </a:rPr>
+                        <a:t>CT022</a:t>
+                      </a:r>
+                      <a:endParaRPr lang="pt-BR" sz="1100" b="0" i="0" u="none" strike="noStrike" dirty="0">
+                        <a:effectLst/>
+                        <a:latin typeface="Arial" panose="020B0604020202020204" pitchFamily="34" charset="0"/>
+                      </a:endParaRPr>
+                    </a:p>
+                  </a:txBody>
+                  <a:tcPr marL="6436" marR="6436" marT="6436" marB="0" anchor="ctr"/>
+                </a:tc>
+                <a:tc>
+                  <a:txBody>
+                    <a:bodyPr/>
+                    <a:lstStyle/>
+                    <a:p>
+                      <a:pPr algn="ctr" fontAlgn="ctr"/>
+                      <a:r>
+                        <a:rPr lang="pt-BR" sz="1100" u="none" strike="noStrike" dirty="0">
+                          <a:effectLst/>
+                        </a:rPr>
+                        <a:t>Verificar se o software permite alterar a quantidade de casas de um jogo</a:t>
+                      </a:r>
+                      <a:endParaRPr lang="pt-BR" sz="1100" b="0" i="0" u="none" strike="noStrike" dirty="0">
+                        <a:effectLst/>
+                        <a:latin typeface="Arial" panose="020B0604020202020204" pitchFamily="34" charset="0"/>
+                      </a:endParaRPr>
+                    </a:p>
+                  </a:txBody>
+                  <a:tcPr marL="6436" marR="6436" marT="6436" marB="0" anchor="ctr"/>
+                </a:tc>
+                <a:tc>
+                  <a:txBody>
+                    <a:bodyPr/>
+                    <a:lstStyle/>
+                    <a:p>
+                      <a:pPr algn="ctr" fontAlgn="ctr"/>
+                      <a:r>
+                        <a:rPr lang="pt-BR" sz="1100" u="none" strike="noStrike" dirty="0">
+                          <a:effectLst/>
+                        </a:rPr>
+                        <a:t>Existir jogo cadastrado e CT004 realizado com sucesso</a:t>
+                      </a:r>
+                      <a:endParaRPr lang="pt-BR" sz="1100" b="0" i="0" u="none" strike="noStrike" dirty="0">
+                        <a:effectLst/>
+                        <a:latin typeface="Arial" panose="020B0604020202020204" pitchFamily="34" charset="0"/>
+                      </a:endParaRPr>
+                    </a:p>
+                  </a:txBody>
+                  <a:tcPr marL="6436" marR="6436" marT="6436" marB="0" anchor="ctr"/>
+                </a:tc>
+                <a:tc>
+                  <a:txBody>
+                    <a:bodyPr/>
+                    <a:lstStyle/>
+                    <a:p>
+                      <a:pPr algn="ctr" fontAlgn="ctr"/>
+                      <a:r>
+                        <a:rPr lang="pt-BR" sz="1100" u="none" strike="noStrike" dirty="0">
+                          <a:effectLst/>
+                        </a:rPr>
+                        <a:t>Na função "Alterar", tentar alterar a quantidade de casas de um jogo cadastrado.</a:t>
+                      </a:r>
+                      <a:endParaRPr lang="pt-BR" sz="1100" b="0" i="0" u="none" strike="noStrike" dirty="0">
+                        <a:effectLst/>
+                        <a:latin typeface="Arial" panose="020B0604020202020204" pitchFamily="34" charset="0"/>
+                      </a:endParaRPr>
+                    </a:p>
+                  </a:txBody>
+                  <a:tcPr marL="6436" marR="6436" marT="6436" marB="0" anchor="ctr"/>
+                </a:tc>
+                <a:tc>
+                  <a:txBody>
+                    <a:bodyPr/>
+                    <a:lstStyle/>
+                    <a:p>
+                      <a:pPr algn="ctr" fontAlgn="ctr"/>
+                      <a:r>
+                        <a:rPr lang="pt-BR" sz="1100" u="none" strike="noStrike" dirty="0">
+                          <a:effectLst/>
+                        </a:rPr>
+                        <a:t>Exibir mensagem informando que o jogo teve a quantidade de casas alterada com sucesso.</a:t>
+                      </a:r>
+                      <a:endParaRPr lang="pt-BR" sz="1100" b="0" i="0" u="none" strike="noStrike" dirty="0">
                         <a:solidFill>
                           <a:srgbClr val="000000"/>
                         </a:solidFill>
@@ -5074,7 +4822,64 @@
                       </a:endParaRPr>
                     </a:p>
                   </a:txBody>
-                  <a:tcPr marL="6285" marR="6285" marT="6285" marB="0" anchor="ctr"/>
+                  <a:tcPr marL="6436" marR="6436" marT="6436" marB="0" anchor="ctr"/>
+                </a:tc>
+              </a:tr>
+            </a:tbl>
+          </a:graphicData>
+        </a:graphic>
+      </p:graphicFrame>
+      <p:graphicFrame>
+        <p:nvGraphicFramePr>
+          <p:cNvPr id="8" name="Tabela 7"/>
+          <p:cNvGraphicFramePr>
+            <a:graphicFrameLocks noGrp="1"/>
+          </p:cNvGraphicFramePr>
+          <p:nvPr>
+            <p:extLst>
+              <p:ext uri="{D42A27DB-BD31-4B8C-83A1-F6EECF244321}">
+                <p14:modId xmlns:p14="http://schemas.microsoft.com/office/powerpoint/2010/main" val="2647211409"/>
+              </p:ext>
+            </p:extLst>
+          </p:nvPr>
+        </p:nvGraphicFramePr>
+        <p:xfrm>
+          <a:off x="539552" y="4941168"/>
+          <a:ext cx="8229600" cy="720080"/>
+        </p:xfrm>
+        <a:graphic>
+          <a:graphicData uri="http://schemas.openxmlformats.org/drawingml/2006/table">
+            <a:tbl>
+              <a:tblPr>
+                <a:tableStyleId>{5C22544A-7EE6-4342-B048-85BDC9FD1C3A}</a:tableStyleId>
+              </a:tblPr>
+              <a:tblGrid>
+                <a:gridCol w="448670"/>
+                <a:gridCol w="2482639"/>
+                <a:gridCol w="1132642"/>
+                <a:gridCol w="1922300"/>
+                <a:gridCol w="2243349"/>
+              </a:tblGrid>
+              <a:tr h="720080">
+                <a:tc>
+                  <a:txBody>
+                    <a:bodyPr/>
+                    <a:lstStyle/>
+                    <a:p>
+                      <a:pPr algn="ctr" fontAlgn="ctr"/>
+                      <a:r>
+                        <a:rPr lang="pt-BR" sz="1100" u="none" strike="noStrike" dirty="0">
+                          <a:effectLst/>
+                        </a:rPr>
+                        <a:t>CT088</a:t>
+                      </a:r>
+                      <a:endParaRPr lang="pt-BR" sz="1100" b="0" i="0" u="none" strike="noStrike" dirty="0">
+                        <a:effectLst/>
+                        <a:latin typeface="Arial" panose="020B0604020202020204" pitchFamily="34" charset="0"/>
+                      </a:endParaRPr>
+                    </a:p>
+                  </a:txBody>
+                  <a:tcPr marL="5987" marR="5987" marT="5987" marB="0" anchor="ctr"/>
                 </a:tc>
                 <a:tc>
                   <a:txBody>
@@ -5083,18 +4888,18 @@
                     <a:p>
                       <a:pPr algn="ctr" fontAlgn="ctr"/>
                       <a:r>
-                        <a:rPr lang="pt-BR" sz="700" u="none" strike="noStrike" dirty="0">
+                        <a:rPr lang="pt-BR" sz="1100" u="none" strike="noStrike" dirty="0">
                           <a:effectLst/>
                         </a:rPr>
-                        <a:t>Reprovado</a:t>
+                        <a:t>Verificar se a opção ajuda descreve corretamente o passo a passo das funcionalidades.</a:t>
                       </a:r>
-                      <a:endParaRPr lang="pt-BR" sz="700" b="0" i="0" u="none" strike="noStrike" dirty="0">
+                      <a:endParaRPr lang="pt-BR" sz="1100" b="0" i="0" u="none" strike="noStrike" dirty="0">
                         <a:effectLst/>
                         <a:latin typeface="Arial" panose="020B0604020202020204" pitchFamily="34" charset="0"/>
                       </a:endParaRPr>
                     </a:p>
                   </a:txBody>
-                  <a:tcPr marL="6285" marR="6285" marT="6285" marB="0" anchor="ctr"/>
+                  <a:tcPr marL="5987" marR="5987" marT="5987" marB="0" anchor="ctr"/>
                 </a:tc>
                 <a:tc>
                   <a:txBody>
@@ -5103,75 +4908,18 @@
                     <a:p>
                       <a:pPr algn="ctr" fontAlgn="ctr"/>
                       <a:r>
-                        <a:rPr lang="pt-BR" sz="700" u="none" strike="noStrike" dirty="0">
+                        <a:rPr lang="pt-BR" sz="1100" u="none" strike="noStrike">
                           <a:effectLst/>
                         </a:rPr>
-                        <a:t>O software só realiza a alteração do nome do jogo</a:t>
+                        <a:t>CT086 realizado com sucesso</a:t>
                       </a:r>
-                      <a:endParaRPr lang="pt-BR" sz="700" b="0" i="0" u="none" strike="noStrike" dirty="0">
+                      <a:endParaRPr lang="pt-BR" sz="1100" b="0" i="0" u="none" strike="noStrike">
                         <a:effectLst/>
                         <a:latin typeface="Arial" panose="020B0604020202020204" pitchFamily="34" charset="0"/>
                       </a:endParaRPr>
                     </a:p>
                   </a:txBody>
-                  <a:tcPr marL="6285" marR="6285" marT="6285" marB="0" anchor="ctr"/>
-                </a:tc>
-              </a:tr>
-            </a:tbl>
-          </a:graphicData>
-        </a:graphic>
-      </p:graphicFrame>
-      <p:graphicFrame>
-        <p:nvGraphicFramePr>
-          <p:cNvPr id="9" name="Tabela 8"/>
-          <p:cNvGraphicFramePr>
-            <a:graphicFrameLocks noGrp="1"/>
-          </p:cNvGraphicFramePr>
-          <p:nvPr>
-            <p:extLst>
-              <p:ext uri="{D42A27DB-BD31-4B8C-83A1-F6EECF244321}">
-                <p14:modId xmlns:p14="http://schemas.microsoft.com/office/powerpoint/2010/main" val="2419538302"/>
-              </p:ext>
-            </p:extLst>
-          </p:nvPr>
-        </p:nvGraphicFramePr>
-        <p:xfrm>
-          <a:off x="1043323" y="3976012"/>
-          <a:ext cx="7128792" cy="469890"/>
-        </p:xfrm>
-        <a:graphic>
-          <a:graphicData uri="http://schemas.openxmlformats.org/drawingml/2006/table">
-            <a:tbl>
-              <a:tblPr>
-                <a:tableStyleId>{5C22544A-7EE6-4342-B048-85BDC9FD1C3A}</a:tableStyleId>
-              </a:tblPr>
-              <a:tblGrid>
-                <a:gridCol w="406530"/>
-                <a:gridCol w="1829385"/>
-                <a:gridCol w="2156060"/>
-                <a:gridCol w="588016"/>
-                <a:gridCol w="2148801"/>
-              </a:tblGrid>
-              <a:tr h="469890">
-                <a:tc>
-                  <a:txBody>
-                    <a:bodyPr/>
-                    <a:lstStyle/>
-                    <a:p>
-                      <a:pPr algn="ctr" fontAlgn="ctr"/>
-                      <a:r>
-                        <a:rPr lang="pt-BR" sz="700" u="none" strike="noStrike" dirty="0">
-                          <a:effectLst/>
-                        </a:rPr>
-                        <a:t>CT009</a:t>
-                      </a:r>
-                      <a:endParaRPr lang="pt-BR" sz="700" b="0" i="0" u="none" strike="noStrike" dirty="0">
-                        <a:effectLst/>
-                        <a:latin typeface="Arial" panose="020B0604020202020204" pitchFamily="34" charset="0"/>
-                      </a:endParaRPr>
-                    </a:p>
-                  </a:txBody>
-                  <a:tcPr marL="6285" marR="6285" marT="6285" marB="0" anchor="ctr"/>
+                  <a:tcPr marL="5987" marR="5987" marT="5987" marB="0" anchor="ctr"/>
                 </a:tc>
                 <a:tc>
                   <a:txBody>
@@ -5180,18 +4928,21 @@
                     <a:p>
                       <a:pPr algn="ctr" fontAlgn="ctr"/>
                       <a:r>
-                        <a:rPr lang="pt-BR" sz="700" u="none" strike="noStrike" dirty="0">
+                        <a:rPr lang="pt-BR" sz="1100" u="none" strike="noStrike">
                           <a:effectLst/>
                         </a:rPr>
-                        <a:t>Verificar se há um limite de caracteres que podem ser inseridos no nome de um jogo</a:t>
+                        <a:t>Verificar se ao clicar no botão ajuda, ele auxiliará o usuário descrevendo o fluxo principal das funcionalidades.</a:t>
                       </a:r>
-                      <a:endParaRPr lang="pt-BR" sz="700" b="0" i="0" u="none" strike="noStrike" dirty="0">
+                      <a:endParaRPr lang="pt-BR" sz="1100" b="0" i="0" u="none" strike="noStrike">
+                        <a:solidFill>
+                          <a:srgbClr val="000000"/>
+                        </a:solidFill>
                         <a:effectLst/>
                         <a:latin typeface="Arial" panose="020B0604020202020204" pitchFamily="34" charset="0"/>
                       </a:endParaRPr>
                     </a:p>
                   </a:txBody>
-                  <a:tcPr marL="6285" marR="6285" marT="6285" marB="0" anchor="ctr"/>
+                  <a:tcPr marL="5987" marR="5987" marT="5987" marB="0" anchor="ctr"/>
                 </a:tc>
                 <a:tc>
                   <a:txBody>
@@ -5200,195 +4951,21 @@
                     <a:p>
                       <a:pPr algn="ctr" fontAlgn="ctr"/>
                       <a:r>
-                        <a:rPr lang="pt-BR" sz="700" u="none" strike="noStrike" dirty="0">
+                        <a:rPr lang="pt-BR" sz="1100" u="none" strike="noStrike" dirty="0">
                           <a:effectLst/>
                         </a:rPr>
-                        <a:t>Não deixar inserir mais caracteres do que o definido e/ou exibir mensagem informando que a quantidade inserida excede o limite</a:t>
+                        <a:t>Fluxo principal de cada funcionalidade identificado e exibido na tela.</a:t>
                       </a:r>
-                      <a:endParaRPr lang="pt-BR" sz="700" b="0" i="0" u="none" strike="noStrike" dirty="0">
+                      <a:endParaRPr lang="pt-BR" sz="1100" b="0" i="0" u="none" strike="noStrike" dirty="0">
+                        <a:solidFill>
+                          <a:srgbClr val="000000"/>
+                        </a:solidFill>
                         <a:effectLst/>
                         <a:latin typeface="Arial" panose="020B0604020202020204" pitchFamily="34" charset="0"/>
                       </a:endParaRPr>
                     </a:p>
                   </a:txBody>
-                  <a:tcPr marL="6285" marR="6285" marT="6285" marB="0" anchor="ctr"/>
-                </a:tc>
-                <a:tc>
-                  <a:txBody>
-                    <a:bodyPr/>
-                    <a:lstStyle/>
-                    <a:p>
-                      <a:pPr algn="ctr" fontAlgn="ctr"/>
-                      <a:r>
-                        <a:rPr lang="pt-BR" sz="700" u="none" strike="noStrike" dirty="0">
-                          <a:effectLst/>
-                        </a:rPr>
-                        <a:t>Reprovado</a:t>
-                      </a:r>
-                      <a:endParaRPr lang="pt-BR" sz="700" b="0" i="0" u="none" strike="noStrike" dirty="0">
-                        <a:effectLst/>
-                        <a:latin typeface="Arial" panose="020B0604020202020204" pitchFamily="34" charset="0"/>
-                      </a:endParaRPr>
-                    </a:p>
-                  </a:txBody>
-                  <a:tcPr marL="6285" marR="6285" marT="6285" marB="0" anchor="ctr"/>
-                </a:tc>
-                <a:tc>
-                  <a:txBody>
-                    <a:bodyPr/>
-                    <a:lstStyle/>
-                    <a:p>
-                      <a:pPr algn="ctr" fontAlgn="ctr"/>
-                      <a:r>
-                        <a:rPr lang="pt-BR" sz="700" u="none" strike="noStrike" dirty="0">
-                          <a:effectLst/>
-                        </a:rPr>
-                        <a:t>O jogo não apresenta limite de caracteres para o nome do jogo</a:t>
-                      </a:r>
-                      <a:endParaRPr lang="pt-BR" sz="700" b="0" i="0" u="none" strike="noStrike" dirty="0">
-                        <a:effectLst/>
-                        <a:latin typeface="Arial" panose="020B0604020202020204" pitchFamily="34" charset="0"/>
-                      </a:endParaRPr>
-                    </a:p>
-                  </a:txBody>
-                  <a:tcPr marL="6285" marR="6285" marT="6285" marB="0" anchor="ctr"/>
-                </a:tc>
-              </a:tr>
-            </a:tbl>
-          </a:graphicData>
-        </a:graphic>
-      </p:graphicFrame>
-      <p:graphicFrame>
-        <p:nvGraphicFramePr>
-          <p:cNvPr id="10" name="Tabela 9"/>
-          <p:cNvGraphicFramePr>
-            <a:graphicFrameLocks noGrp="1"/>
-          </p:cNvGraphicFramePr>
-          <p:nvPr>
-            <p:extLst>
-              <p:ext uri="{D42A27DB-BD31-4B8C-83A1-F6EECF244321}">
-                <p14:modId xmlns:p14="http://schemas.microsoft.com/office/powerpoint/2010/main" val="969050897"/>
-              </p:ext>
-            </p:extLst>
-          </p:nvPr>
-        </p:nvGraphicFramePr>
-        <p:xfrm>
-          <a:off x="1038151" y="3101617"/>
-          <a:ext cx="7139136" cy="518667"/>
-        </p:xfrm>
-        <a:graphic>
-          <a:graphicData uri="http://schemas.openxmlformats.org/drawingml/2006/table">
-            <a:tbl>
-              <a:tblPr>
-                <a:tableStyleId>{5C22544A-7EE6-4342-B048-85BDC9FD1C3A}</a:tableStyleId>
-              </a:tblPr>
-              <a:tblGrid>
-                <a:gridCol w="407120"/>
-                <a:gridCol w="1832039"/>
-                <a:gridCol w="2159189"/>
-                <a:gridCol w="588869"/>
-                <a:gridCol w="2151919"/>
-              </a:tblGrid>
-              <a:tr h="518667">
-                <a:tc>
-                  <a:txBody>
-                    <a:bodyPr/>
-                    <a:lstStyle/>
-                    <a:p>
-                      <a:pPr algn="ctr" fontAlgn="ctr"/>
-                      <a:r>
-                        <a:rPr lang="pt-BR" sz="700" u="none" strike="noStrike" dirty="0">
-                          <a:effectLst/>
-                        </a:rPr>
-                        <a:t>CT049</a:t>
-                      </a:r>
-                      <a:endParaRPr lang="pt-BR" sz="700" b="0" i="0" u="none" strike="noStrike" dirty="0">
-                        <a:effectLst/>
-                        <a:latin typeface="Arial" panose="020B0604020202020204" pitchFamily="34" charset="0"/>
-                      </a:endParaRPr>
-                    </a:p>
-                  </a:txBody>
-                  <a:tcPr marL="6285" marR="6285" marT="6285" marB="0" anchor="ctr"/>
-                </a:tc>
-                <a:tc>
-                  <a:txBody>
-                    <a:bodyPr/>
-                    <a:lstStyle/>
-                    <a:p>
-                      <a:pPr algn="ctr" fontAlgn="ctr"/>
-                      <a:r>
-                        <a:rPr lang="pt-BR" sz="700" u="none" strike="noStrike">
-                          <a:effectLst/>
-                        </a:rPr>
-                        <a:t>Tentar realizar o cadastro de um jogo preenchendo o campo de quantidade de peões com espaços em branco</a:t>
-                      </a:r>
-                      <a:endParaRPr lang="pt-BR" sz="700" b="0" i="0" u="none" strike="noStrike">
-                        <a:effectLst/>
-                        <a:latin typeface="Arial" panose="020B0604020202020204" pitchFamily="34" charset="0"/>
-                      </a:endParaRPr>
-                    </a:p>
-                  </a:txBody>
-                  <a:tcPr marL="6285" marR="6285" marT="6285" marB="0" anchor="ctr"/>
-                </a:tc>
-                <a:tc>
-                  <a:txBody>
-                    <a:bodyPr/>
-                    <a:lstStyle/>
-                    <a:p>
-                      <a:pPr algn="ctr" fontAlgn="ctr"/>
-                      <a:r>
-                        <a:rPr lang="pt-BR" sz="700" u="none" strike="noStrike" dirty="0">
-                          <a:effectLst/>
-                        </a:rPr>
-                        <a:t>Não realizar o cadastro e informar ao usuário que o campo deve ser preenchido com caracteres válidos</a:t>
-                      </a:r>
-                      <a:endParaRPr lang="pt-BR" sz="700" b="0" i="0" u="none" strike="noStrike" dirty="0">
-                        <a:effectLst/>
-                        <a:latin typeface="Arial" panose="020B0604020202020204" pitchFamily="34" charset="0"/>
-                      </a:endParaRPr>
-                    </a:p>
-                  </a:txBody>
-                  <a:tcPr marL="6285" marR="6285" marT="6285" marB="0" anchor="ctr"/>
-                </a:tc>
-                <a:tc>
-                  <a:txBody>
-                    <a:bodyPr/>
-                    <a:lstStyle/>
-                    <a:p>
-                      <a:pPr algn="ctr" fontAlgn="ctr"/>
-                      <a:r>
-                        <a:rPr lang="pt-BR" sz="700" u="none" strike="noStrike">
-                          <a:effectLst/>
-                        </a:rPr>
-                        <a:t>Reprovado</a:t>
-                      </a:r>
-                      <a:endParaRPr lang="pt-BR" sz="700" b="0" i="0" u="none" strike="noStrike">
-                        <a:effectLst/>
-                        <a:latin typeface="Arial" panose="020B0604020202020204" pitchFamily="34" charset="0"/>
-                      </a:endParaRPr>
-                    </a:p>
-                  </a:txBody>
-                  <a:tcPr marL="6285" marR="6285" marT="6285" marB="0" anchor="ctr"/>
-                </a:tc>
-                <a:tc>
-                  <a:txBody>
-                    <a:bodyPr/>
-                    <a:lstStyle/>
-                    <a:p>
-                      <a:pPr algn="ctr" fontAlgn="ctr"/>
-                      <a:r>
-                        <a:rPr lang="pt-BR" sz="700" u="none" strike="noStrike" dirty="0">
-                          <a:effectLst/>
-                        </a:rPr>
-                        <a:t>O software permite que a quantidade de peões do jogo seja preenchendo apenas com espaços em branco</a:t>
-                      </a:r>
-                      <a:endParaRPr lang="pt-BR" sz="700" b="0" i="0" u="none" strike="noStrike" dirty="0">
-                        <a:effectLst/>
-                        <a:latin typeface="Arial" panose="020B0604020202020204" pitchFamily="34" charset="0"/>
-                      </a:endParaRPr>
-                    </a:p>
-                  </a:txBody>
-                  <a:tcPr marL="6285" marR="6285" marT="6285" marB="0" anchor="ctr"/>
+                  <a:tcPr marL="5987" marR="5987" marT="5987" marB="0" anchor="ctr"/>
                 </a:tc>
               </a:tr>
             </a:tbl>
@@ -5503,7 +5080,7 @@
         <p:spPr>
           <a:xfrm>
             <a:off x="1142976" y="1857364"/>
-            <a:ext cx="6929486" cy="646331"/>
+            <a:ext cx="6929486" cy="1477328"/>
           </a:xfrm>
           <a:prstGeom prst="rect">
             <a:avLst/>
@@ -5522,8 +5099,29 @@
             </a:pPr>
             <a:r>
               <a:rPr lang="pt-BR" dirty="0" smtClean="0"/>
-              <a:t>Atraso na elaboração e execução dos casos de teste:</a:t>
-            </a:r>
+              <a:t>Atraso na elaboração e execução dos casos de teste</a:t>
+            </a:r>
+            <a:r>
+              <a:rPr lang="pt-BR" dirty="0" smtClean="0"/>
+              <a:t>:</a:t>
+            </a:r>
+          </a:p>
+          <a:p>
+            <a:pPr marL="800100" lvl="1" indent="-342900">
+              <a:buFont typeface="+mj-lt"/>
+              <a:buAutoNum type="arabicPeriod"/>
+            </a:pPr>
+            <a:r>
+              <a:rPr lang="pt-BR" dirty="0" smtClean="0"/>
+              <a:t>Cada integrante da equipe ficou responsável por um módulo restante.</a:t>
+            </a:r>
+          </a:p>
+          <a:p>
+            <a:pPr marL="800100" lvl="1" indent="-342900">
+              <a:buFont typeface="+mj-lt"/>
+              <a:buAutoNum type="arabicPeriod"/>
+            </a:pPr>
+            <a:endParaRPr lang="pt-BR" dirty="0" smtClean="0"/>
           </a:p>
           <a:p>
             <a:pPr marL="742950" lvl="1" indent="-285750">
@@ -5555,6 +5153,162 @@
 </file>
 
 <file path=ppt/slides/slide13.xml><?xml version="1.0" encoding="utf-8"?>
+<p:sld xmlns:a="http://schemas.openxmlformats.org/drawingml/2006/main" xmlns:r="http://schemas.openxmlformats.org/officeDocument/2006/relationships" xmlns:p="http://schemas.openxmlformats.org/presentationml/2006/main">
+  <p:cSld>
+    <p:spTree>
+      <p:nvGrpSpPr>
+        <p:cNvPr id="1" name=""/>
+        <p:cNvGrpSpPr/>
+        <p:nvPr/>
+      </p:nvGrpSpPr>
+      <p:grpSpPr>
+        <a:xfrm>
+          <a:off x="0" y="0"/>
+          <a:ext cx="0" cy="0"/>
+          <a:chOff x="0" y="0"/>
+          <a:chExt cx="0" cy="0"/>
+        </a:xfrm>
+      </p:grpSpPr>
+      <p:pic>
+        <p:nvPicPr>
+          <p:cNvPr id="7" name="Espaço Reservado para Conteúdo 6" descr="Nova140722(ppt_novaroma)B-2.jpg"/>
+          <p:cNvPicPr>
+            <a:picLocks noGrp="1" noChangeAspect="1"/>
+          </p:cNvPicPr>
+          <p:nvPr>
+            <p:ph idx="1"/>
+          </p:nvPr>
+        </p:nvPicPr>
+        <p:blipFill>
+          <a:blip r:embed="rId2"/>
+          <a:stretch>
+            <a:fillRect/>
+          </a:stretch>
+        </p:blipFill>
+        <p:spPr>
+          <a:xfrm>
+            <a:off x="0" y="0"/>
+            <a:ext cx="9144000" cy="6858000"/>
+          </a:xfrm>
+        </p:spPr>
+      </p:pic>
+      <p:sp>
+        <p:nvSpPr>
+          <p:cNvPr id="2" name="Título 1"/>
+          <p:cNvSpPr>
+            <a:spLocks noGrp="1"/>
+          </p:cNvSpPr>
+          <p:nvPr>
+            <p:ph type="title"/>
+          </p:nvPr>
+        </p:nvSpPr>
+        <p:spPr>
+          <a:xfrm>
+            <a:off x="714348" y="357166"/>
+            <a:ext cx="5214974" cy="642942"/>
+          </a:xfrm>
+        </p:spPr>
+        <p:txBody>
+          <a:bodyPr>
+            <a:normAutofit/>
+          </a:bodyPr>
+          <a:lstStyle/>
+          <a:p>
+            <a:pPr algn="l"/>
+            <a:r>
+              <a:rPr lang="pt-BR" sz="2300" dirty="0" smtClean="0">
+                <a:solidFill>
+                  <a:schemeClr val="bg1"/>
+                </a:solidFill>
+              </a:rPr>
+              <a:t>Integrantes x Papéis</a:t>
+            </a:r>
+            <a:endParaRPr lang="pt-BR" sz="2300" dirty="0">
+              <a:solidFill>
+                <a:schemeClr val="bg1"/>
+              </a:solidFill>
+            </a:endParaRPr>
+          </a:p>
+        </p:txBody>
+      </p:sp>
+      <p:sp>
+        <p:nvSpPr>
+          <p:cNvPr id="5" name="CaixaDeTexto 4"/>
+          <p:cNvSpPr txBox="1"/>
+          <p:nvPr/>
+        </p:nvSpPr>
+        <p:spPr>
+          <a:xfrm>
+            <a:off x="1142976" y="1857364"/>
+            <a:ext cx="6929486" cy="369332"/>
+          </a:xfrm>
+          <a:prstGeom prst="rect">
+            <a:avLst/>
+          </a:prstGeom>
+          <a:noFill/>
+        </p:spPr>
+        <p:txBody>
+          <a:bodyPr wrap="square" rtlCol="0">
+            <a:spAutoFit/>
+          </a:bodyPr>
+          <a:lstStyle/>
+          <a:p>
+            <a:pPr lvl="1"/>
+            <a:endParaRPr lang="pt-BR" dirty="0" smtClean="0"/>
+          </a:p>
+        </p:txBody>
+      </p:sp>
+      <p:pic>
+        <p:nvPicPr>
+          <p:cNvPr id="3" name="Imagem 2"/>
+          <p:cNvPicPr>
+            <a:picLocks noChangeAspect="1"/>
+          </p:cNvPicPr>
+          <p:nvPr/>
+        </p:nvPicPr>
+        <p:blipFill>
+          <a:blip r:embed="rId3">
+            <a:extLst>
+              <a:ext uri="{28A0092B-C50C-407E-A947-70E740481C1C}">
+                <a14:useLocalDpi xmlns:a14="http://schemas.microsoft.com/office/drawing/2010/main" val="0"/>
+              </a:ext>
+            </a:extLst>
+          </a:blip>
+          <a:stretch>
+            <a:fillRect/>
+          </a:stretch>
+        </p:blipFill>
+        <p:spPr>
+          <a:xfrm>
+            <a:off x="1403648" y="1832198"/>
+            <a:ext cx="5934075" cy="3829050"/>
+          </a:xfrm>
+          <a:prstGeom prst="rect">
+            <a:avLst/>
+          </a:prstGeom>
+        </p:spPr>
+      </p:pic>
+    </p:spTree>
+    <p:extLst>
+      <p:ext uri="{BB962C8B-B14F-4D97-AF65-F5344CB8AC3E}">
+        <p14:creationId xmlns:p14="http://schemas.microsoft.com/office/powerpoint/2010/main" val="1549315411"/>
+      </p:ext>
+    </p:extLst>
+  </p:cSld>
+  <p:clrMapOvr>
+    <a:masterClrMapping/>
+  </p:clrMapOvr>
+  <p:timing>
+    <p:tnLst>
+      <p:par>
+        <p:cTn id="1" dur="indefinite" restart="never" nodeType="tmRoot"/>
+      </p:par>
+    </p:tnLst>
+  </p:timing>
+</p:sld>
+</file>
+
+<file path=ppt/slides/slide14.xml><?xml version="1.0" encoding="utf-8"?>
 <p:sld xmlns:a="http://schemas.openxmlformats.org/drawingml/2006/main" xmlns:r="http://schemas.openxmlformats.org/officeDocument/2006/relationships" xmlns:p="http://schemas.openxmlformats.org/presentationml/2006/main">
   <p:cSld>
     <p:spTree>
@@ -6615,12 +6369,17 @@
           <a:p>
             <a:r>
               <a:rPr lang="pt-BR" b="1" dirty="0" smtClean="0"/>
-              <a:t>Casos de testes projetados: </a:t>
+              <a:t>Casos de testes projetados:</a:t>
             </a:r>
             <a:r>
               <a:rPr lang="pt-BR" dirty="0" smtClean="0"/>
-              <a:t>8</a:t>
-            </a:r>
+              <a:t> </a:t>
+            </a:r>
+            <a:r>
+              <a:rPr lang="pt-BR" dirty="0" smtClean="0"/>
+              <a:t>9</a:t>
+            </a:r>
+            <a:endParaRPr lang="pt-BR" dirty="0" smtClean="0"/>
           </a:p>
           <a:p>
             <a:endParaRPr lang="pt-BR" dirty="0" smtClean="0"/>
@@ -6631,9 +6390,10 @@
               <a:t>Casos de testes executados: </a:t>
             </a:r>
             <a:r>
-              <a:rPr lang="pt-BR" dirty="0" smtClean="0"/>
-              <a:t>0</a:t>
-            </a:r>
+              <a:rPr lang="pt-BR" dirty="0"/>
+              <a:t>9</a:t>
+            </a:r>
+            <a:endParaRPr lang="pt-BR" dirty="0" smtClean="0"/>
           </a:p>
           <a:p>
             <a:endParaRPr lang="pt-BR" dirty="0" smtClean="0"/>
@@ -6644,9 +6404,10 @@
               <a:t>Aprovados: </a:t>
             </a:r>
             <a:r>
-              <a:rPr lang="pt-BR" dirty="0" smtClean="0"/>
-              <a:t>0</a:t>
-            </a:r>
+              <a:rPr lang="pt-BR" dirty="0"/>
+              <a:t>8</a:t>
+            </a:r>
+            <a:endParaRPr lang="pt-BR" dirty="0" smtClean="0"/>
           </a:p>
           <a:p>
             <a:r>
@@ -6655,8 +6416,9 @@
             </a:r>
             <a:r>
               <a:rPr lang="pt-BR" dirty="0" smtClean="0"/>
-              <a:t>0</a:t>
-            </a:r>
+              <a:t>1</a:t>
+            </a:r>
+            <a:endParaRPr lang="pt-BR" dirty="0" smtClean="0"/>
           </a:p>
           <a:p>
             <a:r>
@@ -6792,8 +6554,9 @@
             </a:r>
             <a:r>
               <a:rPr lang="pt-BR" dirty="0" smtClean="0"/>
-              <a:t>9</a:t>
-            </a:r>
+              <a:t>10</a:t>
+            </a:r>
+            <a:endParaRPr lang="pt-BR" dirty="0" smtClean="0"/>
           </a:p>
           <a:p>
             <a:endParaRPr lang="pt-BR" dirty="0" smtClean="0"/>
@@ -6805,8 +6568,9 @@
             </a:r>
             <a:r>
               <a:rPr lang="pt-BR" dirty="0" smtClean="0"/>
-              <a:t>0</a:t>
-            </a:r>
+              <a:t>10</a:t>
+            </a:r>
+            <a:endParaRPr lang="pt-BR" dirty="0" smtClean="0"/>
           </a:p>
           <a:p>
             <a:endParaRPr lang="pt-BR" dirty="0" smtClean="0"/>
@@ -6817,9 +6581,10 @@
               <a:t>Aprovados: </a:t>
             </a:r>
             <a:r>
-              <a:rPr lang="pt-BR" dirty="0" smtClean="0"/>
-              <a:t>0</a:t>
-            </a:r>
+              <a:rPr lang="pt-BR" dirty="0"/>
+              <a:t>5</a:t>
+            </a:r>
+            <a:endParaRPr lang="pt-BR" dirty="0" smtClean="0"/>
           </a:p>
           <a:p>
             <a:r>
@@ -6827,9 +6592,10 @@
               <a:t>Reprovados: </a:t>
             </a:r>
             <a:r>
-              <a:rPr lang="pt-BR" dirty="0" smtClean="0"/>
-              <a:t>0</a:t>
-            </a:r>
+              <a:rPr lang="pt-BR" dirty="0"/>
+              <a:t>4</a:t>
+            </a:r>
+            <a:endParaRPr lang="pt-BR" dirty="0" smtClean="0"/>
           </a:p>
           <a:p>
             <a:r>
@@ -6837,9 +6603,10 @@
               <a:t>Melhorias: </a:t>
             </a:r>
             <a:r>
-              <a:rPr lang="pt-BR" dirty="0" smtClean="0"/>
-              <a:t>0</a:t>
-            </a:r>
+              <a:rPr lang="pt-BR" dirty="0"/>
+              <a:t>1</a:t>
+            </a:r>
+            <a:endParaRPr lang="pt-BR" dirty="0" smtClean="0"/>
           </a:p>
         </p:txBody>
       </p:sp>
@@ -6939,21 +6706,19 @@
       </p:sp>
       <p:graphicFrame>
         <p:nvGraphicFramePr>
-          <p:cNvPr id="6" name="Gráfico 5"/>
-          <p:cNvGraphicFramePr>
-            <a:graphicFrameLocks/>
-          </p:cNvGraphicFramePr>
+          <p:cNvPr id="5" name="Gráfico 4"/>
+          <p:cNvGraphicFramePr/>
           <p:nvPr>
             <p:extLst>
               <p:ext uri="{D42A27DB-BD31-4B8C-83A1-F6EECF244321}">
-                <p14:modId xmlns:p14="http://schemas.microsoft.com/office/powerpoint/2010/main" val="2054678751"/>
+                <p14:modId xmlns:p14="http://schemas.microsoft.com/office/powerpoint/2010/main" val="556134673"/>
               </p:ext>
             </p:extLst>
           </p:nvPr>
         </p:nvGraphicFramePr>
         <p:xfrm>
-          <a:off x="827584" y="1628800"/>
-          <a:ext cx="7416824" cy="4464496"/>
+          <a:off x="1524000" y="1397000"/>
+          <a:ext cx="6096000" cy="4064000"/>
         </p:xfrm>
         <a:graphic>
           <a:graphicData uri="http://schemas.openxmlformats.org/drawingml/2006/chart">

</xml_diff>